<commit_message>
11/5/2016 Added solutions for excersisses.
</commit_message>
<xml_diff>
--- a/Course Overview.pptx
+++ b/Course Overview.pptx
@@ -5504,14 +5504,7 @@
               <a:latin typeface="Buxton Sketch" panose="03080500000500000004" pitchFamily="66" charset="0"/>
               <a:hlinkClick xmlns:r="http://schemas.openxmlformats.org/officeDocument/2006/relationships" r:id="rId2"/>
             </a:rPr>
-            <a:t>https://</a:t>
-          </a:r>
-          <a:r>
-            <a:rPr lang="en-US" sz="2000" dirty="0" smtClean="0">
-              <a:latin typeface="Buxton Sketch" panose="03080500000500000004" pitchFamily="66" charset="0"/>
-              <a:hlinkClick xmlns:r="http://schemas.openxmlformats.org/officeDocument/2006/relationships" r:id="rId2"/>
-            </a:rPr>
-            <a:t>www.youtube.com/user/coolcsn/videos</a:t>
+            <a:t>https://www.youtube.com/user/coolcsn/videos</a:t>
           </a:r>
           <a:endParaRPr lang="en-US" sz="2000" dirty="0" smtClean="0">
             <a:latin typeface="Buxton Sketch" panose="03080500000500000004" pitchFamily="66" charset="0"/>
@@ -5541,9 +5534,6 @@
             </a:rPr>
             <a:t>https://www.youtube.com/playlist?list=PLW9cNZuPMHVR_VHWPQoie_a5a9vFxbxLY</a:t>
           </a:r>
-          <a:endParaRPr lang="en-US" sz="2000" b="1" dirty="0" smtClean="0">
-            <a:latin typeface="Buxton Sketch" panose="03080500000500000004" pitchFamily="66" charset="0"/>
-          </a:endParaRPr>
         </a:p>
       </dgm:t>
     </dgm:pt>
@@ -8464,22 +8454,22 @@
     </dgm:pt>
   </dgm:ptLst>
   <dgm:cxnLst>
+    <dgm:cxn modelId="{F70BC46C-C4E5-4BDD-AB2F-E6392A25640C}" srcId="{9F0C14E1-5E31-4BFB-93EF-64A72EB696B4}" destId="{5DBF101F-0F35-4E21-834F-2D0370F875E2}" srcOrd="0" destOrd="0" parTransId="{DFB5525A-85FE-4DD0-9919-DA9F0CCF7FC1}" sibTransId="{AB19A77E-F43A-4193-A579-3E00E108D152}"/>
     <dgm:cxn modelId="{89668738-4A06-48A0-ADA1-E81F63ABA142}" srcId="{5DBF101F-0F35-4E21-834F-2D0370F875E2}" destId="{3C212A25-0B13-4130-B138-D80FD13744A6}" srcOrd="2" destOrd="0" parTransId="{43412D1B-5E60-443A-8E70-DE9D4E704809}" sibTransId="{7EEE66FA-BF9A-43A0-ADA2-FE1F6E1855D7}"/>
+    <dgm:cxn modelId="{FB50C092-1AC6-447A-8ECA-B92D7932BA37}" type="presOf" srcId="{ED15561D-56C1-4B97-A225-B17AD9CFFD83}" destId="{523C265F-BF3E-45A7-97E7-3CB6F72BBFF0}" srcOrd="0" destOrd="0" presId="urn:microsoft.com/office/officeart/2005/8/layout/orgChart1"/>
+    <dgm:cxn modelId="{823C09DF-4066-4185-B4D2-80B89A1FF3CD}" srcId="{5DBF101F-0F35-4E21-834F-2D0370F875E2}" destId="{ED15561D-56C1-4B97-A225-B17AD9CFFD83}" srcOrd="1" destOrd="0" parTransId="{7D06307E-E72D-4C92-B922-9BC1410121D5}" sibTransId="{E6125EE4-66B5-47EC-B065-D7DAACD1A343}"/>
+    <dgm:cxn modelId="{FD365F2F-1A42-4B78-9ED5-1E84BD2A971D}" type="presOf" srcId="{9F0C14E1-5E31-4BFB-93EF-64A72EB696B4}" destId="{5D0B09FB-389A-42B8-9F76-AC54AAB7446D}" srcOrd="0" destOrd="0" presId="urn:microsoft.com/office/officeart/2005/8/layout/orgChart1"/>
+    <dgm:cxn modelId="{510C79DE-9E9F-4DC0-BC46-80BEFBF40866}" type="presOf" srcId="{67DCA957-B2F3-41EA-A1D6-69F2974D19A1}" destId="{C737B84A-2ADA-4BBE-9EAC-51D285811437}" srcOrd="0" destOrd="0" presId="urn:microsoft.com/office/officeart/2005/8/layout/orgChart1"/>
+    <dgm:cxn modelId="{9535BF3E-6D47-4915-8F7D-26552F5214B9}" type="presOf" srcId="{43412D1B-5E60-443A-8E70-DE9D4E704809}" destId="{F2FABC0A-7D27-41B6-A5B2-1681964D3E93}" srcOrd="0" destOrd="0" presId="urn:microsoft.com/office/officeart/2005/8/layout/orgChart1"/>
+    <dgm:cxn modelId="{BBD27F77-7864-43DF-9B2E-BCB603876EED}" type="presOf" srcId="{7D06307E-E72D-4C92-B922-9BC1410121D5}" destId="{28B83FEF-8929-4CA9-AA29-351DB9B1E4DC}" srcOrd="0" destOrd="0" presId="urn:microsoft.com/office/officeart/2005/8/layout/orgChart1"/>
+    <dgm:cxn modelId="{B98E2DD1-8CE7-407C-8B1A-1A31AFF5E217}" type="presOf" srcId="{FE303ED2-E91E-412E-9437-9D310539077B}" destId="{A906F8A3-A092-4062-9F84-7013F75341DA}" srcOrd="1" destOrd="0" presId="urn:microsoft.com/office/officeart/2005/8/layout/orgChart1"/>
+    <dgm:cxn modelId="{79623BA5-3EE9-492F-9F67-A7A2848E39D4}" type="presOf" srcId="{ED15561D-56C1-4B97-A225-B17AD9CFFD83}" destId="{A5CF2B70-2E8B-4780-B74F-7777095946AC}" srcOrd="1" destOrd="0" presId="urn:microsoft.com/office/officeart/2005/8/layout/orgChart1"/>
+    <dgm:cxn modelId="{12598B40-AE2D-4BF4-A65C-B4CC62CF6BAA}" type="presOf" srcId="{5DBF101F-0F35-4E21-834F-2D0370F875E2}" destId="{0F3F96D0-4A8B-4629-A505-534193085623}" srcOrd="1" destOrd="0" presId="urn:microsoft.com/office/officeart/2005/8/layout/orgChart1"/>
+    <dgm:cxn modelId="{FD7431D9-52DC-4CFA-A587-3A5E27E8B047}" type="presOf" srcId="{FE303ED2-E91E-412E-9437-9D310539077B}" destId="{2614E269-8295-4197-BB5E-0D078F5030B2}" srcOrd="0" destOrd="0" presId="urn:microsoft.com/office/officeart/2005/8/layout/orgChart1"/>
     <dgm:cxn modelId="{82993F7F-9375-4623-BE0F-E11A2ED881FC}" type="presOf" srcId="{3C212A25-0B13-4130-B138-D80FD13744A6}" destId="{254D17AE-BCFB-4A21-A1FA-06E9765EE69A}" srcOrd="1" destOrd="0" presId="urn:microsoft.com/office/officeart/2005/8/layout/orgChart1"/>
-    <dgm:cxn modelId="{823C09DF-4066-4185-B4D2-80B89A1FF3CD}" srcId="{5DBF101F-0F35-4E21-834F-2D0370F875E2}" destId="{ED15561D-56C1-4B97-A225-B17AD9CFFD83}" srcOrd="1" destOrd="0" parTransId="{7D06307E-E72D-4C92-B922-9BC1410121D5}" sibTransId="{E6125EE4-66B5-47EC-B065-D7DAACD1A343}"/>
-    <dgm:cxn modelId="{FB50C092-1AC6-447A-8ECA-B92D7932BA37}" type="presOf" srcId="{ED15561D-56C1-4B97-A225-B17AD9CFFD83}" destId="{523C265F-BF3E-45A7-97E7-3CB6F72BBFF0}" srcOrd="0" destOrd="0" presId="urn:microsoft.com/office/officeart/2005/8/layout/orgChart1"/>
+    <dgm:cxn modelId="{7C4B19F7-C135-41D5-8E39-013674826154}" type="presOf" srcId="{5DBF101F-0F35-4E21-834F-2D0370F875E2}" destId="{0359D7AD-5B93-4C43-9D98-56774F0D5194}" srcOrd="0" destOrd="0" presId="urn:microsoft.com/office/officeart/2005/8/layout/orgChart1"/>
+    <dgm:cxn modelId="{354ECFAA-0650-4348-9089-A5F0F4D0486F}" srcId="{5DBF101F-0F35-4E21-834F-2D0370F875E2}" destId="{FE303ED2-E91E-412E-9437-9D310539077B}" srcOrd="0" destOrd="0" parTransId="{67DCA957-B2F3-41EA-A1D6-69F2974D19A1}" sibTransId="{CE3C1A84-FDCD-4933-B8BB-69E7736BF902}"/>
     <dgm:cxn modelId="{B01D91DC-554F-453D-9B9C-0287793FEF7A}" type="presOf" srcId="{3C212A25-0B13-4130-B138-D80FD13744A6}" destId="{FB88D22D-616A-4763-8730-376C7E899E79}" srcOrd="0" destOrd="0" presId="urn:microsoft.com/office/officeart/2005/8/layout/orgChart1"/>
-    <dgm:cxn modelId="{F70BC46C-C4E5-4BDD-AB2F-E6392A25640C}" srcId="{9F0C14E1-5E31-4BFB-93EF-64A72EB696B4}" destId="{5DBF101F-0F35-4E21-834F-2D0370F875E2}" srcOrd="0" destOrd="0" parTransId="{DFB5525A-85FE-4DD0-9919-DA9F0CCF7FC1}" sibTransId="{AB19A77E-F43A-4193-A579-3E00E108D152}"/>
-    <dgm:cxn modelId="{FD7431D9-52DC-4CFA-A587-3A5E27E8B047}" type="presOf" srcId="{FE303ED2-E91E-412E-9437-9D310539077B}" destId="{2614E269-8295-4197-BB5E-0D078F5030B2}" srcOrd="0" destOrd="0" presId="urn:microsoft.com/office/officeart/2005/8/layout/orgChart1"/>
-    <dgm:cxn modelId="{7C4B19F7-C135-41D5-8E39-013674826154}" type="presOf" srcId="{5DBF101F-0F35-4E21-834F-2D0370F875E2}" destId="{0359D7AD-5B93-4C43-9D98-56774F0D5194}" srcOrd="0" destOrd="0" presId="urn:microsoft.com/office/officeart/2005/8/layout/orgChart1"/>
-    <dgm:cxn modelId="{B98E2DD1-8CE7-407C-8B1A-1A31AFF5E217}" type="presOf" srcId="{FE303ED2-E91E-412E-9437-9D310539077B}" destId="{A906F8A3-A092-4062-9F84-7013F75341DA}" srcOrd="1" destOrd="0" presId="urn:microsoft.com/office/officeart/2005/8/layout/orgChart1"/>
-    <dgm:cxn modelId="{510C79DE-9E9F-4DC0-BC46-80BEFBF40866}" type="presOf" srcId="{67DCA957-B2F3-41EA-A1D6-69F2974D19A1}" destId="{C737B84A-2ADA-4BBE-9EAC-51D285811437}" srcOrd="0" destOrd="0" presId="urn:microsoft.com/office/officeart/2005/8/layout/orgChart1"/>
-    <dgm:cxn modelId="{BBD27F77-7864-43DF-9B2E-BCB603876EED}" type="presOf" srcId="{7D06307E-E72D-4C92-B922-9BC1410121D5}" destId="{28B83FEF-8929-4CA9-AA29-351DB9B1E4DC}" srcOrd="0" destOrd="0" presId="urn:microsoft.com/office/officeart/2005/8/layout/orgChart1"/>
-    <dgm:cxn modelId="{FD365F2F-1A42-4B78-9ED5-1E84BD2A971D}" type="presOf" srcId="{9F0C14E1-5E31-4BFB-93EF-64A72EB696B4}" destId="{5D0B09FB-389A-42B8-9F76-AC54AAB7446D}" srcOrd="0" destOrd="0" presId="urn:microsoft.com/office/officeart/2005/8/layout/orgChart1"/>
-    <dgm:cxn modelId="{79623BA5-3EE9-492F-9F67-A7A2848E39D4}" type="presOf" srcId="{ED15561D-56C1-4B97-A225-B17AD9CFFD83}" destId="{A5CF2B70-2E8B-4780-B74F-7777095946AC}" srcOrd="1" destOrd="0" presId="urn:microsoft.com/office/officeart/2005/8/layout/orgChart1"/>
-    <dgm:cxn modelId="{354ECFAA-0650-4348-9089-A5F0F4D0486F}" srcId="{5DBF101F-0F35-4E21-834F-2D0370F875E2}" destId="{FE303ED2-E91E-412E-9437-9D310539077B}" srcOrd="0" destOrd="0" parTransId="{67DCA957-B2F3-41EA-A1D6-69F2974D19A1}" sibTransId="{CE3C1A84-FDCD-4933-B8BB-69E7736BF902}"/>
-    <dgm:cxn modelId="{9535BF3E-6D47-4915-8F7D-26552F5214B9}" type="presOf" srcId="{43412D1B-5E60-443A-8E70-DE9D4E704809}" destId="{F2FABC0A-7D27-41B6-A5B2-1681964D3E93}" srcOrd="0" destOrd="0" presId="urn:microsoft.com/office/officeart/2005/8/layout/orgChart1"/>
-    <dgm:cxn modelId="{12598B40-AE2D-4BF4-A65C-B4CC62CF6BAA}" type="presOf" srcId="{5DBF101F-0F35-4E21-834F-2D0370F875E2}" destId="{0F3F96D0-4A8B-4629-A505-534193085623}" srcOrd="1" destOrd="0" presId="urn:microsoft.com/office/officeart/2005/8/layout/orgChart1"/>
     <dgm:cxn modelId="{F3D59A19-B586-4E2E-B3DD-350E8083E5C6}" type="presParOf" srcId="{5D0B09FB-389A-42B8-9F76-AC54AAB7446D}" destId="{AF9557CA-7D0B-407C-B122-3806D3B80045}" srcOrd="0" destOrd="0" presId="urn:microsoft.com/office/officeart/2005/8/layout/orgChart1"/>
     <dgm:cxn modelId="{8CD5B951-A4B9-482B-984E-327DC9B435E8}" type="presParOf" srcId="{AF9557CA-7D0B-407C-B122-3806D3B80045}" destId="{C76704DA-2A6C-4F8D-B746-4F85018CD45A}" srcOrd="0" destOrd="0" presId="urn:microsoft.com/office/officeart/2005/8/layout/orgChart1"/>
     <dgm:cxn modelId="{EA691761-E62C-48CB-8E95-889D13D86C94}" type="presParOf" srcId="{C76704DA-2A6C-4F8D-B746-4F85018CD45A}" destId="{0359D7AD-5B93-4C43-9D98-56774F0D5194}" srcOrd="0" destOrd="0" presId="urn:microsoft.com/office/officeart/2005/8/layout/orgChart1"/>
@@ -9855,18 +9845,18 @@
     </dgm:pt>
   </dgm:ptLst>
   <dgm:cxnLst>
+    <dgm:cxn modelId="{1A9B7C33-D180-4BAD-BAB0-48F9CC52E7D7}" srcId="{36FF7C4C-C18C-46F5-8FE8-C426B93A9095}" destId="{47581A9E-5E40-406D-BE0A-38AA3E89F7F8}" srcOrd="0" destOrd="0" parTransId="{B9257DBC-4964-4109-BE29-5A9463C79B30}" sibTransId="{36D4FCD3-96C9-4F49-A64F-A25212C98BE3}"/>
     <dgm:cxn modelId="{3F461B40-14D3-4DE0-B156-B004FD9F8ED9}" type="presOf" srcId="{F53C9289-97E1-4D2D-97C9-1AAC80980444}" destId="{066BF7EA-934B-4060-B6BF-0796EB1E4F44}" srcOrd="0" destOrd="0" presId="urn:microsoft.com/office/officeart/2005/8/layout/orgChart1"/>
+    <dgm:cxn modelId="{9FC334A9-4E29-4794-8BF1-2134E895F76D}" type="presOf" srcId="{EEC3C2B6-CCB3-4CDB-84D9-93741BAF41A2}" destId="{54470973-FF4C-4094-83FC-25652F5582EF}" srcOrd="1" destOrd="0" presId="urn:microsoft.com/office/officeart/2005/8/layout/orgChart1"/>
+    <dgm:cxn modelId="{8AB80DB9-7B40-4065-83A0-8DAD0D36E386}" type="presOf" srcId="{EFFAFC6C-F906-450E-8595-D15AC71B243F}" destId="{973CA2BD-28A9-4084-9A56-C43D3E3B0316}" srcOrd="0" destOrd="0" presId="urn:microsoft.com/office/officeart/2005/8/layout/orgChart1"/>
     <dgm:cxn modelId="{9FD2703E-D7D4-488C-B86F-89B4AAEC8866}" type="presOf" srcId="{5026F749-70FD-4720-9858-7B81314E8CF0}" destId="{ACDE8485-05B1-406B-AD3C-368A19FF8F21}" srcOrd="0" destOrd="0" presId="urn:microsoft.com/office/officeart/2005/8/layout/orgChart1"/>
-    <dgm:cxn modelId="{1A9B7C33-D180-4BAD-BAB0-48F9CC52E7D7}" srcId="{36FF7C4C-C18C-46F5-8FE8-C426B93A9095}" destId="{47581A9E-5E40-406D-BE0A-38AA3E89F7F8}" srcOrd="0" destOrd="0" parTransId="{B9257DBC-4964-4109-BE29-5A9463C79B30}" sibTransId="{36D4FCD3-96C9-4F49-A64F-A25212C98BE3}"/>
+    <dgm:cxn modelId="{BC82667A-EDA1-43CA-B93C-FF9003F535FB}" srcId="{47581A9E-5E40-406D-BE0A-38AA3E89F7F8}" destId="{5026F749-70FD-4720-9858-7B81314E8CF0}" srcOrd="0" destOrd="0" parTransId="{F53C9289-97E1-4D2D-97C9-1AAC80980444}" sibTransId="{1A494AB9-3AE1-4FA4-9DB7-96C622E19841}"/>
+    <dgm:cxn modelId="{3BFAD681-DCC6-47B1-AAF1-2EEA17BB839A}" type="presOf" srcId="{47581A9E-5E40-406D-BE0A-38AA3E89F7F8}" destId="{36FDA7F1-3CE0-45DA-99EE-C2DAE976718C}" srcOrd="0" destOrd="0" presId="urn:microsoft.com/office/officeart/2005/8/layout/orgChart1"/>
+    <dgm:cxn modelId="{5D9FF610-E795-476D-86FC-E015F8FDA489}" srcId="{47581A9E-5E40-406D-BE0A-38AA3E89F7F8}" destId="{EEC3C2B6-CCB3-4CDB-84D9-93741BAF41A2}" srcOrd="1" destOrd="0" parTransId="{EFFAFC6C-F906-450E-8595-D15AC71B243F}" sibTransId="{F512F933-B839-42F7-8E57-EDFA719F737F}"/>
     <dgm:cxn modelId="{12C6268D-B3F0-4C5C-B9B7-4269BF5D55F1}" type="presOf" srcId="{47581A9E-5E40-406D-BE0A-38AA3E89F7F8}" destId="{7C14404F-4974-49DB-96E9-942AA1195F7A}" srcOrd="1" destOrd="0" presId="urn:microsoft.com/office/officeart/2005/8/layout/orgChart1"/>
-    <dgm:cxn modelId="{5D9FF610-E795-476D-86FC-E015F8FDA489}" srcId="{47581A9E-5E40-406D-BE0A-38AA3E89F7F8}" destId="{EEC3C2B6-CCB3-4CDB-84D9-93741BAF41A2}" srcOrd="1" destOrd="0" parTransId="{EFFAFC6C-F906-450E-8595-D15AC71B243F}" sibTransId="{F512F933-B839-42F7-8E57-EDFA719F737F}"/>
-    <dgm:cxn modelId="{8AB80DB9-7B40-4065-83A0-8DAD0D36E386}" type="presOf" srcId="{EFFAFC6C-F906-450E-8595-D15AC71B243F}" destId="{973CA2BD-28A9-4084-9A56-C43D3E3B0316}" srcOrd="0" destOrd="0" presId="urn:microsoft.com/office/officeart/2005/8/layout/orgChart1"/>
-    <dgm:cxn modelId="{9FC334A9-4E29-4794-8BF1-2134E895F76D}" type="presOf" srcId="{EEC3C2B6-CCB3-4CDB-84D9-93741BAF41A2}" destId="{54470973-FF4C-4094-83FC-25652F5582EF}" srcOrd="1" destOrd="0" presId="urn:microsoft.com/office/officeart/2005/8/layout/orgChart1"/>
     <dgm:cxn modelId="{5C91C76A-FC00-4920-9159-50F3665C6692}" type="presOf" srcId="{5026F749-70FD-4720-9858-7B81314E8CF0}" destId="{5ABA39A4-A26D-4F82-AF53-3A39C640F9C3}" srcOrd="1" destOrd="0" presId="urn:microsoft.com/office/officeart/2005/8/layout/orgChart1"/>
+    <dgm:cxn modelId="{E0C3EF0D-090E-4E04-B581-91BAC77C7E75}" type="presOf" srcId="{EEC3C2B6-CCB3-4CDB-84D9-93741BAF41A2}" destId="{07BD9B31-3415-4AE7-BD62-D4E049D8396D}" srcOrd="0" destOrd="0" presId="urn:microsoft.com/office/officeart/2005/8/layout/orgChart1"/>
     <dgm:cxn modelId="{FF9EFE8B-F6D5-4585-A95F-EFE7E2BAD83F}" type="presOf" srcId="{36FF7C4C-C18C-46F5-8FE8-C426B93A9095}" destId="{F28535A8-9D85-4AB8-B7C4-4EDBC1F9E41B}" srcOrd="0" destOrd="0" presId="urn:microsoft.com/office/officeart/2005/8/layout/orgChart1"/>
-    <dgm:cxn modelId="{E0C3EF0D-090E-4E04-B581-91BAC77C7E75}" type="presOf" srcId="{EEC3C2B6-CCB3-4CDB-84D9-93741BAF41A2}" destId="{07BD9B31-3415-4AE7-BD62-D4E049D8396D}" srcOrd="0" destOrd="0" presId="urn:microsoft.com/office/officeart/2005/8/layout/orgChart1"/>
-    <dgm:cxn modelId="{3BFAD681-DCC6-47B1-AAF1-2EEA17BB839A}" type="presOf" srcId="{47581A9E-5E40-406D-BE0A-38AA3E89F7F8}" destId="{36FDA7F1-3CE0-45DA-99EE-C2DAE976718C}" srcOrd="0" destOrd="0" presId="urn:microsoft.com/office/officeart/2005/8/layout/orgChart1"/>
-    <dgm:cxn modelId="{BC82667A-EDA1-43CA-B93C-FF9003F535FB}" srcId="{47581A9E-5E40-406D-BE0A-38AA3E89F7F8}" destId="{5026F749-70FD-4720-9858-7B81314E8CF0}" srcOrd="0" destOrd="0" parTransId="{F53C9289-97E1-4D2D-97C9-1AAC80980444}" sibTransId="{1A494AB9-3AE1-4FA4-9DB7-96C622E19841}"/>
     <dgm:cxn modelId="{F6821DBF-9971-46BE-A30B-50B3DE2134F5}" type="presParOf" srcId="{F28535A8-9D85-4AB8-B7C4-4EDBC1F9E41B}" destId="{1CB2309C-DD81-4BD9-A73C-645D5FDB1293}" srcOrd="0" destOrd="0" presId="urn:microsoft.com/office/officeart/2005/8/layout/orgChart1"/>
     <dgm:cxn modelId="{E911AD6C-0919-436D-B78F-19613774E640}" type="presParOf" srcId="{1CB2309C-DD81-4BD9-A73C-645D5FDB1293}" destId="{A2FA31AE-5C86-4A6F-87F7-2ACB8FE62327}" srcOrd="0" destOrd="0" presId="urn:microsoft.com/office/officeart/2005/8/layout/orgChart1"/>
     <dgm:cxn modelId="{3675E7BE-30B3-46E8-8476-632CA79381E9}" type="presParOf" srcId="{A2FA31AE-5C86-4A6F-87F7-2ACB8FE62327}" destId="{36FDA7F1-3CE0-45DA-99EE-C2DAE976718C}" srcOrd="0" destOrd="0" presId="urn:microsoft.com/office/officeart/2005/8/layout/orgChart1"/>
@@ -10051,407 +10041,6 @@
       <dsp:cNvGrpSpPr/>
     </dsp:nvGrpSpPr>
     <dsp:grpSpPr/>
-    <dsp:sp modelId="{E12C78D3-4B45-43FB-ABCC-83F3DB5D17F4}">
-      <dsp:nvSpPr>
-        <dsp:cNvPr id="0" name=""/>
-        <dsp:cNvSpPr/>
-      </dsp:nvSpPr>
-      <dsp:spPr>
-        <a:xfrm>
-          <a:off x="0" y="2631"/>
-          <a:ext cx="10131425" cy="0"/>
-        </a:xfrm>
-        <a:prstGeom prst="line">
-          <a:avLst/>
-        </a:prstGeom>
-        <a:solidFill>
-          <a:schemeClr val="accent1">
-            <a:hueOff val="0"/>
-            <a:satOff val="0"/>
-            <a:lumOff val="0"/>
-            <a:alphaOff val="0"/>
-          </a:schemeClr>
-        </a:solidFill>
-        <a:ln w="19050" cap="rnd" cmpd="sng" algn="ctr">
-          <a:solidFill>
-            <a:schemeClr val="accent1">
-              <a:hueOff val="0"/>
-              <a:satOff val="0"/>
-              <a:lumOff val="0"/>
-              <a:alphaOff val="0"/>
-            </a:schemeClr>
-          </a:solidFill>
-          <a:prstDash val="solid"/>
-        </a:ln>
-        <a:effectLst/>
-      </dsp:spPr>
-      <dsp:style>
-        <a:lnRef idx="2">
-          <a:scrgbClr r="0" g="0" b="0"/>
-        </a:lnRef>
-        <a:fillRef idx="1">
-          <a:scrgbClr r="0" g="0" b="0"/>
-        </a:fillRef>
-        <a:effectRef idx="0">
-          <a:scrgbClr r="0" g="0" b="0"/>
-        </a:effectRef>
-        <a:fontRef idx="minor">
-          <a:schemeClr val="lt1"/>
-        </a:fontRef>
-      </dsp:style>
-    </dsp:sp>
-    <dsp:sp modelId="{599D6219-B278-4C20-9A95-7F8F137EE331}">
-      <dsp:nvSpPr>
-        <dsp:cNvPr id="0" name=""/>
-        <dsp:cNvSpPr/>
-      </dsp:nvSpPr>
-      <dsp:spPr>
-        <a:xfrm>
-          <a:off x="0" y="2631"/>
-          <a:ext cx="2447388" cy="5383601"/>
-        </a:xfrm>
-        <a:prstGeom prst="rect">
-          <a:avLst/>
-        </a:prstGeom>
-        <a:noFill/>
-        <a:ln>
-          <a:noFill/>
-        </a:ln>
-        <a:effectLst/>
-      </dsp:spPr>
-      <dsp:style>
-        <a:lnRef idx="0">
-          <a:scrgbClr r="0" g="0" b="0"/>
-        </a:lnRef>
-        <a:fillRef idx="0">
-          <a:scrgbClr r="0" g="0" b="0"/>
-        </a:fillRef>
-        <a:effectRef idx="0">
-          <a:scrgbClr r="0" g="0" b="0"/>
-        </a:effectRef>
-        <a:fontRef idx="minor"/>
-      </dsp:style>
-      <dsp:txBody>
-        <a:bodyPr spcFirstLastPara="0" vert="horz" wrap="square" lIns="243840" tIns="243840" rIns="243840" bIns="243840" numCol="1" spcCol="1270" anchor="t" anchorCtr="0">
-          <a:noAutofit/>
-        </a:bodyPr>
-        <a:lstStyle/>
-        <a:p>
-          <a:pPr lvl="0" algn="l" defTabSz="2844800">
-            <a:lnSpc>
-              <a:spcPct val="90000"/>
-            </a:lnSpc>
-            <a:spcBef>
-              <a:spcPct val="0"/>
-            </a:spcBef>
-            <a:spcAft>
-              <a:spcPct val="35000"/>
-            </a:spcAft>
-          </a:pPr>
-          <a:r>
-            <a:rPr lang="en-US" sz="6400" kern="1200" dirty="0" smtClean="0">
-              <a:latin typeface="Buxton Sketch" panose="03080500000500000004" pitchFamily="66" charset="0"/>
-            </a:rPr>
-            <a:t>Useful links</a:t>
-          </a:r>
-          <a:endParaRPr lang="en-US" sz="6400" kern="1200" dirty="0">
-            <a:latin typeface="Buxton Sketch" panose="03080500000500000004" pitchFamily="66" charset="0"/>
-          </a:endParaRPr>
-        </a:p>
-      </dsp:txBody>
-      <dsp:txXfrm>
-        <a:off x="0" y="2631"/>
-        <a:ext cx="2447388" cy="5383601"/>
-      </dsp:txXfrm>
-    </dsp:sp>
-    <dsp:sp modelId="{F8106273-3EEB-4CE6-BD56-FDBCA776B834}">
-      <dsp:nvSpPr>
-        <dsp:cNvPr id="0" name=""/>
-        <dsp:cNvSpPr/>
-      </dsp:nvSpPr>
-      <dsp:spPr>
-        <a:xfrm>
-          <a:off x="2567155" y="247101"/>
-          <a:ext cx="7557313" cy="4889403"/>
-        </a:xfrm>
-        <a:prstGeom prst="rect">
-          <a:avLst/>
-        </a:prstGeom>
-        <a:noFill/>
-        <a:ln>
-          <a:noFill/>
-        </a:ln>
-        <a:effectLst/>
-      </dsp:spPr>
-      <dsp:style>
-        <a:lnRef idx="0">
-          <a:scrgbClr r="0" g="0" b="0"/>
-        </a:lnRef>
-        <a:fillRef idx="0">
-          <a:scrgbClr r="0" g="0" b="0"/>
-        </a:fillRef>
-        <a:effectRef idx="0">
-          <a:scrgbClr r="0" g="0" b="0"/>
-        </a:effectRef>
-        <a:fontRef idx="minor"/>
-      </dsp:style>
-      <dsp:txBody>
-        <a:bodyPr spcFirstLastPara="0" vert="horz" wrap="square" lIns="76200" tIns="76200" rIns="76200" bIns="76200" numCol="1" spcCol="1270" anchor="t" anchorCtr="0">
-          <a:noAutofit/>
-        </a:bodyPr>
-        <a:lstStyle/>
-        <a:p>
-          <a:pPr lvl="0" algn="l" defTabSz="889000">
-            <a:lnSpc>
-              <a:spcPct val="90000"/>
-            </a:lnSpc>
-            <a:spcBef>
-              <a:spcPct val="0"/>
-            </a:spcBef>
-            <a:spcAft>
-              <a:spcPct val="35000"/>
-            </a:spcAft>
-          </a:pPr>
-          <a:r>
-            <a:rPr lang="en-US" sz="2000" b="1" kern="1200" dirty="0" err="1" smtClean="0">
-              <a:latin typeface="Buxton Sketch" panose="03080500000500000004" pitchFamily="66" charset="0"/>
-            </a:rPr>
-            <a:t>Kudvenkat</a:t>
-          </a:r>
-          <a:r>
-            <a:rPr lang="en-US" sz="2000" b="1" kern="1200" dirty="0" smtClean="0">
-              <a:latin typeface="Buxton Sketch" panose="03080500000500000004" pitchFamily="66" charset="0"/>
-            </a:rPr>
-            <a:t>  - C# tutorials for beginners.</a:t>
-          </a:r>
-        </a:p>
-        <a:p>
-          <a:pPr lvl="0" algn="l" defTabSz="889000">
-            <a:lnSpc>
-              <a:spcPct val="90000"/>
-            </a:lnSpc>
-            <a:spcBef>
-              <a:spcPct val="0"/>
-            </a:spcBef>
-            <a:spcAft>
-              <a:spcPct val="35000"/>
-            </a:spcAft>
-          </a:pPr>
-          <a:r>
-            <a:rPr lang="en-US" sz="2000" kern="1200" dirty="0" smtClean="0">
-              <a:latin typeface="Buxton Sketch" panose="03080500000500000004" pitchFamily="66" charset="0"/>
-              <a:hlinkClick xmlns:r="http://schemas.openxmlformats.org/officeDocument/2006/relationships" r:id="rId1"/>
-            </a:rPr>
-            <a:t>https://www.youtube.com/watch?v=SXmVym6L8dw&amp;list=PLAC325451207E3105</a:t>
-          </a:r>
-          <a:endParaRPr lang="en-US" sz="2000" kern="1200" dirty="0" smtClean="0">
-            <a:latin typeface="Buxton Sketch" panose="03080500000500000004" pitchFamily="66" charset="0"/>
-          </a:endParaRPr>
-        </a:p>
-        <a:p>
-          <a:pPr lvl="0" algn="l" defTabSz="889000">
-            <a:lnSpc>
-              <a:spcPct val="90000"/>
-            </a:lnSpc>
-            <a:spcBef>
-              <a:spcPct val="0"/>
-            </a:spcBef>
-            <a:spcAft>
-              <a:spcPct val="35000"/>
-            </a:spcAft>
-          </a:pPr>
-          <a:endParaRPr lang="en-US" sz="2000" kern="1200" dirty="0" smtClean="0">
-            <a:latin typeface="Buxton Sketch" panose="03080500000500000004" pitchFamily="66" charset="0"/>
-          </a:endParaRPr>
-        </a:p>
-        <a:p>
-          <a:pPr lvl="0" algn="l" defTabSz="889000">
-            <a:lnSpc>
-              <a:spcPct val="90000"/>
-            </a:lnSpc>
-            <a:spcBef>
-              <a:spcPct val="0"/>
-            </a:spcBef>
-            <a:spcAft>
-              <a:spcPct val="35000"/>
-            </a:spcAft>
-          </a:pPr>
-          <a:r>
-            <a:rPr lang="bg-BG" sz="2000" kern="1200" dirty="0" smtClean="0">
-              <a:latin typeface="Buxton Sketch" panose="03080500000500000004" pitchFamily="66" charset="0"/>
-            </a:rPr>
-            <a:t>Стоян Черешаров - </a:t>
-          </a:r>
-          <a:r>
-            <a:rPr lang="bg-BG" sz="2000" b="0" i="0" kern="1200" dirty="0" smtClean="0">
-              <a:latin typeface="Buxton Sketch" panose="03080500000500000004" pitchFamily="66" charset="0"/>
-            </a:rPr>
-            <a:t>Работа с </a:t>
-          </a:r>
-          <a:r>
-            <a:rPr lang="en-US" sz="2000" b="0" i="0" kern="1200" dirty="0" err="1" smtClean="0">
-              <a:latin typeface="Buxton Sketch" panose="03080500000500000004" pitchFamily="66" charset="0"/>
-            </a:rPr>
-            <a:t>Git</a:t>
-          </a:r>
-          <a:r>
-            <a:rPr lang="en-US" sz="2000" b="0" i="0" kern="1200" dirty="0" smtClean="0">
-              <a:latin typeface="Buxton Sketch" panose="03080500000500000004" pitchFamily="66" charset="0"/>
-            </a:rPr>
-            <a:t> </a:t>
-          </a:r>
-          <a:r>
-            <a:rPr lang="bg-BG" sz="2000" b="0" i="0" kern="1200" dirty="0" smtClean="0">
-              <a:latin typeface="Buxton Sketch" panose="03080500000500000004" pitchFamily="66" charset="0"/>
-            </a:rPr>
-            <a:t>и </a:t>
-          </a:r>
-          <a:r>
-            <a:rPr lang="en-US" sz="2000" b="0" i="0" kern="1200" dirty="0" smtClean="0">
-              <a:latin typeface="Buxton Sketch" panose="03080500000500000004" pitchFamily="66" charset="0"/>
-            </a:rPr>
-            <a:t>GitHub </a:t>
-          </a:r>
-          <a:r>
-            <a:rPr lang="bg-BG" sz="2000" b="0" i="0" kern="1200" dirty="0" smtClean="0">
-              <a:latin typeface="Buxton Sketch" panose="03080500000500000004" pitchFamily="66" charset="0"/>
-            </a:rPr>
-            <a:t>във </a:t>
-          </a:r>
-          <a:r>
-            <a:rPr lang="en-US" sz="2000" b="0" i="0" kern="1200" dirty="0" err="1" smtClean="0">
-              <a:latin typeface="Buxton Sketch" panose="03080500000500000004" pitchFamily="66" charset="0"/>
-            </a:rPr>
-            <a:t>VisialStudio</a:t>
-          </a:r>
-          <a:r>
-            <a:rPr lang="en-US" sz="2000" b="0" i="0" kern="1200" dirty="0" smtClean="0">
-              <a:latin typeface="Buxton Sketch" panose="03080500000500000004" pitchFamily="66" charset="0"/>
-            </a:rPr>
-            <a:t>. </a:t>
-          </a:r>
-          <a:r>
-            <a:rPr lang="en-US" sz="2000" kern="1200" dirty="0" smtClean="0">
-              <a:latin typeface="Buxton Sketch" panose="03080500000500000004" pitchFamily="66" charset="0"/>
-              <a:hlinkClick xmlns:r="http://schemas.openxmlformats.org/officeDocument/2006/relationships" r:id="rId2"/>
-            </a:rPr>
-            <a:t>https://</a:t>
-          </a:r>
-          <a:r>
-            <a:rPr lang="en-US" sz="2000" kern="1200" dirty="0" smtClean="0">
-              <a:latin typeface="Buxton Sketch" panose="03080500000500000004" pitchFamily="66" charset="0"/>
-              <a:hlinkClick xmlns:r="http://schemas.openxmlformats.org/officeDocument/2006/relationships" r:id="rId2"/>
-            </a:rPr>
-            <a:t>www.youtube.com/user/coolcsn/videos</a:t>
-          </a:r>
-          <a:endParaRPr lang="en-US" sz="2000" kern="1200" dirty="0" smtClean="0">
-            <a:latin typeface="Buxton Sketch" panose="03080500000500000004" pitchFamily="66" charset="0"/>
-          </a:endParaRPr>
-        </a:p>
-        <a:p>
-          <a:pPr lvl="0" algn="l" defTabSz="889000">
-            <a:lnSpc>
-              <a:spcPct val="90000"/>
-            </a:lnSpc>
-            <a:spcBef>
-              <a:spcPct val="0"/>
-            </a:spcBef>
-            <a:spcAft>
-              <a:spcPct val="35000"/>
-            </a:spcAft>
-          </a:pPr>
-          <a:r>
-            <a:rPr lang="bg-BG" sz="2000" b="1" kern="1200" dirty="0" smtClean="0">
-              <a:latin typeface="Buxton Sketch" panose="03080500000500000004" pitchFamily="66" charset="0"/>
-            </a:rPr>
-            <a:t>Любен Киков – задачи </a:t>
-          </a:r>
-          <a:r>
-            <a:rPr lang="bg-BG" sz="2000" b="1" kern="1200" smtClean="0">
-              <a:latin typeface="Buxton Sketch" panose="03080500000500000004" pitchFamily="66" charset="0"/>
-            </a:rPr>
-            <a:t>от СофтУни.</a:t>
-          </a:r>
-          <a:endParaRPr lang="bg-BG" sz="2000" b="1" kern="1200" dirty="0" smtClean="0">
-            <a:latin typeface="Buxton Sketch" panose="03080500000500000004" pitchFamily="66" charset="0"/>
-          </a:endParaRPr>
-        </a:p>
-        <a:p>
-          <a:pPr lvl="0" algn="l" defTabSz="889000">
-            <a:lnSpc>
-              <a:spcPct val="90000"/>
-            </a:lnSpc>
-            <a:spcBef>
-              <a:spcPct val="0"/>
-            </a:spcBef>
-            <a:spcAft>
-              <a:spcPct val="35000"/>
-            </a:spcAft>
-          </a:pPr>
-          <a:r>
-            <a:rPr lang="en-US" sz="2000" b="1" kern="1200" dirty="0" smtClean="0">
-              <a:latin typeface="Buxton Sketch" panose="03080500000500000004" pitchFamily="66" charset="0"/>
-            </a:rPr>
-            <a:t>https://www.youtube.com/playlist?list=PLW9cNZuPMHVR_VHWPQoie_a5a9vFxbxLY</a:t>
-          </a:r>
-          <a:endParaRPr lang="en-US" sz="2000" b="1" kern="1200" dirty="0" smtClean="0">
-            <a:latin typeface="Buxton Sketch" panose="03080500000500000004" pitchFamily="66" charset="0"/>
-          </a:endParaRPr>
-        </a:p>
-      </dsp:txBody>
-      <dsp:txXfrm>
-        <a:off x="2567155" y="247101"/>
-        <a:ext cx="7557313" cy="4889403"/>
-      </dsp:txXfrm>
-    </dsp:sp>
-    <dsp:sp modelId="{B150277F-A2CA-4F1B-AA39-E3634A3B878C}">
-      <dsp:nvSpPr>
-        <dsp:cNvPr id="0" name=""/>
-        <dsp:cNvSpPr/>
-      </dsp:nvSpPr>
-      <dsp:spPr>
-        <a:xfrm>
-          <a:off x="2473577" y="3640644"/>
-          <a:ext cx="6387546" cy="0"/>
-        </a:xfrm>
-        <a:prstGeom prst="line">
-          <a:avLst/>
-        </a:prstGeom>
-        <a:solidFill>
-          <a:schemeClr val="accent1">
-            <a:hueOff val="0"/>
-            <a:satOff val="0"/>
-            <a:lumOff val="0"/>
-            <a:alphaOff val="0"/>
-          </a:schemeClr>
-        </a:solidFill>
-        <a:ln w="19050" cap="rnd" cmpd="sng" algn="ctr">
-          <a:solidFill>
-            <a:schemeClr val="accent1">
-              <a:tint val="50000"/>
-              <a:hueOff val="0"/>
-              <a:satOff val="0"/>
-              <a:lumOff val="0"/>
-              <a:alphaOff val="0"/>
-            </a:schemeClr>
-          </a:solidFill>
-          <a:prstDash val="solid"/>
-        </a:ln>
-        <a:effectLst/>
-      </dsp:spPr>
-      <dsp:style>
-        <a:lnRef idx="2">
-          <a:scrgbClr r="0" g="0" b="0"/>
-        </a:lnRef>
-        <a:fillRef idx="1">
-          <a:scrgbClr r="0" g="0" b="0"/>
-        </a:fillRef>
-        <a:effectRef idx="0">
-          <a:scrgbClr r="0" g="0" b="0"/>
-        </a:effectRef>
-        <a:fontRef idx="minor"/>
-      </dsp:style>
-    </dsp:sp>
   </dsp:spTree>
 </dsp:drawing>
 </file>
@@ -10512,6 +10101,377 @@
       <dsp:cNvGrpSpPr/>
     </dsp:nvGrpSpPr>
     <dsp:grpSpPr/>
+    <dsp:sp modelId="{973CA2BD-28A9-4084-9A56-C43D3E3B0316}">
+      <dsp:nvSpPr>
+        <dsp:cNvPr id="0" name=""/>
+        <dsp:cNvSpPr/>
+      </dsp:nvSpPr>
+      <dsp:spPr>
+        <a:xfrm>
+          <a:off x="5417739" y="1087141"/>
+          <a:ext cx="2558008" cy="1308199"/>
+        </a:xfrm>
+        <a:custGeom>
+          <a:avLst/>
+          <a:gdLst/>
+          <a:ahLst/>
+          <a:cxnLst/>
+          <a:rect l="0" t="0" r="0" b="0"/>
+          <a:pathLst>
+            <a:path>
+              <a:moveTo>
+                <a:pt x="0" y="0"/>
+              </a:moveTo>
+              <a:lnTo>
+                <a:pt x="0" y="841247"/>
+              </a:lnTo>
+              <a:lnTo>
+                <a:pt x="2558008" y="841247"/>
+              </a:lnTo>
+              <a:lnTo>
+                <a:pt x="2558008" y="1308199"/>
+              </a:lnTo>
+            </a:path>
+          </a:pathLst>
+        </a:custGeom>
+        <a:noFill/>
+        <a:ln w="19050" cap="rnd" cmpd="sng" algn="ctr">
+          <a:solidFill>
+            <a:schemeClr val="accent1">
+              <a:shade val="60000"/>
+              <a:hueOff val="0"/>
+              <a:satOff val="0"/>
+              <a:lumOff val="0"/>
+              <a:alphaOff val="0"/>
+            </a:schemeClr>
+          </a:solidFill>
+          <a:prstDash val="solid"/>
+        </a:ln>
+        <a:effectLst/>
+      </dsp:spPr>
+      <dsp:style>
+        <a:lnRef idx="2">
+          <a:scrgbClr r="0" g="0" b="0"/>
+        </a:lnRef>
+        <a:fillRef idx="0">
+          <a:scrgbClr r="0" g="0" b="0"/>
+        </a:fillRef>
+        <a:effectRef idx="0">
+          <a:scrgbClr r="0" g="0" b="0"/>
+        </a:effectRef>
+        <a:fontRef idx="minor"/>
+      </dsp:style>
+    </dsp:sp>
+    <dsp:sp modelId="{066BF7EA-934B-4060-B6BF-0796EB1E4F44}">
+      <dsp:nvSpPr>
+        <dsp:cNvPr id="0" name=""/>
+        <dsp:cNvSpPr/>
+      </dsp:nvSpPr>
+      <dsp:spPr>
+        <a:xfrm>
+          <a:off x="2622119" y="1087141"/>
+          <a:ext cx="2795620" cy="1582522"/>
+        </a:xfrm>
+        <a:custGeom>
+          <a:avLst/>
+          <a:gdLst/>
+          <a:ahLst/>
+          <a:cxnLst/>
+          <a:rect l="0" t="0" r="0" b="0"/>
+          <a:pathLst>
+            <a:path>
+              <a:moveTo>
+                <a:pt x="2795620" y="0"/>
+              </a:moveTo>
+              <a:lnTo>
+                <a:pt x="2795620" y="1115570"/>
+              </a:lnTo>
+              <a:lnTo>
+                <a:pt x="0" y="1115570"/>
+              </a:lnTo>
+              <a:lnTo>
+                <a:pt x="0" y="1582522"/>
+              </a:lnTo>
+            </a:path>
+          </a:pathLst>
+        </a:custGeom>
+        <a:noFill/>
+        <a:ln w="19050" cap="rnd" cmpd="sng" algn="ctr">
+          <a:solidFill>
+            <a:schemeClr val="accent1">
+              <a:shade val="60000"/>
+              <a:hueOff val="0"/>
+              <a:satOff val="0"/>
+              <a:lumOff val="0"/>
+              <a:alphaOff val="0"/>
+            </a:schemeClr>
+          </a:solidFill>
+          <a:prstDash val="solid"/>
+        </a:ln>
+        <a:effectLst/>
+      </dsp:spPr>
+      <dsp:style>
+        <a:lnRef idx="2">
+          <a:scrgbClr r="0" g="0" b="0"/>
+        </a:lnRef>
+        <a:fillRef idx="0">
+          <a:scrgbClr r="0" g="0" b="0"/>
+        </a:fillRef>
+        <a:effectRef idx="0">
+          <a:scrgbClr r="0" g="0" b="0"/>
+        </a:effectRef>
+        <a:fontRef idx="minor"/>
+      </dsp:style>
+    </dsp:sp>
+    <dsp:sp modelId="{36FDA7F1-3CE0-45DA-99EE-C2DAE976718C}">
+      <dsp:nvSpPr>
+        <dsp:cNvPr id="0" name=""/>
+        <dsp:cNvSpPr/>
+      </dsp:nvSpPr>
+      <dsp:spPr>
+        <a:xfrm>
+          <a:off x="8988" y="256633"/>
+          <a:ext cx="10817501" cy="830507"/>
+        </a:xfrm>
+        <a:prstGeom prst="rect">
+          <a:avLst/>
+        </a:prstGeom>
+        <a:solidFill>
+          <a:schemeClr val="accent1">
+            <a:hueOff val="0"/>
+            <a:satOff val="0"/>
+            <a:lumOff val="0"/>
+            <a:alphaOff val="0"/>
+          </a:schemeClr>
+        </a:solidFill>
+        <a:ln w="19050" cap="rnd" cmpd="sng" algn="ctr">
+          <a:solidFill>
+            <a:schemeClr val="lt1">
+              <a:hueOff val="0"/>
+              <a:satOff val="0"/>
+              <a:lumOff val="0"/>
+              <a:alphaOff val="0"/>
+            </a:schemeClr>
+          </a:solidFill>
+          <a:prstDash val="solid"/>
+        </a:ln>
+        <a:effectLst/>
+      </dsp:spPr>
+      <dsp:style>
+        <a:lnRef idx="2">
+          <a:scrgbClr r="0" g="0" b="0"/>
+        </a:lnRef>
+        <a:fillRef idx="1">
+          <a:scrgbClr r="0" g="0" b="0"/>
+        </a:fillRef>
+        <a:effectRef idx="0">
+          <a:scrgbClr r="0" g="0" b="0"/>
+        </a:effectRef>
+        <a:fontRef idx="minor">
+          <a:schemeClr val="lt1"/>
+        </a:fontRef>
+      </dsp:style>
+      <dsp:txBody>
+        <a:bodyPr spcFirstLastPara="0" vert="horz" wrap="square" lIns="34290" tIns="34290" rIns="34290" bIns="34290" numCol="1" spcCol="1270" anchor="ctr" anchorCtr="0">
+          <a:noAutofit/>
+        </a:bodyPr>
+        <a:lstStyle/>
+        <a:p>
+          <a:pPr lvl="0" algn="ctr" defTabSz="2400300">
+            <a:lnSpc>
+              <a:spcPct val="90000"/>
+            </a:lnSpc>
+            <a:spcBef>
+              <a:spcPct val="0"/>
+            </a:spcBef>
+            <a:spcAft>
+              <a:spcPct val="35000"/>
+            </a:spcAft>
+          </a:pPr>
+          <a:r>
+            <a:rPr lang="en-US" sz="5400" kern="1200" dirty="0" smtClean="0">
+              <a:solidFill>
+                <a:srgbClr val="FFFF00"/>
+              </a:solidFill>
+              <a:latin typeface="Informal Roman" panose="030604020304060B0204" pitchFamily="66" charset="0"/>
+            </a:rPr>
+            <a:t>Arrays &amp; Abstract Data Types (ADT)</a:t>
+          </a:r>
+          <a:endParaRPr lang="en-US" sz="5400" kern="1200" dirty="0">
+            <a:solidFill>
+              <a:srgbClr val="FFFF00"/>
+            </a:solidFill>
+            <a:latin typeface="Informal Roman" panose="030604020304060B0204" pitchFamily="66" charset="0"/>
+          </a:endParaRPr>
+        </a:p>
+      </dsp:txBody>
+      <dsp:txXfrm>
+        <a:off x="8988" y="256633"/>
+        <a:ext cx="10817501" cy="830507"/>
+      </dsp:txXfrm>
+    </dsp:sp>
+    <dsp:sp modelId="{ACDE8485-05B1-406B-AD3C-368A19FF8F21}">
+      <dsp:nvSpPr>
+        <dsp:cNvPr id="0" name=""/>
+        <dsp:cNvSpPr/>
+      </dsp:nvSpPr>
+      <dsp:spPr>
+        <a:xfrm>
+          <a:off x="398538" y="2669664"/>
+          <a:ext cx="4447162" cy="393573"/>
+        </a:xfrm>
+        <a:prstGeom prst="rect">
+          <a:avLst/>
+        </a:prstGeom>
+        <a:solidFill>
+          <a:schemeClr val="accent1">
+            <a:hueOff val="0"/>
+            <a:satOff val="0"/>
+            <a:lumOff val="0"/>
+            <a:alphaOff val="0"/>
+          </a:schemeClr>
+        </a:solidFill>
+        <a:ln w="19050" cap="rnd" cmpd="sng" algn="ctr">
+          <a:solidFill>
+            <a:schemeClr val="lt1">
+              <a:hueOff val="0"/>
+              <a:satOff val="0"/>
+              <a:lumOff val="0"/>
+              <a:alphaOff val="0"/>
+            </a:schemeClr>
+          </a:solidFill>
+          <a:prstDash val="solid"/>
+        </a:ln>
+        <a:effectLst/>
+      </dsp:spPr>
+      <dsp:style>
+        <a:lnRef idx="2">
+          <a:scrgbClr r="0" g="0" b="0"/>
+        </a:lnRef>
+        <a:fillRef idx="1">
+          <a:scrgbClr r="0" g="0" b="0"/>
+        </a:fillRef>
+        <a:effectRef idx="0">
+          <a:scrgbClr r="0" g="0" b="0"/>
+        </a:effectRef>
+        <a:fontRef idx="minor">
+          <a:schemeClr val="lt1"/>
+        </a:fontRef>
+      </dsp:style>
+      <dsp:txBody>
+        <a:bodyPr spcFirstLastPara="0" vert="horz" wrap="square" lIns="20320" tIns="20320" rIns="20320" bIns="20320" numCol="1" spcCol="1270" anchor="ctr" anchorCtr="0">
+          <a:noAutofit/>
+        </a:bodyPr>
+        <a:lstStyle/>
+        <a:p>
+          <a:pPr lvl="0" algn="ctr" defTabSz="1422400">
+            <a:lnSpc>
+              <a:spcPct val="90000"/>
+            </a:lnSpc>
+            <a:spcBef>
+              <a:spcPct val="0"/>
+            </a:spcBef>
+            <a:spcAft>
+              <a:spcPct val="35000"/>
+            </a:spcAft>
+          </a:pPr>
+          <a:r>
+            <a:rPr lang="en-US" sz="3200" kern="1200" dirty="0" smtClean="0">
+              <a:latin typeface="Informal Roman" panose="030604020304060B0204" pitchFamily="66" charset="0"/>
+            </a:rPr>
+            <a:t>Creation of an Array</a:t>
+          </a:r>
+          <a:endParaRPr lang="en-US" sz="3200" kern="1200" dirty="0">
+            <a:latin typeface="Informal Roman" panose="030604020304060B0204" pitchFamily="66" charset="0"/>
+          </a:endParaRPr>
+        </a:p>
+      </dsp:txBody>
+      <dsp:txXfrm>
+        <a:off x="398538" y="2669664"/>
+        <a:ext cx="4447162" cy="393573"/>
+      </dsp:txXfrm>
+    </dsp:sp>
+    <dsp:sp modelId="{07BD9B31-3415-4AE7-BD62-D4E049D8396D}">
+      <dsp:nvSpPr>
+        <dsp:cNvPr id="0" name=""/>
+        <dsp:cNvSpPr/>
+      </dsp:nvSpPr>
+      <dsp:spPr>
+        <a:xfrm>
+          <a:off x="5752166" y="2395341"/>
+          <a:ext cx="4447162" cy="503307"/>
+        </a:xfrm>
+        <a:prstGeom prst="rect">
+          <a:avLst/>
+        </a:prstGeom>
+        <a:solidFill>
+          <a:schemeClr val="accent1">
+            <a:hueOff val="0"/>
+            <a:satOff val="0"/>
+            <a:lumOff val="0"/>
+            <a:alphaOff val="0"/>
+          </a:schemeClr>
+        </a:solidFill>
+        <a:ln w="19050" cap="rnd" cmpd="sng" algn="ctr">
+          <a:solidFill>
+            <a:schemeClr val="lt1">
+              <a:hueOff val="0"/>
+              <a:satOff val="0"/>
+              <a:lumOff val="0"/>
+              <a:alphaOff val="0"/>
+            </a:schemeClr>
+          </a:solidFill>
+          <a:prstDash val="solid"/>
+        </a:ln>
+        <a:effectLst/>
+      </dsp:spPr>
+      <dsp:style>
+        <a:lnRef idx="2">
+          <a:scrgbClr r="0" g="0" b="0"/>
+        </a:lnRef>
+        <a:fillRef idx="1">
+          <a:scrgbClr r="0" g="0" b="0"/>
+        </a:fillRef>
+        <a:effectRef idx="0">
+          <a:scrgbClr r="0" g="0" b="0"/>
+        </a:effectRef>
+        <a:fontRef idx="minor">
+          <a:schemeClr val="lt1"/>
+        </a:fontRef>
+      </dsp:style>
+      <dsp:txBody>
+        <a:bodyPr spcFirstLastPara="0" vert="horz" wrap="square" lIns="22860" tIns="22860" rIns="22860" bIns="22860" numCol="1" spcCol="1270" anchor="ctr" anchorCtr="0">
+          <a:noAutofit/>
+        </a:bodyPr>
+        <a:lstStyle/>
+        <a:p>
+          <a:pPr lvl="0" algn="ctr" defTabSz="1600200">
+            <a:lnSpc>
+              <a:spcPct val="90000"/>
+            </a:lnSpc>
+            <a:spcBef>
+              <a:spcPct val="0"/>
+            </a:spcBef>
+            <a:spcAft>
+              <a:spcPct val="35000"/>
+            </a:spcAft>
+          </a:pPr>
+          <a:r>
+            <a:rPr lang="en-US" sz="3600" kern="1200" dirty="0" smtClean="0">
+              <a:latin typeface="Informal Roman" panose="030604020304060B0204" pitchFamily="66" charset="0"/>
+            </a:rPr>
+            <a:t>ADT List</a:t>
+          </a:r>
+          <a:endParaRPr lang="en-US" sz="3600" kern="1200" dirty="0">
+            <a:latin typeface="Informal Roman" panose="030604020304060B0204" pitchFamily="66" charset="0"/>
+          </a:endParaRPr>
+        </a:p>
+      </dsp:txBody>
+      <dsp:txXfrm>
+        <a:off x="5752166" y="2395341"/>
+        <a:ext cx="4447162" cy="503307"/>
+      </dsp:txXfrm>
+    </dsp:sp>
   </dsp:spTree>
 </dsp:drawing>
 </file>
@@ -10524,6 +10484,87 @@
       <dsp:cNvGrpSpPr/>
     </dsp:nvGrpSpPr>
     <dsp:grpSpPr/>
+    <dsp:sp modelId="{451D6CD2-E606-4933-A45B-9415248AF59D}">
+      <dsp:nvSpPr>
+        <dsp:cNvPr id="0" name=""/>
+        <dsp:cNvSpPr/>
+      </dsp:nvSpPr>
+      <dsp:spPr>
+        <a:xfrm>
+          <a:off x="0" y="356592"/>
+          <a:ext cx="11881527" cy="646791"/>
+        </a:xfrm>
+        <a:prstGeom prst="rect">
+          <a:avLst/>
+        </a:prstGeom>
+        <a:solidFill>
+          <a:schemeClr val="accent1">
+            <a:hueOff val="0"/>
+            <a:satOff val="0"/>
+            <a:lumOff val="0"/>
+            <a:alphaOff val="0"/>
+          </a:schemeClr>
+        </a:solidFill>
+        <a:ln w="19050" cap="rnd" cmpd="sng" algn="ctr">
+          <a:solidFill>
+            <a:schemeClr val="lt1">
+              <a:hueOff val="0"/>
+              <a:satOff val="0"/>
+              <a:lumOff val="0"/>
+              <a:alphaOff val="0"/>
+            </a:schemeClr>
+          </a:solidFill>
+          <a:prstDash val="solid"/>
+        </a:ln>
+        <a:effectLst/>
+      </dsp:spPr>
+      <dsp:style>
+        <a:lnRef idx="2">
+          <a:scrgbClr r="0" g="0" b="0"/>
+        </a:lnRef>
+        <a:fillRef idx="1">
+          <a:scrgbClr r="0" g="0" b="0"/>
+        </a:fillRef>
+        <a:effectRef idx="0">
+          <a:scrgbClr r="0" g="0" b="0"/>
+        </a:effectRef>
+        <a:fontRef idx="minor">
+          <a:schemeClr val="lt1"/>
+        </a:fontRef>
+      </dsp:style>
+      <dsp:txBody>
+        <a:bodyPr spcFirstLastPara="0" vert="horz" wrap="square" lIns="38100" tIns="38100" rIns="38100" bIns="38100" numCol="1" spcCol="1270" anchor="ctr" anchorCtr="0">
+          <a:noAutofit/>
+        </a:bodyPr>
+        <a:lstStyle/>
+        <a:p>
+          <a:pPr lvl="0" algn="ctr" defTabSz="2667000">
+            <a:lnSpc>
+              <a:spcPct val="90000"/>
+            </a:lnSpc>
+            <a:spcBef>
+              <a:spcPct val="0"/>
+            </a:spcBef>
+            <a:spcAft>
+              <a:spcPct val="35000"/>
+            </a:spcAft>
+          </a:pPr>
+          <a:r>
+            <a:rPr lang="en-US" sz="6000" kern="1200" dirty="0" smtClean="0">
+              <a:solidFill>
+                <a:srgbClr val="FFFF00"/>
+              </a:solidFill>
+              <a:latin typeface="Informal Roman" panose="030604020304060B0204" pitchFamily="66" charset="0"/>
+            </a:rPr>
+            <a:t>Methods</a:t>
+          </a:r>
+        </a:p>
+      </dsp:txBody>
+      <dsp:txXfrm>
+        <a:off x="0" y="356592"/>
+        <a:ext cx="11881527" cy="646791"/>
+      </dsp:txXfrm>
+    </dsp:sp>
   </dsp:spTree>
 </dsp:drawing>
 </file>
@@ -25190,7 +25231,7 @@
           <a:p>
             <a:fld id="{86BC5D83-A6BD-448A-8B7D-D487C0AC34D1}" type="datetimeFigureOut">
               <a:rPr lang="en-US" smtClean="0"/>
-              <a:t>10/25/2016</a:t>
+              <a:t>11/4/2016</a:t>
             </a:fld>
             <a:endParaRPr lang="en-US"/>
           </a:p>
@@ -26859,7 +26900,7 @@
             <a:fld id="{B61BEF0D-F0BB-DE4B-95CE-6DB70DBA9567}" type="datetimeFigureOut">
               <a:rPr lang="en-US" dirty="0"/>
               <a:pPr/>
-              <a:t>10/25/2016</a:t>
+              <a:t>11/4/2016</a:t>
             </a:fld>
             <a:endParaRPr lang="en-US" dirty="0"/>
           </a:p>
@@ -27190,7 +27231,7 @@
             <a:fld id="{B61BEF0D-F0BB-DE4B-95CE-6DB70DBA9567}" type="datetimeFigureOut">
               <a:rPr lang="en-US" dirty="0"/>
               <a:pPr/>
-              <a:t>10/25/2016</a:t>
+              <a:t>11/4/2016</a:t>
             </a:fld>
             <a:endParaRPr lang="en-US" dirty="0"/>
           </a:p>
@@ -27465,7 +27506,7 @@
             <a:fld id="{B61BEF0D-F0BB-DE4B-95CE-6DB70DBA9567}" type="datetimeFigureOut">
               <a:rPr lang="en-US" dirty="0"/>
               <a:pPr/>
-              <a:t>10/25/2016</a:t>
+              <a:t>11/4/2016</a:t>
             </a:fld>
             <a:endParaRPr lang="en-US" dirty="0"/>
           </a:p>
@@ -28030,7 +28071,7 @@
             <a:fld id="{B61BEF0D-F0BB-DE4B-95CE-6DB70DBA9567}" type="datetimeFigureOut">
               <a:rPr lang="en-US" dirty="0"/>
               <a:pPr/>
-              <a:t>10/25/2016</a:t>
+              <a:t>11/4/2016</a:t>
             </a:fld>
             <a:endParaRPr lang="en-US" dirty="0"/>
           </a:p>
@@ -28305,7 +28346,7 @@
             <a:fld id="{B61BEF0D-F0BB-DE4B-95CE-6DB70DBA9567}" type="datetimeFigureOut">
               <a:rPr lang="en-US" dirty="0"/>
               <a:pPr/>
-              <a:t>10/25/2016</a:t>
+              <a:t>11/4/2016</a:t>
             </a:fld>
             <a:endParaRPr lang="en-US" dirty="0"/>
           </a:p>
@@ -28864,7 +28905,7 @@
             <a:fld id="{B61BEF0D-F0BB-DE4B-95CE-6DB70DBA9567}" type="datetimeFigureOut">
               <a:rPr lang="en-US" dirty="0"/>
               <a:pPr/>
-              <a:t>10/25/2016</a:t>
+              <a:t>11/4/2016</a:t>
             </a:fld>
             <a:endParaRPr lang="en-US" dirty="0"/>
           </a:p>
@@ -29188,7 +29229,7 @@
             <a:fld id="{B61BEF0D-F0BB-DE4B-95CE-6DB70DBA9567}" type="datetimeFigureOut">
               <a:rPr lang="en-US" dirty="0"/>
               <a:pPr/>
-              <a:t>10/25/2016</a:t>
+              <a:t>11/4/2016</a:t>
             </a:fld>
             <a:endParaRPr lang="en-US" dirty="0"/>
           </a:p>
@@ -29362,7 +29403,7 @@
             <a:fld id="{B61BEF0D-F0BB-DE4B-95CE-6DB70DBA9567}" type="datetimeFigureOut">
               <a:rPr lang="en-US" dirty="0"/>
               <a:pPr/>
-              <a:t>10/25/2016</a:t>
+              <a:t>11/4/2016</a:t>
             </a:fld>
             <a:endParaRPr lang="en-US" dirty="0"/>
           </a:p>
@@ -29597,7 +29638,7 @@
             <a:fld id="{B61BEF0D-F0BB-DE4B-95CE-6DB70DBA9567}" type="datetimeFigureOut">
               <a:rPr lang="en-US" dirty="0"/>
               <a:pPr/>
-              <a:t>10/25/2016</a:t>
+              <a:t>11/4/2016</a:t>
             </a:fld>
             <a:endParaRPr lang="en-US" dirty="0"/>
           </a:p>
@@ -29794,7 +29835,7 @@
             <a:fld id="{B61BEF0D-F0BB-DE4B-95CE-6DB70DBA9567}" type="datetimeFigureOut">
               <a:rPr lang="en-US" dirty="0"/>
               <a:pPr/>
-              <a:t>10/25/2016</a:t>
+              <a:t>11/4/2016</a:t>
             </a:fld>
             <a:endParaRPr lang="en-US" dirty="0"/>
           </a:p>
@@ -30067,7 +30108,7 @@
             <a:fld id="{B61BEF0D-F0BB-DE4B-95CE-6DB70DBA9567}" type="datetimeFigureOut">
               <a:rPr lang="en-US" dirty="0"/>
               <a:pPr/>
-              <a:t>10/25/2016</a:t>
+              <a:t>11/4/2016</a:t>
             </a:fld>
             <a:endParaRPr lang="en-US" dirty="0"/>
           </a:p>
@@ -30330,7 +30371,7 @@
             <a:fld id="{B61BEF0D-F0BB-DE4B-95CE-6DB70DBA9567}" type="datetimeFigureOut">
               <a:rPr lang="en-US" dirty="0"/>
               <a:pPr/>
-              <a:t>10/25/2016</a:t>
+              <a:t>11/4/2016</a:t>
             </a:fld>
             <a:endParaRPr lang="en-US" dirty="0"/>
           </a:p>
@@ -30701,7 +30742,7 @@
             <a:fld id="{B61BEF0D-F0BB-DE4B-95CE-6DB70DBA9567}" type="datetimeFigureOut">
               <a:rPr lang="en-US" dirty="0"/>
               <a:pPr/>
-              <a:t>10/25/2016</a:t>
+              <a:t>11/4/2016</a:t>
             </a:fld>
             <a:endParaRPr lang="en-US" dirty="0"/>
           </a:p>
@@ -30846,7 +30887,7 @@
             <a:fld id="{B61BEF0D-F0BB-DE4B-95CE-6DB70DBA9567}" type="datetimeFigureOut">
               <a:rPr lang="en-US" dirty="0"/>
               <a:pPr/>
-              <a:t>10/25/2016</a:t>
+              <a:t>11/4/2016</a:t>
             </a:fld>
             <a:endParaRPr lang="en-US" dirty="0"/>
           </a:p>
@@ -30968,7 +31009,7 @@
             <a:fld id="{B61BEF0D-F0BB-DE4B-95CE-6DB70DBA9567}" type="datetimeFigureOut">
               <a:rPr lang="en-US" dirty="0"/>
               <a:pPr/>
-              <a:t>10/25/2016</a:t>
+              <a:t>11/4/2016</a:t>
             </a:fld>
             <a:endParaRPr lang="en-US" dirty="0"/>
           </a:p>
@@ -31250,7 +31291,7 @@
             <a:fld id="{B61BEF0D-F0BB-DE4B-95CE-6DB70DBA9567}" type="datetimeFigureOut">
               <a:rPr lang="en-US" dirty="0"/>
               <a:pPr/>
-              <a:t>10/25/2016</a:t>
+              <a:t>11/4/2016</a:t>
             </a:fld>
             <a:endParaRPr lang="en-US" dirty="0"/>
           </a:p>
@@ -31571,7 +31612,7 @@
             <a:fld id="{B61BEF0D-F0BB-DE4B-95CE-6DB70DBA9567}" type="datetimeFigureOut">
               <a:rPr lang="en-US" dirty="0"/>
               <a:pPr/>
-              <a:t>10/25/2016</a:t>
+              <a:t>11/4/2016</a:t>
             </a:fld>
             <a:endParaRPr lang="en-US" dirty="0"/>
           </a:p>
@@ -31782,7 +31823,7 @@
             <a:fld id="{B61BEF0D-F0BB-DE4B-95CE-6DB70DBA9567}" type="datetimeFigureOut">
               <a:rPr lang="en-US" dirty="0"/>
               <a:pPr/>
-              <a:t>10/25/2016</a:t>
+              <a:t>11/4/2016</a:t>
             </a:fld>
             <a:endParaRPr lang="en-US" dirty="0"/>
           </a:p>
@@ -34613,8 +34654,17 @@
               <a:rPr lang="en-US" dirty="0">
                 <a:latin typeface="Buxton Sketch" panose="03080500000500000004" pitchFamily="66" charset="0"/>
               </a:rPr>
-              <a:t>    Method Body</a:t>
-            </a:r>
+              <a:t>    Method </a:t>
+            </a:r>
+            <a:r>
+              <a:rPr lang="en-US" dirty="0" smtClean="0">
+                <a:latin typeface="Buxton Sketch" panose="03080500000500000004" pitchFamily="66" charset="0"/>
+              </a:rPr>
+              <a:t>Body Logic</a:t>
+            </a:r>
+            <a:endParaRPr lang="en-US" dirty="0">
+              <a:latin typeface="Buxton Sketch" panose="03080500000500000004" pitchFamily="66" charset="0"/>
+            </a:endParaRPr>
           </a:p>
           <a:p>
             <a:pPr lvl="0"/>

</xml_diff>

<commit_message>
Removed some unused data files.
</commit_message>
<xml_diff>
--- a/Course Overview.pptx
+++ b/Course Overview.pptx
@@ -5,7 +5,7 @@
     <p:sldMasterId id="2147483648" r:id="rId1"/>
   </p:sldMasterIdLst>
   <p:notesMasterIdLst>
-    <p:notesMasterId r:id="rId12"/>
+    <p:notesMasterId r:id="rId11"/>
   </p:notesMasterIdLst>
   <p:sldIdLst>
     <p:sldId id="256" r:id="rId2"/>
@@ -17,7 +17,6 @@
     <p:sldId id="261" r:id="rId8"/>
     <p:sldId id="262" r:id="rId9"/>
     <p:sldId id="264" r:id="rId10"/>
-    <p:sldId id="265" r:id="rId11"/>
   </p:sldIdLst>
   <p:sldSz cx="12192000" cy="6858000"/>
   <p:notesSz cx="6858000" cy="9144000"/>
@@ -130,11 +129,6 @@
             <p14:sldId id="261"/>
             <p14:sldId id="262"/>
             <p14:sldId id="264"/>
-          </p14:sldIdLst>
-        </p14:section>
-        <p14:section name="Exc 2" id="{63ECFD2D-D4E3-4657-820A-BAF01DFDB71D}">
-          <p14:sldIdLst>
-            <p14:sldId id="265"/>
           </p14:sldIdLst>
         </p14:section>
       </p14:sectionLst>
@@ -7308,25 +7302,7 @@
               </a:solidFill>
               <a:latin typeface="Constantia" panose="02030602050306030303" pitchFamily="18" charset="0"/>
             </a:rPr>
-            <a:t>- Comparison, Binary</a:t>
-          </a:r>
-          <a:r>
-            <a:rPr lang="en-US" sz="1600" dirty="0" smtClean="0">
-              <a:solidFill>
-                <a:schemeClr val="tx1"/>
-              </a:solidFill>
-              <a:latin typeface="Constantia" panose="02030602050306030303" pitchFamily="18" charset="0"/>
-            </a:rPr>
-            <a:t>, Concatenation </a:t>
-          </a:r>
-          <a:r>
-            <a:rPr lang="en-US" sz="1600" dirty="0" smtClean="0">
-              <a:solidFill>
-                <a:schemeClr val="tx1"/>
-              </a:solidFill>
-              <a:latin typeface="Constantia" panose="02030602050306030303" pitchFamily="18" charset="0"/>
-            </a:rPr>
-            <a:t>…</a:t>
+            <a:t>- Comparison, Binary, Concatenation …</a:t>
           </a:r>
           <a:endParaRPr lang="en-US" sz="1600" dirty="0" smtClean="0">
             <a:solidFill>
@@ -8530,22 +8506,22 @@
     </dgm:pt>
   </dgm:ptLst>
   <dgm:cxnLst>
+    <dgm:cxn modelId="{89668738-4A06-48A0-ADA1-E81F63ABA142}" srcId="{5DBF101F-0F35-4E21-834F-2D0370F875E2}" destId="{3C212A25-0B13-4130-B138-D80FD13744A6}" srcOrd="2" destOrd="0" parTransId="{43412D1B-5E60-443A-8E70-DE9D4E704809}" sibTransId="{7EEE66FA-BF9A-43A0-ADA2-FE1F6E1855D7}"/>
+    <dgm:cxn modelId="{82993F7F-9375-4623-BE0F-E11A2ED881FC}" type="presOf" srcId="{3C212A25-0B13-4130-B138-D80FD13744A6}" destId="{254D17AE-BCFB-4A21-A1FA-06E9765EE69A}" srcOrd="1" destOrd="0" presId="urn:microsoft.com/office/officeart/2005/8/layout/orgChart1"/>
+    <dgm:cxn modelId="{823C09DF-4066-4185-B4D2-80B89A1FF3CD}" srcId="{5DBF101F-0F35-4E21-834F-2D0370F875E2}" destId="{ED15561D-56C1-4B97-A225-B17AD9CFFD83}" srcOrd="1" destOrd="0" parTransId="{7D06307E-E72D-4C92-B922-9BC1410121D5}" sibTransId="{E6125EE4-66B5-47EC-B065-D7DAACD1A343}"/>
+    <dgm:cxn modelId="{FB50C092-1AC6-447A-8ECA-B92D7932BA37}" type="presOf" srcId="{ED15561D-56C1-4B97-A225-B17AD9CFFD83}" destId="{523C265F-BF3E-45A7-97E7-3CB6F72BBFF0}" srcOrd="0" destOrd="0" presId="urn:microsoft.com/office/officeart/2005/8/layout/orgChart1"/>
+    <dgm:cxn modelId="{B01D91DC-554F-453D-9B9C-0287793FEF7A}" type="presOf" srcId="{3C212A25-0B13-4130-B138-D80FD13744A6}" destId="{FB88D22D-616A-4763-8730-376C7E899E79}" srcOrd="0" destOrd="0" presId="urn:microsoft.com/office/officeart/2005/8/layout/orgChart1"/>
     <dgm:cxn modelId="{F70BC46C-C4E5-4BDD-AB2F-E6392A25640C}" srcId="{9F0C14E1-5E31-4BFB-93EF-64A72EB696B4}" destId="{5DBF101F-0F35-4E21-834F-2D0370F875E2}" srcOrd="0" destOrd="0" parTransId="{DFB5525A-85FE-4DD0-9919-DA9F0CCF7FC1}" sibTransId="{AB19A77E-F43A-4193-A579-3E00E108D152}"/>
-    <dgm:cxn modelId="{89668738-4A06-48A0-ADA1-E81F63ABA142}" srcId="{5DBF101F-0F35-4E21-834F-2D0370F875E2}" destId="{3C212A25-0B13-4130-B138-D80FD13744A6}" srcOrd="2" destOrd="0" parTransId="{43412D1B-5E60-443A-8E70-DE9D4E704809}" sibTransId="{7EEE66FA-BF9A-43A0-ADA2-FE1F6E1855D7}"/>
-    <dgm:cxn modelId="{FB50C092-1AC6-447A-8ECA-B92D7932BA37}" type="presOf" srcId="{ED15561D-56C1-4B97-A225-B17AD9CFFD83}" destId="{523C265F-BF3E-45A7-97E7-3CB6F72BBFF0}" srcOrd="0" destOrd="0" presId="urn:microsoft.com/office/officeart/2005/8/layout/orgChart1"/>
-    <dgm:cxn modelId="{823C09DF-4066-4185-B4D2-80B89A1FF3CD}" srcId="{5DBF101F-0F35-4E21-834F-2D0370F875E2}" destId="{ED15561D-56C1-4B97-A225-B17AD9CFFD83}" srcOrd="1" destOrd="0" parTransId="{7D06307E-E72D-4C92-B922-9BC1410121D5}" sibTransId="{E6125EE4-66B5-47EC-B065-D7DAACD1A343}"/>
+    <dgm:cxn modelId="{FD7431D9-52DC-4CFA-A587-3A5E27E8B047}" type="presOf" srcId="{FE303ED2-E91E-412E-9437-9D310539077B}" destId="{2614E269-8295-4197-BB5E-0D078F5030B2}" srcOrd="0" destOrd="0" presId="urn:microsoft.com/office/officeart/2005/8/layout/orgChart1"/>
+    <dgm:cxn modelId="{7C4B19F7-C135-41D5-8E39-013674826154}" type="presOf" srcId="{5DBF101F-0F35-4E21-834F-2D0370F875E2}" destId="{0359D7AD-5B93-4C43-9D98-56774F0D5194}" srcOrd="0" destOrd="0" presId="urn:microsoft.com/office/officeart/2005/8/layout/orgChart1"/>
+    <dgm:cxn modelId="{B98E2DD1-8CE7-407C-8B1A-1A31AFF5E217}" type="presOf" srcId="{FE303ED2-E91E-412E-9437-9D310539077B}" destId="{A906F8A3-A092-4062-9F84-7013F75341DA}" srcOrd="1" destOrd="0" presId="urn:microsoft.com/office/officeart/2005/8/layout/orgChart1"/>
+    <dgm:cxn modelId="{510C79DE-9E9F-4DC0-BC46-80BEFBF40866}" type="presOf" srcId="{67DCA957-B2F3-41EA-A1D6-69F2974D19A1}" destId="{C737B84A-2ADA-4BBE-9EAC-51D285811437}" srcOrd="0" destOrd="0" presId="urn:microsoft.com/office/officeart/2005/8/layout/orgChart1"/>
+    <dgm:cxn modelId="{BBD27F77-7864-43DF-9B2E-BCB603876EED}" type="presOf" srcId="{7D06307E-E72D-4C92-B922-9BC1410121D5}" destId="{28B83FEF-8929-4CA9-AA29-351DB9B1E4DC}" srcOrd="0" destOrd="0" presId="urn:microsoft.com/office/officeart/2005/8/layout/orgChart1"/>
     <dgm:cxn modelId="{FD365F2F-1A42-4B78-9ED5-1E84BD2A971D}" type="presOf" srcId="{9F0C14E1-5E31-4BFB-93EF-64A72EB696B4}" destId="{5D0B09FB-389A-42B8-9F76-AC54AAB7446D}" srcOrd="0" destOrd="0" presId="urn:microsoft.com/office/officeart/2005/8/layout/orgChart1"/>
-    <dgm:cxn modelId="{510C79DE-9E9F-4DC0-BC46-80BEFBF40866}" type="presOf" srcId="{67DCA957-B2F3-41EA-A1D6-69F2974D19A1}" destId="{C737B84A-2ADA-4BBE-9EAC-51D285811437}" srcOrd="0" destOrd="0" presId="urn:microsoft.com/office/officeart/2005/8/layout/orgChart1"/>
+    <dgm:cxn modelId="{79623BA5-3EE9-492F-9F67-A7A2848E39D4}" type="presOf" srcId="{ED15561D-56C1-4B97-A225-B17AD9CFFD83}" destId="{A5CF2B70-2E8B-4780-B74F-7777095946AC}" srcOrd="1" destOrd="0" presId="urn:microsoft.com/office/officeart/2005/8/layout/orgChart1"/>
+    <dgm:cxn modelId="{354ECFAA-0650-4348-9089-A5F0F4D0486F}" srcId="{5DBF101F-0F35-4E21-834F-2D0370F875E2}" destId="{FE303ED2-E91E-412E-9437-9D310539077B}" srcOrd="0" destOrd="0" parTransId="{67DCA957-B2F3-41EA-A1D6-69F2974D19A1}" sibTransId="{CE3C1A84-FDCD-4933-B8BB-69E7736BF902}"/>
     <dgm:cxn modelId="{9535BF3E-6D47-4915-8F7D-26552F5214B9}" type="presOf" srcId="{43412D1B-5E60-443A-8E70-DE9D4E704809}" destId="{F2FABC0A-7D27-41B6-A5B2-1681964D3E93}" srcOrd="0" destOrd="0" presId="urn:microsoft.com/office/officeart/2005/8/layout/orgChart1"/>
-    <dgm:cxn modelId="{BBD27F77-7864-43DF-9B2E-BCB603876EED}" type="presOf" srcId="{7D06307E-E72D-4C92-B922-9BC1410121D5}" destId="{28B83FEF-8929-4CA9-AA29-351DB9B1E4DC}" srcOrd="0" destOrd="0" presId="urn:microsoft.com/office/officeart/2005/8/layout/orgChart1"/>
-    <dgm:cxn modelId="{B98E2DD1-8CE7-407C-8B1A-1A31AFF5E217}" type="presOf" srcId="{FE303ED2-E91E-412E-9437-9D310539077B}" destId="{A906F8A3-A092-4062-9F84-7013F75341DA}" srcOrd="1" destOrd="0" presId="urn:microsoft.com/office/officeart/2005/8/layout/orgChart1"/>
-    <dgm:cxn modelId="{79623BA5-3EE9-492F-9F67-A7A2848E39D4}" type="presOf" srcId="{ED15561D-56C1-4B97-A225-B17AD9CFFD83}" destId="{A5CF2B70-2E8B-4780-B74F-7777095946AC}" srcOrd="1" destOrd="0" presId="urn:microsoft.com/office/officeart/2005/8/layout/orgChart1"/>
     <dgm:cxn modelId="{12598B40-AE2D-4BF4-A65C-B4CC62CF6BAA}" type="presOf" srcId="{5DBF101F-0F35-4E21-834F-2D0370F875E2}" destId="{0F3F96D0-4A8B-4629-A505-534193085623}" srcOrd="1" destOrd="0" presId="urn:microsoft.com/office/officeart/2005/8/layout/orgChart1"/>
-    <dgm:cxn modelId="{FD7431D9-52DC-4CFA-A587-3A5E27E8B047}" type="presOf" srcId="{FE303ED2-E91E-412E-9437-9D310539077B}" destId="{2614E269-8295-4197-BB5E-0D078F5030B2}" srcOrd="0" destOrd="0" presId="urn:microsoft.com/office/officeart/2005/8/layout/orgChart1"/>
-    <dgm:cxn modelId="{82993F7F-9375-4623-BE0F-E11A2ED881FC}" type="presOf" srcId="{3C212A25-0B13-4130-B138-D80FD13744A6}" destId="{254D17AE-BCFB-4A21-A1FA-06E9765EE69A}" srcOrd="1" destOrd="0" presId="urn:microsoft.com/office/officeart/2005/8/layout/orgChart1"/>
-    <dgm:cxn modelId="{7C4B19F7-C135-41D5-8E39-013674826154}" type="presOf" srcId="{5DBF101F-0F35-4E21-834F-2D0370F875E2}" destId="{0359D7AD-5B93-4C43-9D98-56774F0D5194}" srcOrd="0" destOrd="0" presId="urn:microsoft.com/office/officeart/2005/8/layout/orgChart1"/>
-    <dgm:cxn modelId="{354ECFAA-0650-4348-9089-A5F0F4D0486F}" srcId="{5DBF101F-0F35-4E21-834F-2D0370F875E2}" destId="{FE303ED2-E91E-412E-9437-9D310539077B}" srcOrd="0" destOrd="0" parTransId="{67DCA957-B2F3-41EA-A1D6-69F2974D19A1}" sibTransId="{CE3C1A84-FDCD-4933-B8BB-69E7736BF902}"/>
-    <dgm:cxn modelId="{B01D91DC-554F-453D-9B9C-0287793FEF7A}" type="presOf" srcId="{3C212A25-0B13-4130-B138-D80FD13744A6}" destId="{FB88D22D-616A-4763-8730-376C7E899E79}" srcOrd="0" destOrd="0" presId="urn:microsoft.com/office/officeart/2005/8/layout/orgChart1"/>
     <dgm:cxn modelId="{F3D59A19-B586-4E2E-B3DD-350E8083E5C6}" type="presParOf" srcId="{5D0B09FB-389A-42B8-9F76-AC54AAB7446D}" destId="{AF9557CA-7D0B-407C-B122-3806D3B80045}" srcOrd="0" destOrd="0" presId="urn:microsoft.com/office/officeart/2005/8/layout/orgChart1"/>
     <dgm:cxn modelId="{8CD5B951-A4B9-482B-984E-327DC9B435E8}" type="presParOf" srcId="{AF9557CA-7D0B-407C-B122-3806D3B80045}" destId="{C76704DA-2A6C-4F8D-B746-4F85018CD45A}" srcOrd="0" destOrd="0" presId="urn:microsoft.com/office/officeart/2005/8/layout/orgChart1"/>
     <dgm:cxn modelId="{EA691761-E62C-48CB-8E95-889D13D86C94}" type="presParOf" srcId="{C76704DA-2A6C-4F8D-B746-4F85018CD45A}" destId="{0359D7AD-5B93-4C43-9D98-56774F0D5194}" srcOrd="0" destOrd="0" presId="urn:microsoft.com/office/officeart/2005/8/layout/orgChart1"/>
@@ -8599,26 +8575,29 @@
       </dgm:t>
     </dgm:pt>
     <dgm:pt modelId="{05669515-C7AD-43E7-93DA-C37464BD057F}">
-      <dgm:prSet phldrT="[Text]"/>
+      <dgm:prSet phldrT="[Text]" custT="1"/>
       <dgm:spPr/>
       <dgm:t>
         <a:bodyPr/>
         <a:lstStyle/>
         <a:p>
+          <a:pPr algn="ctr"/>
           <a:r>
-            <a:rPr lang="en-US" dirty="0" smtClean="0">
+            <a:rPr lang="en-US" sz="4000" dirty="0" smtClean="0">
               <a:solidFill>
                 <a:srgbClr val="FFFF00"/>
               </a:solidFill>
-              <a:latin typeface="Informal Roman" panose="030604020304060B0204" pitchFamily="66" charset="0"/>
+              <a:latin typeface="Cambria Math" panose="02040503050406030204" pitchFamily="18" charset="0"/>
+              <a:ea typeface="Cambria Math" panose="02040503050406030204" pitchFamily="18" charset="0"/>
             </a:rPr>
             <a:t>Loops</a:t>
           </a:r>
-          <a:endParaRPr lang="en-US" dirty="0">
+          <a:endParaRPr lang="en-US" sz="4000" dirty="0">
             <a:solidFill>
               <a:srgbClr val="FFFF00"/>
             </a:solidFill>
-            <a:latin typeface="Informal Roman" panose="030604020304060B0204" pitchFamily="66" charset="0"/>
+            <a:latin typeface="Cambria Math" panose="02040503050406030204" pitchFamily="18" charset="0"/>
+            <a:ea typeface="Cambria Math" panose="02040503050406030204" pitchFamily="18" charset="0"/>
           </a:endParaRPr>
         </a:p>
       </dgm:t>
@@ -8652,22 +8631,24 @@
         <a:bodyPr/>
         <a:lstStyle/>
         <a:p>
-          <a:pPr algn="ctr"/>
-          <a:endParaRPr lang="en-US" sz="2800" dirty="0" smtClean="0">
+          <a:pPr algn="l"/>
+          <a:endParaRPr lang="en-US" sz="1800" dirty="0" smtClean="0">
             <a:solidFill>
               <a:srgbClr val="FFFF00"/>
             </a:solidFill>
-            <a:latin typeface="Buxton Sketch" panose="03080500000500000004" pitchFamily="66" charset="0"/>
+            <a:latin typeface="Cambria Math" panose="02040503050406030204" pitchFamily="18" charset="0"/>
+            <a:ea typeface="Cambria Math" panose="02040503050406030204" pitchFamily="18" charset="0"/>
           </a:endParaRPr>
         </a:p>
         <a:p>
-          <a:pPr algn="ctr"/>
+          <a:pPr algn="l"/>
           <a:r>
-            <a:rPr lang="en-US" sz="2800" dirty="0" smtClean="0">
+            <a:rPr lang="en-US" sz="1800" dirty="0" smtClean="0">
               <a:solidFill>
                 <a:srgbClr val="FFFF00"/>
               </a:solidFill>
-              <a:latin typeface="Buxton Sketch" panose="03080500000500000004" pitchFamily="66" charset="0"/>
+              <a:latin typeface="Cambria Math" panose="02040503050406030204" pitchFamily="18" charset="0"/>
+              <a:ea typeface="Cambria Math" panose="02040503050406030204" pitchFamily="18" charset="0"/>
             </a:rPr>
             <a:t>While Loops</a:t>
           </a:r>
@@ -8675,44 +8656,50 @@
         <a:p>
           <a:pPr algn="l"/>
           <a:r>
-            <a:rPr lang="en-US" sz="2000" dirty="0" smtClean="0">
-              <a:latin typeface="Buxton Sketch" panose="03080500000500000004" pitchFamily="66" charset="0"/>
+            <a:rPr lang="en-US" sz="1800" dirty="0" smtClean="0">
+              <a:latin typeface="Cambria Math" panose="02040503050406030204" pitchFamily="18" charset="0"/>
+              <a:ea typeface="Cambria Math" panose="02040503050406030204" pitchFamily="18" charset="0"/>
             </a:rPr>
             <a:t>string </a:t>
           </a:r>
           <a:r>
-            <a:rPr lang="en-US" sz="2000" dirty="0" err="1" smtClean="0">
+            <a:rPr lang="en-US" sz="1800" dirty="0" err="1" smtClean="0">
               <a:solidFill>
                 <a:srgbClr val="00B0F0"/>
               </a:solidFill>
-              <a:latin typeface="Buxton Sketch" panose="03080500000500000004" pitchFamily="66" charset="0"/>
+              <a:latin typeface="Cambria Math" panose="02040503050406030204" pitchFamily="18" charset="0"/>
+              <a:ea typeface="Cambria Math" panose="02040503050406030204" pitchFamily="18" charset="0"/>
             </a:rPr>
             <a:t>myName</a:t>
           </a:r>
           <a:r>
-            <a:rPr lang="en-US" sz="2000" dirty="0" smtClean="0">
-              <a:latin typeface="Buxton Sketch" panose="03080500000500000004" pitchFamily="66" charset="0"/>
+            <a:rPr lang="en-US" sz="1800" dirty="0" smtClean="0">
+              <a:latin typeface="Cambria Math" panose="02040503050406030204" pitchFamily="18" charset="0"/>
+              <a:ea typeface="Cambria Math" panose="02040503050406030204" pitchFamily="18" charset="0"/>
             </a:rPr>
             <a:t> = </a:t>
           </a:r>
           <a:r>
-            <a:rPr lang="en-US" sz="2000" dirty="0" err="1" smtClean="0">
+            <a:rPr lang="en-US" sz="1800" dirty="0" err="1" smtClean="0">
               <a:solidFill>
                 <a:srgbClr val="00B050"/>
               </a:solidFill>
-              <a:latin typeface="Buxton Sketch" panose="03080500000500000004" pitchFamily="66" charset="0"/>
+              <a:latin typeface="Cambria Math" panose="02040503050406030204" pitchFamily="18" charset="0"/>
+              <a:ea typeface="Cambria Math" panose="02040503050406030204" pitchFamily="18" charset="0"/>
             </a:rPr>
             <a:t>Console</a:t>
           </a:r>
           <a:r>
-            <a:rPr lang="en-US" sz="2000" dirty="0" err="1" smtClean="0">
-              <a:latin typeface="Buxton Sketch" panose="03080500000500000004" pitchFamily="66" charset="0"/>
+            <a:rPr lang="en-US" sz="1800" dirty="0" err="1" smtClean="0">
+              <a:latin typeface="Cambria Math" panose="02040503050406030204" pitchFamily="18" charset="0"/>
+              <a:ea typeface="Cambria Math" panose="02040503050406030204" pitchFamily="18" charset="0"/>
             </a:rPr>
             <a:t>.ReadLine</a:t>
           </a:r>
           <a:r>
-            <a:rPr lang="en-US" sz="2000" dirty="0" smtClean="0">
-              <a:latin typeface="Buxton Sketch" panose="03080500000500000004" pitchFamily="66" charset="0"/>
+            <a:rPr lang="en-US" sz="1800" dirty="0" smtClean="0">
+              <a:latin typeface="Cambria Math" panose="02040503050406030204" pitchFamily="18" charset="0"/>
+              <a:ea typeface="Cambria Math" panose="02040503050406030204" pitchFamily="18" charset="0"/>
             </a:rPr>
             <a:t>();</a:t>
           </a:r>
@@ -8720,23 +8707,26 @@
         <a:p>
           <a:pPr algn="l"/>
           <a:r>
-            <a:rPr lang="en-US" sz="2000" dirty="0" smtClean="0">
-              <a:latin typeface="Buxton Sketch" panose="03080500000500000004" pitchFamily="66" charset="0"/>
+            <a:rPr lang="en-US" sz="1800" dirty="0" smtClean="0">
+              <a:latin typeface="Cambria Math" panose="02040503050406030204" pitchFamily="18" charset="0"/>
+              <a:ea typeface="Cambria Math" panose="02040503050406030204" pitchFamily="18" charset="0"/>
             </a:rPr>
             <a:t>while(</a:t>
           </a:r>
           <a:r>
-            <a:rPr lang="en-US" sz="2000" dirty="0" err="1" smtClean="0">
+            <a:rPr lang="en-US" sz="1800" dirty="0" err="1" smtClean="0">
               <a:solidFill>
                 <a:srgbClr val="00B0F0"/>
               </a:solidFill>
-              <a:latin typeface="Buxton Sketch" panose="03080500000500000004" pitchFamily="66" charset="0"/>
+              <a:latin typeface="Cambria Math" panose="02040503050406030204" pitchFamily="18" charset="0"/>
+              <a:ea typeface="Cambria Math" panose="02040503050406030204" pitchFamily="18" charset="0"/>
             </a:rPr>
             <a:t>myName</a:t>
           </a:r>
           <a:r>
-            <a:rPr lang="en-US" sz="2000" dirty="0" smtClean="0">
-              <a:latin typeface="Buxton Sketch" panose="03080500000500000004" pitchFamily="66" charset="0"/>
+            <a:rPr lang="en-US" sz="1800" dirty="0" smtClean="0">
+              <a:latin typeface="Cambria Math" panose="02040503050406030204" pitchFamily="18" charset="0"/>
+              <a:ea typeface="Cambria Math" panose="02040503050406030204" pitchFamily="18" charset="0"/>
             </a:rPr>
             <a:t> != “Bugs Bunny”)</a:t>
           </a:r>
@@ -8744,8 +8734,9 @@
         <a:p>
           <a:pPr algn="l"/>
           <a:r>
-            <a:rPr lang="en-US" sz="2000" dirty="0" smtClean="0">
-              <a:latin typeface="Buxton Sketch" panose="03080500000500000004" pitchFamily="66" charset="0"/>
+            <a:rPr lang="en-US" sz="1800" dirty="0" smtClean="0">
+              <a:latin typeface="Cambria Math" panose="02040503050406030204" pitchFamily="18" charset="0"/>
+              <a:ea typeface="Cambria Math" panose="02040503050406030204" pitchFamily="18" charset="0"/>
             </a:rPr>
             <a:t>{</a:t>
           </a:r>
@@ -8753,29 +8744,33 @@
         <a:p>
           <a:pPr algn="l"/>
           <a:r>
-            <a:rPr lang="en-US" sz="2000" dirty="0" smtClean="0">
-              <a:latin typeface="Buxton Sketch" panose="03080500000500000004" pitchFamily="66" charset="0"/>
+            <a:rPr lang="en-US" sz="1800" dirty="0" smtClean="0">
+              <a:latin typeface="Cambria Math" panose="02040503050406030204" pitchFamily="18" charset="0"/>
+              <a:ea typeface="Cambria Math" panose="02040503050406030204" pitchFamily="18" charset="0"/>
             </a:rPr>
             <a:t>    </a:t>
           </a:r>
           <a:r>
-            <a:rPr lang="en-US" sz="2000" dirty="0" err="1" smtClean="0">
+            <a:rPr lang="en-US" sz="1800" dirty="0" err="1" smtClean="0">
               <a:solidFill>
                 <a:srgbClr val="00B050"/>
               </a:solidFill>
-              <a:latin typeface="Buxton Sketch" panose="03080500000500000004" pitchFamily="66" charset="0"/>
+              <a:latin typeface="Cambria Math" panose="02040503050406030204" pitchFamily="18" charset="0"/>
+              <a:ea typeface="Cambria Math" panose="02040503050406030204" pitchFamily="18" charset="0"/>
             </a:rPr>
             <a:t>Console</a:t>
           </a:r>
           <a:r>
-            <a:rPr lang="en-US" sz="2000" dirty="0" err="1" smtClean="0">
-              <a:latin typeface="Buxton Sketch" panose="03080500000500000004" pitchFamily="66" charset="0"/>
+            <a:rPr lang="en-US" sz="1800" dirty="0" err="1" smtClean="0">
+              <a:latin typeface="Cambria Math" panose="02040503050406030204" pitchFamily="18" charset="0"/>
+              <a:ea typeface="Cambria Math" panose="02040503050406030204" pitchFamily="18" charset="0"/>
             </a:rPr>
             <a:t>.WriteLine</a:t>
           </a:r>
           <a:r>
-            <a:rPr lang="en-US" sz="2000" dirty="0" smtClean="0">
-              <a:latin typeface="Buxton Sketch" panose="03080500000500000004" pitchFamily="66" charset="0"/>
+            <a:rPr lang="en-US" sz="1800" dirty="0" smtClean="0">
+              <a:latin typeface="Cambria Math" panose="02040503050406030204" pitchFamily="18" charset="0"/>
+              <a:ea typeface="Cambria Math" panose="02040503050406030204" pitchFamily="18" charset="0"/>
             </a:rPr>
             <a:t>(“Enter your name!”);</a:t>
           </a:r>
@@ -8783,44 +8778,50 @@
         <a:p>
           <a:pPr algn="l"/>
           <a:r>
-            <a:rPr lang="en-US" sz="2000" dirty="0" smtClean="0">
-              <a:latin typeface="Buxton Sketch" panose="03080500000500000004" pitchFamily="66" charset="0"/>
+            <a:rPr lang="en-US" sz="1800" dirty="0" smtClean="0">
+              <a:latin typeface="Cambria Math" panose="02040503050406030204" pitchFamily="18" charset="0"/>
+              <a:ea typeface="Cambria Math" panose="02040503050406030204" pitchFamily="18" charset="0"/>
             </a:rPr>
             <a:t>    </a:t>
           </a:r>
           <a:r>
-            <a:rPr lang="en-US" sz="2000" dirty="0" err="1" smtClean="0">
+            <a:rPr lang="en-US" sz="1800" dirty="0" err="1" smtClean="0">
               <a:solidFill>
                 <a:srgbClr val="00B0F0"/>
               </a:solidFill>
-              <a:latin typeface="Buxton Sketch" panose="03080500000500000004" pitchFamily="66" charset="0"/>
+              <a:latin typeface="Cambria Math" panose="02040503050406030204" pitchFamily="18" charset="0"/>
+              <a:ea typeface="Cambria Math" panose="02040503050406030204" pitchFamily="18" charset="0"/>
             </a:rPr>
             <a:t>myName</a:t>
           </a:r>
           <a:r>
-            <a:rPr lang="en-US" sz="2000" dirty="0" smtClean="0">
-              <a:latin typeface="Buxton Sketch" panose="03080500000500000004" pitchFamily="66" charset="0"/>
+            <a:rPr lang="en-US" sz="1800" dirty="0" smtClean="0">
+              <a:latin typeface="Cambria Math" panose="02040503050406030204" pitchFamily="18" charset="0"/>
+              <a:ea typeface="Cambria Math" panose="02040503050406030204" pitchFamily="18" charset="0"/>
             </a:rPr>
             <a:t> = </a:t>
           </a:r>
           <a:r>
-            <a:rPr lang="en-US" sz="2000" dirty="0" err="1" smtClean="0">
+            <a:rPr lang="en-US" sz="1800" dirty="0" err="1" smtClean="0">
               <a:solidFill>
                 <a:srgbClr val="00B050"/>
               </a:solidFill>
-              <a:latin typeface="Buxton Sketch" panose="03080500000500000004" pitchFamily="66" charset="0"/>
+              <a:latin typeface="Cambria Math" panose="02040503050406030204" pitchFamily="18" charset="0"/>
+              <a:ea typeface="Cambria Math" panose="02040503050406030204" pitchFamily="18" charset="0"/>
             </a:rPr>
             <a:t>Console</a:t>
           </a:r>
           <a:r>
-            <a:rPr lang="en-US" sz="2000" dirty="0" err="1" smtClean="0">
-              <a:latin typeface="Buxton Sketch" panose="03080500000500000004" pitchFamily="66" charset="0"/>
+            <a:rPr lang="en-US" sz="1800" dirty="0" err="1" smtClean="0">
+              <a:latin typeface="Cambria Math" panose="02040503050406030204" pitchFamily="18" charset="0"/>
+              <a:ea typeface="Cambria Math" panose="02040503050406030204" pitchFamily="18" charset="0"/>
             </a:rPr>
             <a:t>.ReadLIne</a:t>
           </a:r>
           <a:r>
-            <a:rPr lang="en-US" sz="2000" dirty="0" smtClean="0">
-              <a:latin typeface="Buxton Sketch" panose="03080500000500000004" pitchFamily="66" charset="0"/>
+            <a:rPr lang="en-US" sz="1800" dirty="0" smtClean="0">
+              <a:latin typeface="Cambria Math" panose="02040503050406030204" pitchFamily="18" charset="0"/>
+              <a:ea typeface="Cambria Math" panose="02040503050406030204" pitchFamily="18" charset="0"/>
             </a:rPr>
             <a:t>();	</a:t>
           </a:r>
@@ -8828,16 +8829,18 @@
         <a:p>
           <a:pPr algn="l"/>
           <a:r>
-            <a:rPr lang="en-US" sz="2000" dirty="0" smtClean="0">
-              <a:latin typeface="Buxton Sketch" panose="03080500000500000004" pitchFamily="66" charset="0"/>
+            <a:rPr lang="en-US" sz="1800" dirty="0" smtClean="0">
+              <a:latin typeface="Cambria Math" panose="02040503050406030204" pitchFamily="18" charset="0"/>
+              <a:ea typeface="Cambria Math" panose="02040503050406030204" pitchFamily="18" charset="0"/>
             </a:rPr>
             <a:t>}</a:t>
           </a:r>
         </a:p>
         <a:p>
-          <a:pPr algn="ctr"/>
-          <a:endParaRPr lang="en-US" sz="2800" dirty="0">
-            <a:latin typeface="Buxton Sketch" panose="03080500000500000004" pitchFamily="66" charset="0"/>
+          <a:pPr algn="l"/>
+          <a:endParaRPr lang="en-US" sz="1800" dirty="0">
+            <a:latin typeface="Cambria Math" panose="02040503050406030204" pitchFamily="18" charset="0"/>
+            <a:ea typeface="Cambria Math" panose="02040503050406030204" pitchFamily="18" charset="0"/>
           </a:endParaRPr>
         </a:p>
       </dgm:t>
@@ -8849,7 +8852,11 @@
         <a:bodyPr/>
         <a:lstStyle/>
         <a:p>
-          <a:endParaRPr lang="en-US"/>
+          <a:pPr algn="l"/>
+          <a:endParaRPr lang="en-US" sz="1800">
+            <a:latin typeface="Cambria Math" panose="02040503050406030204" pitchFamily="18" charset="0"/>
+            <a:ea typeface="Cambria Math" panose="02040503050406030204" pitchFamily="18" charset="0"/>
+          </a:endParaRPr>
         </a:p>
       </dgm:t>
     </dgm:pt>
@@ -8871,70 +8878,102 @@
         <a:bodyPr/>
         <a:lstStyle/>
         <a:p>
-          <a:endParaRPr lang="en-US" sz="3200" dirty="0" smtClean="0">
+          <a:pPr algn="l"/>
+          <a:endParaRPr lang="en-US" sz="1800" dirty="0" smtClean="0">
             <a:solidFill>
               <a:srgbClr val="FFFF00"/>
             </a:solidFill>
-            <a:latin typeface="Buxton Sketch" panose="03080500000500000004" pitchFamily="66" charset="0"/>
+            <a:latin typeface="Cambria Math" panose="02040503050406030204" pitchFamily="18" charset="0"/>
+            <a:ea typeface="Cambria Math" panose="02040503050406030204" pitchFamily="18" charset="0"/>
           </a:endParaRPr>
         </a:p>
         <a:p>
+          <a:pPr algn="ctr"/>
           <a:r>
-            <a:rPr lang="en-US" sz="2800" dirty="0" smtClean="0">
+            <a:rPr lang="en-US" sz="1800" dirty="0" smtClean="0">
               <a:solidFill>
                 <a:srgbClr val="FFFF00"/>
               </a:solidFill>
-              <a:latin typeface="Buxton Sketch" panose="03080500000500000004" pitchFamily="66" charset="0"/>
+              <a:latin typeface="Cambria Math" panose="02040503050406030204" pitchFamily="18" charset="0"/>
+              <a:ea typeface="Cambria Math" panose="02040503050406030204" pitchFamily="18" charset="0"/>
             </a:rPr>
             <a:t>Do-While Loops</a:t>
           </a:r>
         </a:p>
         <a:p>
+          <a:pPr algn="ctr"/>
           <a:r>
-            <a:rPr lang="en-US" sz="2800" dirty="0" err="1" smtClean="0">
+            <a:rPr lang="en-US" sz="1800" dirty="0" err="1" smtClean="0">
               <a:solidFill>
                 <a:srgbClr val="FFFF00"/>
               </a:solidFill>
-              <a:latin typeface="Buxton Sketch" panose="03080500000500000004" pitchFamily="66" charset="0"/>
+              <a:latin typeface="Cambria Math" panose="02040503050406030204" pitchFamily="18" charset="0"/>
+              <a:ea typeface="Cambria Math" panose="02040503050406030204" pitchFamily="18" charset="0"/>
             </a:rPr>
             <a:t>Foreach</a:t>
           </a:r>
           <a:r>
-            <a:rPr lang="en-US" sz="2800" dirty="0" smtClean="0">
+            <a:rPr lang="en-US" sz="1800" dirty="0" smtClean="0">
               <a:solidFill>
                 <a:srgbClr val="FFFF00"/>
               </a:solidFill>
-              <a:latin typeface="Buxton Sketch" panose="03080500000500000004" pitchFamily="66" charset="0"/>
+              <a:latin typeface="Cambria Math" panose="02040503050406030204" pitchFamily="18" charset="0"/>
+              <a:ea typeface="Cambria Math" panose="02040503050406030204" pitchFamily="18" charset="0"/>
             </a:rPr>
             <a:t> Loop</a:t>
           </a:r>
         </a:p>
         <a:p>
+          <a:pPr algn="ctr"/>
           <a:r>
-            <a:rPr lang="en-US" sz="2800" dirty="0" smtClean="0">
+            <a:rPr lang="en-US" sz="1800" dirty="0" smtClean="0">
               <a:solidFill>
                 <a:srgbClr val="FFFF00"/>
               </a:solidFill>
-              <a:latin typeface="Buxton Sketch" panose="03080500000500000004" pitchFamily="66" charset="0"/>
+              <a:latin typeface="Cambria Math" panose="02040503050406030204" pitchFamily="18" charset="0"/>
+              <a:ea typeface="Cambria Math" panose="02040503050406030204" pitchFamily="18" charset="0"/>
             </a:rPr>
             <a:t>Nested Loops </a:t>
           </a:r>
+          <a:endParaRPr lang="en-US" sz="1800" dirty="0" smtClean="0">
+            <a:solidFill>
+              <a:srgbClr val="FFFF00"/>
+            </a:solidFill>
+            <a:latin typeface="Cambria Math" panose="02040503050406030204" pitchFamily="18" charset="0"/>
+            <a:ea typeface="Cambria Math" panose="02040503050406030204" pitchFamily="18" charset="0"/>
+          </a:endParaRPr>
+        </a:p>
+        <a:p>
+          <a:pPr algn="ctr"/>
           <a:r>
-            <a:rPr lang="en-US" sz="2800" dirty="0" smtClean="0">
+            <a:rPr lang="en-US" sz="1800" dirty="0" smtClean="0">
               <a:solidFill>
                 <a:schemeClr val="tx1"/>
               </a:solidFill>
-              <a:latin typeface="Buxton Sketch" panose="03080500000500000004" pitchFamily="66" charset="0"/>
+              <a:latin typeface="Cambria Math" panose="02040503050406030204" pitchFamily="18" charset="0"/>
+              <a:ea typeface="Cambria Math" panose="02040503050406030204" pitchFamily="18" charset="0"/>
             </a:rPr>
-            <a:t>-&gt; programming construct consisting several loops located into each other.</a:t>
+            <a:t>-&gt; </a:t>
+          </a:r>
+          <a:r>
+            <a:rPr lang="en-US" sz="1800" dirty="0" smtClean="0">
+              <a:solidFill>
+                <a:schemeClr val="tx1"/>
+              </a:solidFill>
+              <a:latin typeface="Cambria Math" panose="02040503050406030204" pitchFamily="18" charset="0"/>
+              <a:ea typeface="Cambria Math" panose="02040503050406030204" pitchFamily="18" charset="0"/>
+            </a:rPr>
+            <a:t>programming construct consisting several loops located into each other.</a:t>
           </a:r>
         </a:p>
         <a:p>
-          <a:endParaRPr lang="en-US" sz="3200" dirty="0">
+          <a:pPr algn="l"/>
+          <a:endParaRPr lang="en-US" sz="1800" dirty="0">
             <a:solidFill>
               <a:srgbClr val="FFFF00"/>
             </a:solidFill>
-            <a:latin typeface="Buxton Sketch" panose="03080500000500000004" pitchFamily="66" charset="0"/>
+            <a:latin typeface="Cambria Math" panose="02040503050406030204" pitchFamily="18" charset="0"/>
+            <a:ea typeface="Cambria Math" panose="02040503050406030204" pitchFamily="18" charset="0"/>
           </a:endParaRPr>
         </a:p>
       </dgm:t>
@@ -8946,7 +8985,11 @@
         <a:bodyPr/>
         <a:lstStyle/>
         <a:p>
-          <a:endParaRPr lang="en-US"/>
+          <a:pPr algn="l"/>
+          <a:endParaRPr lang="en-US" sz="1800">
+            <a:latin typeface="Cambria Math" panose="02040503050406030204" pitchFamily="18" charset="0"/>
+            <a:ea typeface="Cambria Math" panose="02040503050406030204" pitchFamily="18" charset="0"/>
+          </a:endParaRPr>
         </a:p>
       </dgm:t>
     </dgm:pt>
@@ -8968,315 +9011,340 @@
         <a:bodyPr/>
         <a:lstStyle/>
         <a:p>
-          <a:pPr algn="ctr"/>
-          <a:endParaRPr lang="en-US" sz="2800" dirty="0" smtClean="0">
+          <a:pPr algn="l"/>
+          <a:endParaRPr lang="en-US" sz="1800" dirty="0" smtClean="0">
             <a:solidFill>
               <a:srgbClr val="FFFF00"/>
             </a:solidFill>
-            <a:latin typeface="Buxton Sketch" panose="03080500000500000004" pitchFamily="66" charset="0"/>
+            <a:latin typeface="Cambria Math" panose="02040503050406030204" pitchFamily="18" charset="0"/>
+            <a:ea typeface="Cambria Math" panose="02040503050406030204" pitchFamily="18" charset="0"/>
           </a:endParaRPr>
         </a:p>
         <a:p>
-          <a:pPr algn="ctr"/>
-          <a:endParaRPr lang="en-US" sz="2800" dirty="0" smtClean="0">
+          <a:pPr algn="l"/>
+          <a:endParaRPr lang="en-US" sz="1800" dirty="0" smtClean="0">
             <a:solidFill>
               <a:srgbClr val="FFFF00"/>
             </a:solidFill>
-            <a:latin typeface="Buxton Sketch" panose="03080500000500000004" pitchFamily="66" charset="0"/>
+            <a:latin typeface="Cambria Math" panose="02040503050406030204" pitchFamily="18" charset="0"/>
+            <a:ea typeface="Cambria Math" panose="02040503050406030204" pitchFamily="18" charset="0"/>
           </a:endParaRPr>
         </a:p>
         <a:p>
-          <a:pPr algn="ctr"/>
-          <a:endParaRPr lang="en-US" sz="2800" dirty="0" smtClean="0">
+          <a:pPr algn="l"/>
+          <a:endParaRPr lang="en-US" sz="1800" dirty="0" smtClean="0">
             <a:solidFill>
               <a:srgbClr val="FFFF00"/>
             </a:solidFill>
-            <a:latin typeface="Buxton Sketch" panose="03080500000500000004" pitchFamily="66" charset="0"/>
+            <a:latin typeface="Cambria Math" panose="02040503050406030204" pitchFamily="18" charset="0"/>
+            <a:ea typeface="Cambria Math" panose="02040503050406030204" pitchFamily="18" charset="0"/>
           </a:endParaRPr>
         </a:p>
         <a:p>
-          <a:pPr algn="ctr"/>
+          <a:pPr algn="l"/>
           <a:r>
-            <a:rPr lang="en-US" sz="2800" dirty="0" smtClean="0">
+            <a:rPr lang="en-US" sz="1800" dirty="0" smtClean="0">
               <a:solidFill>
                 <a:srgbClr val="FFFF00"/>
               </a:solidFill>
-              <a:latin typeface="Buxton Sketch" panose="03080500000500000004" pitchFamily="66" charset="0"/>
+              <a:latin typeface="Cambria Math" panose="02040503050406030204" pitchFamily="18" charset="0"/>
+              <a:ea typeface="Cambria Math" panose="02040503050406030204" pitchFamily="18" charset="0"/>
             </a:rPr>
             <a:t>For Loop</a:t>
           </a:r>
         </a:p>
         <a:p>
-          <a:pPr algn="just"/>
+          <a:pPr algn="l"/>
           <a:r>
-            <a:rPr lang="en-US" sz="2000" dirty="0" smtClean="0">
+            <a:rPr lang="en-US" sz="1800" dirty="0" smtClean="0">
               <a:solidFill>
                 <a:schemeClr val="tx1"/>
               </a:solidFill>
-              <a:latin typeface="Buxton Sketch" panose="03080500000500000004" pitchFamily="66" charset="0"/>
+              <a:latin typeface="Cambria Math" panose="02040503050406030204" pitchFamily="18" charset="0"/>
+              <a:ea typeface="Cambria Math" panose="02040503050406030204" pitchFamily="18" charset="0"/>
             </a:rPr>
             <a:t>for(</a:t>
           </a:r>
           <a:r>
-            <a:rPr lang="en-US" sz="2000" dirty="0" err="1" smtClean="0">
+            <a:rPr lang="en-US" sz="1800" dirty="0" err="1" smtClean="0">
               <a:solidFill>
                 <a:schemeClr val="tx1"/>
               </a:solidFill>
-              <a:latin typeface="Buxton Sketch" panose="03080500000500000004" pitchFamily="66" charset="0"/>
+              <a:latin typeface="Cambria Math" panose="02040503050406030204" pitchFamily="18" charset="0"/>
+              <a:ea typeface="Cambria Math" panose="02040503050406030204" pitchFamily="18" charset="0"/>
             </a:rPr>
             <a:t>i</a:t>
           </a:r>
           <a:r>
-            <a:rPr lang="en-US" sz="2000" dirty="0" smtClean="0">
+            <a:rPr lang="en-US" sz="1800" dirty="0" smtClean="0">
               <a:solidFill>
                 <a:schemeClr val="tx1"/>
               </a:solidFill>
-              <a:latin typeface="Buxton Sketch" panose="03080500000500000004" pitchFamily="66" charset="0"/>
+              <a:latin typeface="Cambria Math" panose="02040503050406030204" pitchFamily="18" charset="0"/>
+              <a:ea typeface="Cambria Math" panose="02040503050406030204" pitchFamily="18" charset="0"/>
             </a:rPr>
             <a:t> = 0; </a:t>
           </a:r>
           <a:r>
-            <a:rPr lang="en-US" sz="2000" dirty="0" err="1" smtClean="0">
+            <a:rPr lang="en-US" sz="1800" dirty="0" err="1" smtClean="0">
               <a:solidFill>
                 <a:schemeClr val="tx1"/>
               </a:solidFill>
-              <a:latin typeface="Buxton Sketch" panose="03080500000500000004" pitchFamily="66" charset="0"/>
+              <a:latin typeface="Cambria Math" panose="02040503050406030204" pitchFamily="18" charset="0"/>
+              <a:ea typeface="Cambria Math" panose="02040503050406030204" pitchFamily="18" charset="0"/>
             </a:rPr>
             <a:t>i</a:t>
           </a:r>
           <a:r>
-            <a:rPr lang="en-US" sz="2000" dirty="0" smtClean="0">
+            <a:rPr lang="en-US" sz="1800" dirty="0" smtClean="0">
               <a:solidFill>
                 <a:schemeClr val="tx1"/>
               </a:solidFill>
-              <a:latin typeface="Buxton Sketch" panose="03080500000500000004" pitchFamily="66" charset="0"/>
+              <a:latin typeface="Cambria Math" panose="02040503050406030204" pitchFamily="18" charset="0"/>
+              <a:ea typeface="Cambria Math" panose="02040503050406030204" pitchFamily="18" charset="0"/>
             </a:rPr>
             <a:t> &lt;= 10; </a:t>
           </a:r>
           <a:r>
-            <a:rPr lang="en-US" sz="2000" dirty="0" err="1" smtClean="0">
+            <a:rPr lang="en-US" sz="1800" dirty="0" err="1" smtClean="0">
               <a:solidFill>
                 <a:schemeClr val="tx1"/>
               </a:solidFill>
-              <a:latin typeface="Buxton Sketch" panose="03080500000500000004" pitchFamily="66" charset="0"/>
+              <a:latin typeface="Cambria Math" panose="02040503050406030204" pitchFamily="18" charset="0"/>
+              <a:ea typeface="Cambria Math" panose="02040503050406030204" pitchFamily="18" charset="0"/>
             </a:rPr>
             <a:t>i</a:t>
           </a:r>
           <a:r>
-            <a:rPr lang="en-US" sz="2000" dirty="0" smtClean="0">
+            <a:rPr lang="en-US" sz="1800" dirty="0" smtClean="0">
               <a:solidFill>
                 <a:schemeClr val="tx1"/>
               </a:solidFill>
-              <a:latin typeface="Buxton Sketch" panose="03080500000500000004" pitchFamily="66" charset="0"/>
+              <a:latin typeface="Cambria Math" panose="02040503050406030204" pitchFamily="18" charset="0"/>
+              <a:ea typeface="Cambria Math" panose="02040503050406030204" pitchFamily="18" charset="0"/>
             </a:rPr>
             <a:t>++)</a:t>
           </a:r>
         </a:p>
         <a:p>
-          <a:pPr algn="just"/>
+          <a:pPr algn="l"/>
           <a:r>
-            <a:rPr lang="en-US" sz="2000" dirty="0" smtClean="0">
+            <a:rPr lang="en-US" sz="1800" dirty="0" smtClean="0">
               <a:solidFill>
                 <a:schemeClr val="tx1"/>
               </a:solidFill>
-              <a:latin typeface="Buxton Sketch" panose="03080500000500000004" pitchFamily="66" charset="0"/>
+              <a:latin typeface="Cambria Math" panose="02040503050406030204" pitchFamily="18" charset="0"/>
+              <a:ea typeface="Cambria Math" panose="02040503050406030204" pitchFamily="18" charset="0"/>
             </a:rPr>
             <a:t>{</a:t>
           </a:r>
         </a:p>
         <a:p>
-          <a:pPr algn="just"/>
+          <a:pPr algn="l"/>
           <a:r>
-            <a:rPr lang="en-US" sz="2000" dirty="0" smtClean="0">
+            <a:rPr lang="en-US" sz="1800" dirty="0" smtClean="0">
               <a:solidFill>
                 <a:schemeClr val="tx1"/>
               </a:solidFill>
-              <a:latin typeface="Buxton Sketch" panose="03080500000500000004" pitchFamily="66" charset="0"/>
+              <a:latin typeface="Cambria Math" panose="02040503050406030204" pitchFamily="18" charset="0"/>
+              <a:ea typeface="Cambria Math" panose="02040503050406030204" pitchFamily="18" charset="0"/>
             </a:rPr>
             <a:t>    </a:t>
           </a:r>
           <a:r>
-            <a:rPr lang="en-US" sz="2000" dirty="0" err="1" smtClean="0">
+            <a:rPr lang="en-US" sz="1800" dirty="0" err="1" smtClean="0">
               <a:solidFill>
                 <a:srgbClr val="00B050"/>
               </a:solidFill>
-              <a:latin typeface="Buxton Sketch" panose="03080500000500000004" pitchFamily="66" charset="0"/>
+              <a:latin typeface="Cambria Math" panose="02040503050406030204" pitchFamily="18" charset="0"/>
+              <a:ea typeface="Cambria Math" panose="02040503050406030204" pitchFamily="18" charset="0"/>
             </a:rPr>
             <a:t>Console</a:t>
           </a:r>
           <a:r>
-            <a:rPr lang="en-US" sz="2000" dirty="0" err="1" smtClean="0">
+            <a:rPr lang="en-US" sz="1800" dirty="0" err="1" smtClean="0">
               <a:solidFill>
                 <a:schemeClr val="tx1"/>
               </a:solidFill>
-              <a:latin typeface="Buxton Sketch" panose="03080500000500000004" pitchFamily="66" charset="0"/>
+              <a:latin typeface="Cambria Math" panose="02040503050406030204" pitchFamily="18" charset="0"/>
+              <a:ea typeface="Cambria Math" panose="02040503050406030204" pitchFamily="18" charset="0"/>
             </a:rPr>
             <a:t>.WriteLine</a:t>
           </a:r>
           <a:r>
-            <a:rPr lang="en-US" sz="2000" dirty="0" smtClean="0">
+            <a:rPr lang="en-US" sz="1800" dirty="0" smtClean="0">
               <a:solidFill>
                 <a:schemeClr val="tx1"/>
               </a:solidFill>
-              <a:latin typeface="Buxton Sketch" panose="03080500000500000004" pitchFamily="66" charset="0"/>
+              <a:latin typeface="Cambria Math" panose="02040503050406030204" pitchFamily="18" charset="0"/>
+              <a:ea typeface="Cambria Math" panose="02040503050406030204" pitchFamily="18" charset="0"/>
             </a:rPr>
             <a:t>(“Your name is </a:t>
           </a:r>
           <a:r>
-            <a:rPr lang="en-US" sz="2000" dirty="0" smtClean="0">
+            <a:rPr lang="en-US" sz="1800" dirty="0" smtClean="0">
               <a:solidFill>
                 <a:srgbClr val="00B0F0"/>
               </a:solidFill>
-              <a:latin typeface="Buxton Sketch" panose="03080500000500000004" pitchFamily="66" charset="0"/>
+              <a:latin typeface="Cambria Math" panose="02040503050406030204" pitchFamily="18" charset="0"/>
+              <a:ea typeface="Cambria Math" panose="02040503050406030204" pitchFamily="18" charset="0"/>
             </a:rPr>
             <a:t>Daffy Duck</a:t>
           </a:r>
           <a:r>
-            <a:rPr lang="en-US" sz="2000" dirty="0" smtClean="0">
+            <a:rPr lang="en-US" sz="1800" dirty="0" smtClean="0">
               <a:solidFill>
                 <a:schemeClr val="tx1"/>
               </a:solidFill>
-              <a:latin typeface="Buxton Sketch" panose="03080500000500000004" pitchFamily="66" charset="0"/>
+              <a:latin typeface="Cambria Math" panose="02040503050406030204" pitchFamily="18" charset="0"/>
+              <a:ea typeface="Cambria Math" panose="02040503050406030204" pitchFamily="18" charset="0"/>
             </a:rPr>
             <a:t>”);</a:t>
           </a:r>
         </a:p>
         <a:p>
-          <a:pPr algn="just"/>
+          <a:pPr algn="l"/>
           <a:r>
-            <a:rPr lang="en-US" sz="2000" dirty="0" smtClean="0">
+            <a:rPr lang="en-US" sz="1800" dirty="0" smtClean="0">
               <a:solidFill>
                 <a:schemeClr val="tx1"/>
               </a:solidFill>
-              <a:latin typeface="Buxton Sketch" panose="03080500000500000004" pitchFamily="66" charset="0"/>
+              <a:latin typeface="Cambria Math" panose="02040503050406030204" pitchFamily="18" charset="0"/>
+              <a:ea typeface="Cambria Math" panose="02040503050406030204" pitchFamily="18" charset="0"/>
             </a:rPr>
             <a:t>}</a:t>
           </a:r>
         </a:p>
         <a:p>
-          <a:pPr algn="just"/>
-          <a:endParaRPr lang="en-US" sz="2000" dirty="0" smtClean="0">
+          <a:pPr algn="l"/>
+          <a:endParaRPr lang="en-US" sz="1800" dirty="0" smtClean="0">
             <a:solidFill>
               <a:schemeClr val="tx1"/>
             </a:solidFill>
-            <a:latin typeface="Buxton Sketch" panose="03080500000500000004" pitchFamily="66" charset="0"/>
+            <a:latin typeface="Cambria Math" panose="02040503050406030204" pitchFamily="18" charset="0"/>
+            <a:ea typeface="Cambria Math" panose="02040503050406030204" pitchFamily="18" charset="0"/>
           </a:endParaRPr>
         </a:p>
         <a:p>
-          <a:pPr algn="just"/>
+          <a:pPr algn="l"/>
           <a:r>
-            <a:rPr lang="en-US" sz="2000" dirty="0" smtClean="0">
+            <a:rPr lang="en-US" sz="1800" dirty="0" smtClean="0">
               <a:solidFill>
                 <a:schemeClr val="tx1"/>
               </a:solidFill>
-              <a:latin typeface="Buxton Sketch" panose="03080500000500000004" pitchFamily="66" charset="0"/>
+              <a:latin typeface="Cambria Math" panose="02040503050406030204" pitchFamily="18" charset="0"/>
+              <a:ea typeface="Cambria Math" panose="02040503050406030204" pitchFamily="18" charset="0"/>
             </a:rPr>
             <a:t>// Your name is </a:t>
           </a:r>
           <a:r>
-            <a:rPr lang="en-US" sz="2000" dirty="0" smtClean="0">
+            <a:rPr lang="en-US" sz="1800" dirty="0" smtClean="0">
               <a:solidFill>
                 <a:srgbClr val="00B0F0"/>
               </a:solidFill>
-              <a:latin typeface="Buxton Sketch" panose="03080500000500000004" pitchFamily="66" charset="0"/>
+              <a:latin typeface="Cambria Math" panose="02040503050406030204" pitchFamily="18" charset="0"/>
+              <a:ea typeface="Cambria Math" panose="02040503050406030204" pitchFamily="18" charset="0"/>
             </a:rPr>
             <a:t>Daffy Duck</a:t>
           </a:r>
         </a:p>
         <a:p>
-          <a:pPr algn="just"/>
+          <a:pPr algn="l"/>
           <a:r>
-            <a:rPr lang="en-US" sz="2000" dirty="0" smtClean="0">
+            <a:rPr lang="en-US" sz="1800" dirty="0" smtClean="0">
               <a:solidFill>
                 <a:schemeClr val="tx1"/>
               </a:solidFill>
-              <a:latin typeface="Buxton Sketch" panose="03080500000500000004" pitchFamily="66" charset="0"/>
+              <a:latin typeface="Cambria Math" panose="02040503050406030204" pitchFamily="18" charset="0"/>
+              <a:ea typeface="Cambria Math" panose="02040503050406030204" pitchFamily="18" charset="0"/>
             </a:rPr>
             <a:t>// Your name is </a:t>
           </a:r>
           <a:r>
-            <a:rPr lang="en-US" sz="2000" dirty="0" smtClean="0">
+            <a:rPr lang="en-US" sz="1800" dirty="0" smtClean="0">
               <a:solidFill>
                 <a:srgbClr val="00B0F0"/>
               </a:solidFill>
-              <a:latin typeface="Buxton Sketch" panose="03080500000500000004" pitchFamily="66" charset="0"/>
+              <a:latin typeface="Cambria Math" panose="02040503050406030204" pitchFamily="18" charset="0"/>
+              <a:ea typeface="Cambria Math" panose="02040503050406030204" pitchFamily="18" charset="0"/>
             </a:rPr>
             <a:t>Daffy Duck</a:t>
           </a:r>
         </a:p>
         <a:p>
-          <a:pPr algn="just"/>
+          <a:pPr algn="l"/>
           <a:r>
-            <a:rPr lang="en-US" sz="2000" dirty="0" smtClean="0">
+            <a:rPr lang="en-US" sz="1800" dirty="0" smtClean="0">
               <a:solidFill>
                 <a:schemeClr val="tx1"/>
               </a:solidFill>
-              <a:latin typeface="Buxton Sketch" panose="03080500000500000004" pitchFamily="66" charset="0"/>
+              <a:latin typeface="Cambria Math" panose="02040503050406030204" pitchFamily="18" charset="0"/>
+              <a:ea typeface="Cambria Math" panose="02040503050406030204" pitchFamily="18" charset="0"/>
             </a:rPr>
             <a:t>// Your name is </a:t>
           </a:r>
           <a:r>
-            <a:rPr lang="en-US" sz="2000" dirty="0" smtClean="0">
+            <a:rPr lang="en-US" sz="1800" dirty="0" smtClean="0">
               <a:solidFill>
                 <a:srgbClr val="00B0F0"/>
               </a:solidFill>
-              <a:latin typeface="Buxton Sketch" panose="03080500000500000004" pitchFamily="66" charset="0"/>
+              <a:latin typeface="Cambria Math" panose="02040503050406030204" pitchFamily="18" charset="0"/>
+              <a:ea typeface="Cambria Math" panose="02040503050406030204" pitchFamily="18" charset="0"/>
             </a:rPr>
             <a:t>Daffy Duck</a:t>
           </a:r>
         </a:p>
         <a:p>
-          <a:pPr algn="just"/>
+          <a:pPr algn="l"/>
           <a:r>
-            <a:rPr lang="en-US" sz="2000" dirty="0" smtClean="0">
+            <a:rPr lang="en-US" sz="1800" dirty="0" smtClean="0">
               <a:solidFill>
                 <a:schemeClr val="tx1"/>
               </a:solidFill>
-              <a:latin typeface="Buxton Sketch" panose="03080500000500000004" pitchFamily="66" charset="0"/>
+              <a:latin typeface="Cambria Math" panose="02040503050406030204" pitchFamily="18" charset="0"/>
+              <a:ea typeface="Cambria Math" panose="02040503050406030204" pitchFamily="18" charset="0"/>
             </a:rPr>
             <a:t>… 10 times will be looped</a:t>
           </a:r>
-          <a:endParaRPr lang="en-US" sz="2400" dirty="0" smtClean="0">
+        </a:p>
+        <a:p>
+          <a:pPr algn="l"/>
+          <a:endParaRPr lang="en-US" sz="1800" dirty="0" smtClean="0">
             <a:solidFill>
-              <a:schemeClr val="tx1"/>
+              <a:srgbClr val="FFFF00"/>
             </a:solidFill>
-            <a:latin typeface="Buxton Sketch" panose="03080500000500000004" pitchFamily="66" charset="0"/>
+            <a:latin typeface="Cambria Math" panose="02040503050406030204" pitchFamily="18" charset="0"/>
+            <a:ea typeface="Cambria Math" panose="02040503050406030204" pitchFamily="18" charset="0"/>
           </a:endParaRPr>
         </a:p>
         <a:p>
-          <a:pPr algn="ctr"/>
-          <a:endParaRPr lang="en-US" sz="2800" dirty="0" smtClean="0">
+          <a:pPr algn="l"/>
+          <a:endParaRPr lang="en-US" sz="1800" dirty="0" smtClean="0">
             <a:solidFill>
               <a:srgbClr val="FFFF00"/>
             </a:solidFill>
-            <a:latin typeface="Buxton Sketch" panose="03080500000500000004" pitchFamily="66" charset="0"/>
+            <a:latin typeface="Cambria Math" panose="02040503050406030204" pitchFamily="18" charset="0"/>
+            <a:ea typeface="Cambria Math" panose="02040503050406030204" pitchFamily="18" charset="0"/>
           </a:endParaRPr>
         </a:p>
         <a:p>
-          <a:pPr algn="ctr"/>
-          <a:endParaRPr lang="en-US" sz="2800" dirty="0" smtClean="0">
+          <a:pPr algn="l"/>
+          <a:endParaRPr lang="en-US" sz="1800" dirty="0" smtClean="0">
             <a:solidFill>
               <a:srgbClr val="FFFF00"/>
             </a:solidFill>
-            <a:latin typeface="Buxton Sketch" panose="03080500000500000004" pitchFamily="66" charset="0"/>
+            <a:latin typeface="Cambria Math" panose="02040503050406030204" pitchFamily="18" charset="0"/>
+            <a:ea typeface="Cambria Math" panose="02040503050406030204" pitchFamily="18" charset="0"/>
           </a:endParaRPr>
         </a:p>
         <a:p>
-          <a:pPr algn="ctr"/>
-          <a:endParaRPr lang="en-US" sz="2800" dirty="0" smtClean="0">
+          <a:pPr algn="l"/>
+          <a:endParaRPr lang="en-US" sz="1800" dirty="0">
             <a:solidFill>
               <a:srgbClr val="FFFF00"/>
             </a:solidFill>
-            <a:latin typeface="Buxton Sketch" panose="03080500000500000004" pitchFamily="66" charset="0"/>
-          </a:endParaRPr>
-        </a:p>
-        <a:p>
-          <a:pPr algn="ctr"/>
-          <a:endParaRPr lang="en-US" sz="2800" dirty="0">
-            <a:solidFill>
-              <a:srgbClr val="FFFF00"/>
-            </a:solidFill>
-            <a:latin typeface="Buxton Sketch" panose="03080500000500000004" pitchFamily="66" charset="0"/>
+            <a:latin typeface="Cambria Math" panose="02040503050406030204" pitchFamily="18" charset="0"/>
+            <a:ea typeface="Cambria Math" panose="02040503050406030204" pitchFamily="18" charset="0"/>
           </a:endParaRPr>
         </a:p>
       </dgm:t>
@@ -9288,7 +9356,11 @@
         <a:bodyPr/>
         <a:lstStyle/>
         <a:p>
-          <a:endParaRPr lang="en-US"/>
+          <a:pPr algn="l"/>
+          <a:endParaRPr lang="en-US" sz="1800">
+            <a:latin typeface="Cambria Math" panose="02040503050406030204" pitchFamily="18" charset="0"/>
+            <a:ea typeface="Cambria Math" panose="02040503050406030204" pitchFamily="18" charset="0"/>
+          </a:endParaRPr>
         </a:p>
       </dgm:t>
     </dgm:pt>
@@ -9336,7 +9408,7 @@
       <dgm:spPr/>
     </dgm:pt>
     <dgm:pt modelId="{C64EB97F-321C-4C39-8BEA-081097216017}" type="pres">
-      <dgm:prSet presAssocID="{05669515-C7AD-43E7-93DA-C37464BD057F}" presName="rootText1" presStyleLbl="node0" presStyleIdx="0" presStyleCnt="1" custScaleY="137438" custLinFactNeighborX="-1568" custLinFactNeighborY="-76823">
+      <dgm:prSet presAssocID="{05669515-C7AD-43E7-93DA-C37464BD057F}" presName="rootText1" presStyleLbl="node0" presStyleIdx="0" presStyleCnt="1" custScaleX="197574" custScaleY="50930" custLinFactNeighborX="-1568" custLinFactNeighborY="-76823">
         <dgm:presLayoutVars>
           <dgm:chPref val="3"/>
         </dgm:presLayoutVars>
@@ -9446,7 +9518,7 @@
       <dgm:spPr/>
     </dgm:pt>
     <dgm:pt modelId="{BC0C9976-79C2-4CCD-9FCC-AEDADFE68DB4}" type="pres">
-      <dgm:prSet presAssocID="{A78ED3B0-0F0C-4007-BBB8-10DD84BC0913}" presName="rootText" presStyleLbl="node2" presStyleIdx="1" presStyleCnt="3" custScaleY="335862">
+      <dgm:prSet presAssocID="{A78ED3B0-0F0C-4007-BBB8-10DD84BC0913}" presName="rootText" presStyleLbl="node2" presStyleIdx="1" presStyleCnt="3" custScaleY="187738">
         <dgm:presLayoutVars>
           <dgm:chPref val="3"/>
         </dgm:presLayoutVars>
@@ -9503,7 +9575,7 @@
       <dgm:spPr/>
     </dgm:pt>
     <dgm:pt modelId="{CECD2C1A-D1AF-4B3F-BCEC-0C6E19DFFA0D}" type="pres">
-      <dgm:prSet presAssocID="{AEEB09C7-4FB5-48E4-9523-C56B03EF0B5B}" presName="rootText" presStyleLbl="node2" presStyleIdx="2" presStyleCnt="3" custScaleX="197829" custScaleY="372542" custLinFactNeighborX="-3886" custLinFactNeighborY="3964">
+      <dgm:prSet presAssocID="{AEEB09C7-4FB5-48E4-9523-C56B03EF0B5B}" presName="rootText" presStyleLbl="node2" presStyleIdx="2" presStyleCnt="3" custScaleX="171405" custScaleY="372542" custLinFactNeighborX="-3886" custLinFactNeighborY="3964">
         <dgm:presLayoutVars>
           <dgm:chPref val="3"/>
         </dgm:presLayoutVars>
@@ -9825,7 +9897,7 @@
       <dgm:spPr/>
     </dgm:pt>
     <dgm:pt modelId="{ACDE8485-05B1-406B-AD3C-368A19FF8F21}" type="pres">
-      <dgm:prSet presAssocID="{5026F749-70FD-4720-9858-7B81314E8CF0}" presName="rootText" presStyleLbl="node2" presStyleIdx="0" presStyleCnt="2" custScaleY="17700" custLinFactNeighborX="-2262" custLinFactNeighborY="-37833">
+      <dgm:prSet presAssocID="{5026F749-70FD-4720-9858-7B81314E8CF0}" presName="rootText" presStyleLbl="node2" presStyleIdx="0" presStyleCnt="2" custScaleY="17700" custLinFactNeighborX="2564" custLinFactNeighborY="-85250">
         <dgm:presLayoutVars>
           <dgm:chPref val="3"/>
         </dgm:presLayoutVars>
@@ -9882,7 +9954,7 @@
       <dgm:spPr/>
     </dgm:pt>
     <dgm:pt modelId="{07BD9B31-3415-4AE7-BD62-D4E049D8396D}" type="pres">
-      <dgm:prSet presAssocID="{EEC3C2B6-CCB3-4CDB-84D9-93741BAF41A2}" presName="rootText" presStyleLbl="node2" presStyleIdx="1" presStyleCnt="2" custScaleY="22635" custLinFactNeighborX="-2879" custLinFactNeighborY="-50170">
+      <dgm:prSet presAssocID="{EEC3C2B6-CCB3-4CDB-84D9-93741BAF41A2}" presName="rootText" presStyleLbl="node2" presStyleIdx="1" presStyleCnt="2" custScaleY="22635" custLinFactNeighborX="-2687" custLinFactNeighborY="-87516">
         <dgm:presLayoutVars>
           <dgm:chPref val="3"/>
         </dgm:presLayoutVars>
@@ -9921,18 +9993,18 @@
     </dgm:pt>
   </dgm:ptLst>
   <dgm:cxnLst>
+    <dgm:cxn modelId="{3F461B40-14D3-4DE0-B156-B004FD9F8ED9}" type="presOf" srcId="{F53C9289-97E1-4D2D-97C9-1AAC80980444}" destId="{066BF7EA-934B-4060-B6BF-0796EB1E4F44}" srcOrd="0" destOrd="0" presId="urn:microsoft.com/office/officeart/2005/8/layout/orgChart1"/>
+    <dgm:cxn modelId="{9FD2703E-D7D4-488C-B86F-89B4AAEC8866}" type="presOf" srcId="{5026F749-70FD-4720-9858-7B81314E8CF0}" destId="{ACDE8485-05B1-406B-AD3C-368A19FF8F21}" srcOrd="0" destOrd="0" presId="urn:microsoft.com/office/officeart/2005/8/layout/orgChart1"/>
     <dgm:cxn modelId="{1A9B7C33-D180-4BAD-BAB0-48F9CC52E7D7}" srcId="{36FF7C4C-C18C-46F5-8FE8-C426B93A9095}" destId="{47581A9E-5E40-406D-BE0A-38AA3E89F7F8}" srcOrd="0" destOrd="0" parTransId="{B9257DBC-4964-4109-BE29-5A9463C79B30}" sibTransId="{36D4FCD3-96C9-4F49-A64F-A25212C98BE3}"/>
-    <dgm:cxn modelId="{3F461B40-14D3-4DE0-B156-B004FD9F8ED9}" type="presOf" srcId="{F53C9289-97E1-4D2D-97C9-1AAC80980444}" destId="{066BF7EA-934B-4060-B6BF-0796EB1E4F44}" srcOrd="0" destOrd="0" presId="urn:microsoft.com/office/officeart/2005/8/layout/orgChart1"/>
+    <dgm:cxn modelId="{12C6268D-B3F0-4C5C-B9B7-4269BF5D55F1}" type="presOf" srcId="{47581A9E-5E40-406D-BE0A-38AA3E89F7F8}" destId="{7C14404F-4974-49DB-96E9-942AA1195F7A}" srcOrd="1" destOrd="0" presId="urn:microsoft.com/office/officeart/2005/8/layout/orgChart1"/>
+    <dgm:cxn modelId="{5D9FF610-E795-476D-86FC-E015F8FDA489}" srcId="{47581A9E-5E40-406D-BE0A-38AA3E89F7F8}" destId="{EEC3C2B6-CCB3-4CDB-84D9-93741BAF41A2}" srcOrd="1" destOrd="0" parTransId="{EFFAFC6C-F906-450E-8595-D15AC71B243F}" sibTransId="{F512F933-B839-42F7-8E57-EDFA719F737F}"/>
+    <dgm:cxn modelId="{8AB80DB9-7B40-4065-83A0-8DAD0D36E386}" type="presOf" srcId="{EFFAFC6C-F906-450E-8595-D15AC71B243F}" destId="{973CA2BD-28A9-4084-9A56-C43D3E3B0316}" srcOrd="0" destOrd="0" presId="urn:microsoft.com/office/officeart/2005/8/layout/orgChart1"/>
     <dgm:cxn modelId="{9FC334A9-4E29-4794-8BF1-2134E895F76D}" type="presOf" srcId="{EEC3C2B6-CCB3-4CDB-84D9-93741BAF41A2}" destId="{54470973-FF4C-4094-83FC-25652F5582EF}" srcOrd="1" destOrd="0" presId="urn:microsoft.com/office/officeart/2005/8/layout/orgChart1"/>
-    <dgm:cxn modelId="{8AB80DB9-7B40-4065-83A0-8DAD0D36E386}" type="presOf" srcId="{EFFAFC6C-F906-450E-8595-D15AC71B243F}" destId="{973CA2BD-28A9-4084-9A56-C43D3E3B0316}" srcOrd="0" destOrd="0" presId="urn:microsoft.com/office/officeart/2005/8/layout/orgChart1"/>
-    <dgm:cxn modelId="{9FD2703E-D7D4-488C-B86F-89B4AAEC8866}" type="presOf" srcId="{5026F749-70FD-4720-9858-7B81314E8CF0}" destId="{ACDE8485-05B1-406B-AD3C-368A19FF8F21}" srcOrd="0" destOrd="0" presId="urn:microsoft.com/office/officeart/2005/8/layout/orgChart1"/>
+    <dgm:cxn modelId="{5C91C76A-FC00-4920-9159-50F3665C6692}" type="presOf" srcId="{5026F749-70FD-4720-9858-7B81314E8CF0}" destId="{5ABA39A4-A26D-4F82-AF53-3A39C640F9C3}" srcOrd="1" destOrd="0" presId="urn:microsoft.com/office/officeart/2005/8/layout/orgChart1"/>
+    <dgm:cxn modelId="{FF9EFE8B-F6D5-4585-A95F-EFE7E2BAD83F}" type="presOf" srcId="{36FF7C4C-C18C-46F5-8FE8-C426B93A9095}" destId="{F28535A8-9D85-4AB8-B7C4-4EDBC1F9E41B}" srcOrd="0" destOrd="0" presId="urn:microsoft.com/office/officeart/2005/8/layout/orgChart1"/>
+    <dgm:cxn modelId="{E0C3EF0D-090E-4E04-B581-91BAC77C7E75}" type="presOf" srcId="{EEC3C2B6-CCB3-4CDB-84D9-93741BAF41A2}" destId="{07BD9B31-3415-4AE7-BD62-D4E049D8396D}" srcOrd="0" destOrd="0" presId="urn:microsoft.com/office/officeart/2005/8/layout/orgChart1"/>
+    <dgm:cxn modelId="{3BFAD681-DCC6-47B1-AAF1-2EEA17BB839A}" type="presOf" srcId="{47581A9E-5E40-406D-BE0A-38AA3E89F7F8}" destId="{36FDA7F1-3CE0-45DA-99EE-C2DAE976718C}" srcOrd="0" destOrd="0" presId="urn:microsoft.com/office/officeart/2005/8/layout/orgChart1"/>
     <dgm:cxn modelId="{BC82667A-EDA1-43CA-B93C-FF9003F535FB}" srcId="{47581A9E-5E40-406D-BE0A-38AA3E89F7F8}" destId="{5026F749-70FD-4720-9858-7B81314E8CF0}" srcOrd="0" destOrd="0" parTransId="{F53C9289-97E1-4D2D-97C9-1AAC80980444}" sibTransId="{1A494AB9-3AE1-4FA4-9DB7-96C622E19841}"/>
-    <dgm:cxn modelId="{3BFAD681-DCC6-47B1-AAF1-2EEA17BB839A}" type="presOf" srcId="{47581A9E-5E40-406D-BE0A-38AA3E89F7F8}" destId="{36FDA7F1-3CE0-45DA-99EE-C2DAE976718C}" srcOrd="0" destOrd="0" presId="urn:microsoft.com/office/officeart/2005/8/layout/orgChart1"/>
-    <dgm:cxn modelId="{5D9FF610-E795-476D-86FC-E015F8FDA489}" srcId="{47581A9E-5E40-406D-BE0A-38AA3E89F7F8}" destId="{EEC3C2B6-CCB3-4CDB-84D9-93741BAF41A2}" srcOrd="1" destOrd="0" parTransId="{EFFAFC6C-F906-450E-8595-D15AC71B243F}" sibTransId="{F512F933-B839-42F7-8E57-EDFA719F737F}"/>
-    <dgm:cxn modelId="{12C6268D-B3F0-4C5C-B9B7-4269BF5D55F1}" type="presOf" srcId="{47581A9E-5E40-406D-BE0A-38AA3E89F7F8}" destId="{7C14404F-4974-49DB-96E9-942AA1195F7A}" srcOrd="1" destOrd="0" presId="urn:microsoft.com/office/officeart/2005/8/layout/orgChart1"/>
-    <dgm:cxn modelId="{5C91C76A-FC00-4920-9159-50F3665C6692}" type="presOf" srcId="{5026F749-70FD-4720-9858-7B81314E8CF0}" destId="{5ABA39A4-A26D-4F82-AF53-3A39C640F9C3}" srcOrd="1" destOrd="0" presId="urn:microsoft.com/office/officeart/2005/8/layout/orgChart1"/>
-    <dgm:cxn modelId="{E0C3EF0D-090E-4E04-B581-91BAC77C7E75}" type="presOf" srcId="{EEC3C2B6-CCB3-4CDB-84D9-93741BAF41A2}" destId="{07BD9B31-3415-4AE7-BD62-D4E049D8396D}" srcOrd="0" destOrd="0" presId="urn:microsoft.com/office/officeart/2005/8/layout/orgChart1"/>
-    <dgm:cxn modelId="{FF9EFE8B-F6D5-4585-A95F-EFE7E2BAD83F}" type="presOf" srcId="{36FF7C4C-C18C-46F5-8FE8-C426B93A9095}" destId="{F28535A8-9D85-4AB8-B7C4-4EDBC1F9E41B}" srcOrd="0" destOrd="0" presId="urn:microsoft.com/office/officeart/2005/8/layout/orgChart1"/>
     <dgm:cxn modelId="{F6821DBF-9971-46BE-A30B-50B3DE2134F5}" type="presParOf" srcId="{F28535A8-9D85-4AB8-B7C4-4EDBC1F9E41B}" destId="{1CB2309C-DD81-4BD9-A73C-645D5FDB1293}" srcOrd="0" destOrd="0" presId="urn:microsoft.com/office/officeart/2005/8/layout/orgChart1"/>
     <dgm:cxn modelId="{E911AD6C-0919-436D-B78F-19613774E640}" type="presParOf" srcId="{1CB2309C-DD81-4BD9-A73C-645D5FDB1293}" destId="{A2FA31AE-5C86-4A6F-87F7-2ACB8FE62327}" srcOrd="0" destOrd="0" presId="urn:microsoft.com/office/officeart/2005/8/layout/orgChart1"/>
     <dgm:cxn modelId="{3675E7BE-30B3-46E8-8476-632CA79381E9}" type="presParOf" srcId="{A2FA31AE-5C86-4A6F-87F7-2ACB8FE62327}" destId="{36FDA7F1-3CE0-45DA-99EE-C2DAE976718C}" srcOrd="0" destOrd="0" presId="urn:microsoft.com/office/officeart/2005/8/layout/orgChart1"/>
@@ -12761,25 +12833,7 @@
               </a:solidFill>
               <a:latin typeface="Constantia" panose="02030602050306030303" pitchFamily="18" charset="0"/>
             </a:rPr>
-            <a:t>- Comparison, Binary</a:t>
-          </a:r>
-          <a:r>
-            <a:rPr lang="en-US" sz="1600" kern="1200" dirty="0" smtClean="0">
-              <a:solidFill>
-                <a:schemeClr val="tx1"/>
-              </a:solidFill>
-              <a:latin typeface="Constantia" panose="02030602050306030303" pitchFamily="18" charset="0"/>
-            </a:rPr>
-            <a:t>, Concatenation </a:t>
-          </a:r>
-          <a:r>
-            <a:rPr lang="en-US" sz="1600" kern="1200" dirty="0" smtClean="0">
-              <a:solidFill>
-                <a:schemeClr val="tx1"/>
-              </a:solidFill>
-              <a:latin typeface="Constantia" panose="02030602050306030303" pitchFamily="18" charset="0"/>
-            </a:rPr>
-            <a:t>…</a:t>
+            <a:t>- Comparison, Binary, Concatenation …</a:t>
           </a:r>
           <a:endParaRPr lang="en-US" sz="1600" kern="1200" dirty="0" smtClean="0">
             <a:solidFill>
@@ -13900,8 +13954,8 @@
       </dsp:nvSpPr>
       <dsp:spPr>
         <a:xfrm>
-          <a:off x="5947690" y="1624078"/>
-          <a:ext cx="3590962" cy="575631"/>
+          <a:off x="5945685" y="634386"/>
+          <a:ext cx="3785218" cy="974542"/>
         </a:xfrm>
         <a:custGeom>
           <a:avLst/>
@@ -13915,13 +13969,13 @@
                 <a:pt x="0" y="0"/>
               </a:moveTo>
               <a:lnTo>
-                <a:pt x="0" y="327478"/>
+                <a:pt x="0" y="712965"/>
               </a:lnTo>
               <a:lnTo>
-                <a:pt x="3590962" y="327478"/>
+                <a:pt x="3785218" y="712965"/>
               </a:lnTo>
               <a:lnTo>
-                <a:pt x="3590962" y="575631"/>
+                <a:pt x="3785218" y="974542"/>
               </a:lnTo>
             </a:path>
           </a:pathLst>
@@ -13961,8 +14015,8 @@
       </dsp:nvSpPr>
       <dsp:spPr>
         <a:xfrm>
-          <a:off x="5614799" y="1624078"/>
-          <a:ext cx="332891" cy="535968"/>
+          <a:off x="5878205" y="634386"/>
+          <a:ext cx="91440" cy="925167"/>
         </a:xfrm>
         <a:custGeom>
           <a:avLst/>
@@ -13973,16 +14027,16 @@
           <a:pathLst>
             <a:path>
               <a:moveTo>
-                <a:pt x="332891" y="0"/>
+                <a:pt x="67480" y="0"/>
               </a:moveTo>
               <a:lnTo>
-                <a:pt x="332891" y="287815"/>
+                <a:pt x="67480" y="663590"/>
               </a:lnTo>
               <a:lnTo>
-                <a:pt x="0" y="287815"/>
+                <a:pt x="45720" y="663590"/>
               </a:lnTo>
               <a:lnTo>
-                <a:pt x="0" y="535968"/>
+                <a:pt x="45720" y="925167"/>
               </a:lnTo>
             </a:path>
           </a:pathLst>
@@ -14022,8 +14076,8 @@
       </dsp:nvSpPr>
       <dsp:spPr>
         <a:xfrm>
-          <a:off x="1981910" y="1624078"/>
-          <a:ext cx="3965780" cy="535968"/>
+          <a:off x="2094512" y="634386"/>
+          <a:ext cx="3851173" cy="925167"/>
         </a:xfrm>
         <a:custGeom>
           <a:avLst/>
@@ -14034,16 +14088,16 @@
           <a:pathLst>
             <a:path>
               <a:moveTo>
-                <a:pt x="3965780" y="0"/>
+                <a:pt x="3851173" y="0"/>
               </a:moveTo>
               <a:lnTo>
-                <a:pt x="3965780" y="287815"/>
+                <a:pt x="3851173" y="663590"/>
               </a:lnTo>
               <a:lnTo>
-                <a:pt x="0" y="287815"/>
+                <a:pt x="0" y="663590"/>
               </a:lnTo>
               <a:lnTo>
-                <a:pt x="0" y="535968"/>
+                <a:pt x="0" y="925167"/>
               </a:lnTo>
             </a:path>
           </a:pathLst>
@@ -14083,8 +14137,8 @@
       </dsp:nvSpPr>
       <dsp:spPr>
         <a:xfrm>
-          <a:off x="4766009" y="0"/>
-          <a:ext cx="2363361" cy="1624078"/>
+          <a:off x="3484694" y="0"/>
+          <a:ext cx="4921982" cy="634386"/>
         </a:xfrm>
         <a:prstGeom prst="rect">
           <a:avLst/>
@@ -14125,12 +14179,12 @@
         </a:fontRef>
       </dsp:style>
       <dsp:txBody>
-        <a:bodyPr spcFirstLastPara="0" vert="horz" wrap="square" lIns="41275" tIns="41275" rIns="41275" bIns="41275" numCol="1" spcCol="1270" anchor="ctr" anchorCtr="0">
+        <a:bodyPr spcFirstLastPara="0" vert="horz" wrap="square" lIns="25400" tIns="25400" rIns="25400" bIns="25400" numCol="1" spcCol="1270" anchor="ctr" anchorCtr="0">
           <a:noAutofit/>
         </a:bodyPr>
         <a:lstStyle/>
         <a:p>
-          <a:pPr lvl="0" algn="ctr" defTabSz="2889250">
+          <a:pPr lvl="0" algn="ctr" defTabSz="1778000">
             <a:lnSpc>
               <a:spcPct val="90000"/>
             </a:lnSpc>
@@ -14142,25 +14196,27 @@
             </a:spcAft>
           </a:pPr>
           <a:r>
-            <a:rPr lang="en-US" sz="6500" kern="1200" dirty="0" smtClean="0">
+            <a:rPr lang="en-US" sz="4000" kern="1200" dirty="0" smtClean="0">
               <a:solidFill>
                 <a:srgbClr val="FFFF00"/>
               </a:solidFill>
-              <a:latin typeface="Informal Roman" panose="030604020304060B0204" pitchFamily="66" charset="0"/>
+              <a:latin typeface="Cambria Math" panose="02040503050406030204" pitchFamily="18" charset="0"/>
+              <a:ea typeface="Cambria Math" panose="02040503050406030204" pitchFamily="18" charset="0"/>
             </a:rPr>
             <a:t>Loops</a:t>
           </a:r>
-          <a:endParaRPr lang="en-US" sz="6500" kern="1200" dirty="0">
+          <a:endParaRPr lang="en-US" sz="4000" kern="1200" dirty="0">
             <a:solidFill>
               <a:srgbClr val="FFFF00"/>
             </a:solidFill>
-            <a:latin typeface="Informal Roman" panose="030604020304060B0204" pitchFamily="66" charset="0"/>
+            <a:latin typeface="Cambria Math" panose="02040503050406030204" pitchFamily="18" charset="0"/>
+            <a:ea typeface="Cambria Math" panose="02040503050406030204" pitchFamily="18" charset="0"/>
           </a:endParaRPr>
         </a:p>
       </dsp:txBody>
       <dsp:txXfrm>
-        <a:off x="4766009" y="0"/>
-        <a:ext cx="2363361" cy="1624078"/>
+        <a:off x="3484694" y="0"/>
+        <a:ext cx="4921982" cy="634386"/>
       </dsp:txXfrm>
     </dsp:sp>
     <dsp:sp modelId="{7E667D03-8B49-4B4A-BDB0-10855DA49168}">
@@ -14170,8 +14226,8 @@
       </dsp:nvSpPr>
       <dsp:spPr>
         <a:xfrm>
-          <a:off x="14151" y="2160047"/>
-          <a:ext cx="3935517" cy="3530401"/>
+          <a:off x="20305" y="1559553"/>
+          <a:ext cx="4148412" cy="3721381"/>
         </a:xfrm>
         <a:prstGeom prst="rect">
           <a:avLst/>
@@ -14212,12 +14268,12 @@
         </a:fontRef>
       </dsp:style>
       <dsp:txBody>
-        <a:bodyPr spcFirstLastPara="0" vert="horz" wrap="square" lIns="17780" tIns="17780" rIns="17780" bIns="17780" numCol="1" spcCol="1270" anchor="ctr" anchorCtr="0">
+        <a:bodyPr spcFirstLastPara="0" vert="horz" wrap="square" lIns="11430" tIns="11430" rIns="11430" bIns="11430" numCol="1" spcCol="1270" anchor="ctr" anchorCtr="0">
           <a:noAutofit/>
         </a:bodyPr>
         <a:lstStyle/>
         <a:p>
-          <a:pPr lvl="0" algn="ctr" defTabSz="1244600">
+          <a:pPr lvl="0" algn="l" defTabSz="800100">
             <a:lnSpc>
               <a:spcPct val="90000"/>
             </a:lnSpc>
@@ -14228,15 +14284,16 @@
               <a:spcPct val="35000"/>
             </a:spcAft>
           </a:pPr>
-          <a:endParaRPr lang="en-US" sz="2800" kern="1200" dirty="0" smtClean="0">
+          <a:endParaRPr lang="en-US" sz="1800" kern="1200" dirty="0" smtClean="0">
             <a:solidFill>
               <a:srgbClr val="FFFF00"/>
             </a:solidFill>
-            <a:latin typeface="Buxton Sketch" panose="03080500000500000004" pitchFamily="66" charset="0"/>
+            <a:latin typeface="Cambria Math" panose="02040503050406030204" pitchFamily="18" charset="0"/>
+            <a:ea typeface="Cambria Math" panose="02040503050406030204" pitchFamily="18" charset="0"/>
           </a:endParaRPr>
         </a:p>
         <a:p>
-          <a:pPr lvl="0" algn="ctr" defTabSz="1244600">
+          <a:pPr lvl="0" algn="l" defTabSz="800100">
             <a:lnSpc>
               <a:spcPct val="90000"/>
             </a:lnSpc>
@@ -14248,17 +14305,18 @@
             </a:spcAft>
           </a:pPr>
           <a:r>
-            <a:rPr lang="en-US" sz="2800" kern="1200" dirty="0" smtClean="0">
+            <a:rPr lang="en-US" sz="1800" kern="1200" dirty="0" smtClean="0">
               <a:solidFill>
                 <a:srgbClr val="FFFF00"/>
               </a:solidFill>
-              <a:latin typeface="Buxton Sketch" panose="03080500000500000004" pitchFamily="66" charset="0"/>
+              <a:latin typeface="Cambria Math" panose="02040503050406030204" pitchFamily="18" charset="0"/>
+              <a:ea typeface="Cambria Math" panose="02040503050406030204" pitchFamily="18" charset="0"/>
             </a:rPr>
             <a:t>While Loops</a:t>
           </a:r>
         </a:p>
         <a:p>
-          <a:pPr lvl="0" algn="l" defTabSz="1244600">
+          <a:pPr lvl="0" algn="l" defTabSz="800100">
             <a:lnSpc>
               <a:spcPct val="90000"/>
             </a:lnSpc>
@@ -14270,50 +14328,56 @@
             </a:spcAft>
           </a:pPr>
           <a:r>
-            <a:rPr lang="en-US" sz="2000" kern="1200" dirty="0" smtClean="0">
-              <a:latin typeface="Buxton Sketch" panose="03080500000500000004" pitchFamily="66" charset="0"/>
+            <a:rPr lang="en-US" sz="1800" kern="1200" dirty="0" smtClean="0">
+              <a:latin typeface="Cambria Math" panose="02040503050406030204" pitchFamily="18" charset="0"/>
+              <a:ea typeface="Cambria Math" panose="02040503050406030204" pitchFamily="18" charset="0"/>
             </a:rPr>
             <a:t>string </a:t>
           </a:r>
           <a:r>
-            <a:rPr lang="en-US" sz="2000" kern="1200" dirty="0" err="1" smtClean="0">
+            <a:rPr lang="en-US" sz="1800" kern="1200" dirty="0" err="1" smtClean="0">
               <a:solidFill>
                 <a:srgbClr val="00B0F0"/>
               </a:solidFill>
-              <a:latin typeface="Buxton Sketch" panose="03080500000500000004" pitchFamily="66" charset="0"/>
+              <a:latin typeface="Cambria Math" panose="02040503050406030204" pitchFamily="18" charset="0"/>
+              <a:ea typeface="Cambria Math" panose="02040503050406030204" pitchFamily="18" charset="0"/>
             </a:rPr>
             <a:t>myName</a:t>
           </a:r>
           <a:r>
-            <a:rPr lang="en-US" sz="2000" kern="1200" dirty="0" smtClean="0">
-              <a:latin typeface="Buxton Sketch" panose="03080500000500000004" pitchFamily="66" charset="0"/>
+            <a:rPr lang="en-US" sz="1800" kern="1200" dirty="0" smtClean="0">
+              <a:latin typeface="Cambria Math" panose="02040503050406030204" pitchFamily="18" charset="0"/>
+              <a:ea typeface="Cambria Math" panose="02040503050406030204" pitchFamily="18" charset="0"/>
             </a:rPr>
             <a:t> = </a:t>
           </a:r>
           <a:r>
-            <a:rPr lang="en-US" sz="2000" kern="1200" dirty="0" err="1" smtClean="0">
+            <a:rPr lang="en-US" sz="1800" kern="1200" dirty="0" err="1" smtClean="0">
               <a:solidFill>
                 <a:srgbClr val="00B050"/>
               </a:solidFill>
-              <a:latin typeface="Buxton Sketch" panose="03080500000500000004" pitchFamily="66" charset="0"/>
+              <a:latin typeface="Cambria Math" panose="02040503050406030204" pitchFamily="18" charset="0"/>
+              <a:ea typeface="Cambria Math" panose="02040503050406030204" pitchFamily="18" charset="0"/>
             </a:rPr>
             <a:t>Console</a:t>
           </a:r>
           <a:r>
-            <a:rPr lang="en-US" sz="2000" kern="1200" dirty="0" err="1" smtClean="0">
-              <a:latin typeface="Buxton Sketch" panose="03080500000500000004" pitchFamily="66" charset="0"/>
+            <a:rPr lang="en-US" sz="1800" kern="1200" dirty="0" err="1" smtClean="0">
+              <a:latin typeface="Cambria Math" panose="02040503050406030204" pitchFamily="18" charset="0"/>
+              <a:ea typeface="Cambria Math" panose="02040503050406030204" pitchFamily="18" charset="0"/>
             </a:rPr>
             <a:t>.ReadLine</a:t>
           </a:r>
           <a:r>
-            <a:rPr lang="en-US" sz="2000" kern="1200" dirty="0" smtClean="0">
-              <a:latin typeface="Buxton Sketch" panose="03080500000500000004" pitchFamily="66" charset="0"/>
+            <a:rPr lang="en-US" sz="1800" kern="1200" dirty="0" smtClean="0">
+              <a:latin typeface="Cambria Math" panose="02040503050406030204" pitchFamily="18" charset="0"/>
+              <a:ea typeface="Cambria Math" panose="02040503050406030204" pitchFamily="18" charset="0"/>
             </a:rPr>
             <a:t>();</a:t>
           </a:r>
         </a:p>
         <a:p>
-          <a:pPr lvl="0" algn="l" defTabSz="1244600">
+          <a:pPr lvl="0" algn="l" defTabSz="800100">
             <a:lnSpc>
               <a:spcPct val="90000"/>
             </a:lnSpc>
@@ -14325,29 +14389,32 @@
             </a:spcAft>
           </a:pPr>
           <a:r>
-            <a:rPr lang="en-US" sz="2000" kern="1200" dirty="0" smtClean="0">
-              <a:latin typeface="Buxton Sketch" panose="03080500000500000004" pitchFamily="66" charset="0"/>
+            <a:rPr lang="en-US" sz="1800" kern="1200" dirty="0" smtClean="0">
+              <a:latin typeface="Cambria Math" panose="02040503050406030204" pitchFamily="18" charset="0"/>
+              <a:ea typeface="Cambria Math" panose="02040503050406030204" pitchFamily="18" charset="0"/>
             </a:rPr>
             <a:t>while(</a:t>
           </a:r>
           <a:r>
-            <a:rPr lang="en-US" sz="2000" kern="1200" dirty="0" err="1" smtClean="0">
+            <a:rPr lang="en-US" sz="1800" kern="1200" dirty="0" err="1" smtClean="0">
               <a:solidFill>
                 <a:srgbClr val="00B0F0"/>
               </a:solidFill>
-              <a:latin typeface="Buxton Sketch" panose="03080500000500000004" pitchFamily="66" charset="0"/>
+              <a:latin typeface="Cambria Math" panose="02040503050406030204" pitchFamily="18" charset="0"/>
+              <a:ea typeface="Cambria Math" panose="02040503050406030204" pitchFamily="18" charset="0"/>
             </a:rPr>
             <a:t>myName</a:t>
           </a:r>
           <a:r>
-            <a:rPr lang="en-US" sz="2000" kern="1200" dirty="0" smtClean="0">
-              <a:latin typeface="Buxton Sketch" panose="03080500000500000004" pitchFamily="66" charset="0"/>
+            <a:rPr lang="en-US" sz="1800" kern="1200" dirty="0" smtClean="0">
+              <a:latin typeface="Cambria Math" panose="02040503050406030204" pitchFamily="18" charset="0"/>
+              <a:ea typeface="Cambria Math" panose="02040503050406030204" pitchFamily="18" charset="0"/>
             </a:rPr>
             <a:t> != “Bugs Bunny”)</a:t>
           </a:r>
         </a:p>
         <a:p>
-          <a:pPr lvl="0" algn="l" defTabSz="1244600">
+          <a:pPr lvl="0" algn="l" defTabSz="800100">
             <a:lnSpc>
               <a:spcPct val="90000"/>
             </a:lnSpc>
@@ -14359,14 +14426,15 @@
             </a:spcAft>
           </a:pPr>
           <a:r>
-            <a:rPr lang="en-US" sz="2000" kern="1200" dirty="0" smtClean="0">
-              <a:latin typeface="Buxton Sketch" panose="03080500000500000004" pitchFamily="66" charset="0"/>
+            <a:rPr lang="en-US" sz="1800" kern="1200" dirty="0" smtClean="0">
+              <a:latin typeface="Cambria Math" panose="02040503050406030204" pitchFamily="18" charset="0"/>
+              <a:ea typeface="Cambria Math" panose="02040503050406030204" pitchFamily="18" charset="0"/>
             </a:rPr>
             <a:t>{</a:t>
           </a:r>
         </a:p>
         <a:p>
-          <a:pPr lvl="0" algn="l" defTabSz="1244600">
+          <a:pPr lvl="0" algn="l" defTabSz="800100">
             <a:lnSpc>
               <a:spcPct val="90000"/>
             </a:lnSpc>
@@ -14378,35 +14446,39 @@
             </a:spcAft>
           </a:pPr>
           <a:r>
-            <a:rPr lang="en-US" sz="2000" kern="1200" dirty="0" smtClean="0">
-              <a:latin typeface="Buxton Sketch" panose="03080500000500000004" pitchFamily="66" charset="0"/>
+            <a:rPr lang="en-US" sz="1800" kern="1200" dirty="0" smtClean="0">
+              <a:latin typeface="Cambria Math" panose="02040503050406030204" pitchFamily="18" charset="0"/>
+              <a:ea typeface="Cambria Math" panose="02040503050406030204" pitchFamily="18" charset="0"/>
             </a:rPr>
             <a:t>    </a:t>
           </a:r>
           <a:r>
-            <a:rPr lang="en-US" sz="2000" kern="1200" dirty="0" err="1" smtClean="0">
+            <a:rPr lang="en-US" sz="1800" kern="1200" dirty="0" err="1" smtClean="0">
               <a:solidFill>
                 <a:srgbClr val="00B050"/>
               </a:solidFill>
-              <a:latin typeface="Buxton Sketch" panose="03080500000500000004" pitchFamily="66" charset="0"/>
+              <a:latin typeface="Cambria Math" panose="02040503050406030204" pitchFamily="18" charset="0"/>
+              <a:ea typeface="Cambria Math" panose="02040503050406030204" pitchFamily="18" charset="0"/>
             </a:rPr>
             <a:t>Console</a:t>
           </a:r>
           <a:r>
-            <a:rPr lang="en-US" sz="2000" kern="1200" dirty="0" err="1" smtClean="0">
-              <a:latin typeface="Buxton Sketch" panose="03080500000500000004" pitchFamily="66" charset="0"/>
+            <a:rPr lang="en-US" sz="1800" kern="1200" dirty="0" err="1" smtClean="0">
+              <a:latin typeface="Cambria Math" panose="02040503050406030204" pitchFamily="18" charset="0"/>
+              <a:ea typeface="Cambria Math" panose="02040503050406030204" pitchFamily="18" charset="0"/>
             </a:rPr>
             <a:t>.WriteLine</a:t>
           </a:r>
           <a:r>
-            <a:rPr lang="en-US" sz="2000" kern="1200" dirty="0" smtClean="0">
-              <a:latin typeface="Buxton Sketch" panose="03080500000500000004" pitchFamily="66" charset="0"/>
+            <a:rPr lang="en-US" sz="1800" kern="1200" dirty="0" smtClean="0">
+              <a:latin typeface="Cambria Math" panose="02040503050406030204" pitchFamily="18" charset="0"/>
+              <a:ea typeface="Cambria Math" panose="02040503050406030204" pitchFamily="18" charset="0"/>
             </a:rPr>
             <a:t>(“Enter your name!”);</a:t>
           </a:r>
         </a:p>
         <a:p>
-          <a:pPr lvl="0" algn="l" defTabSz="1244600">
+          <a:pPr lvl="0" algn="l" defTabSz="800100">
             <a:lnSpc>
               <a:spcPct val="90000"/>
             </a:lnSpc>
@@ -14418,50 +14490,56 @@
             </a:spcAft>
           </a:pPr>
           <a:r>
-            <a:rPr lang="en-US" sz="2000" kern="1200" dirty="0" smtClean="0">
-              <a:latin typeface="Buxton Sketch" panose="03080500000500000004" pitchFamily="66" charset="0"/>
+            <a:rPr lang="en-US" sz="1800" kern="1200" dirty="0" smtClean="0">
+              <a:latin typeface="Cambria Math" panose="02040503050406030204" pitchFamily="18" charset="0"/>
+              <a:ea typeface="Cambria Math" panose="02040503050406030204" pitchFamily="18" charset="0"/>
             </a:rPr>
             <a:t>    </a:t>
           </a:r>
           <a:r>
-            <a:rPr lang="en-US" sz="2000" kern="1200" dirty="0" err="1" smtClean="0">
+            <a:rPr lang="en-US" sz="1800" kern="1200" dirty="0" err="1" smtClean="0">
               <a:solidFill>
                 <a:srgbClr val="00B0F0"/>
               </a:solidFill>
-              <a:latin typeface="Buxton Sketch" panose="03080500000500000004" pitchFamily="66" charset="0"/>
+              <a:latin typeface="Cambria Math" panose="02040503050406030204" pitchFamily="18" charset="0"/>
+              <a:ea typeface="Cambria Math" panose="02040503050406030204" pitchFamily="18" charset="0"/>
             </a:rPr>
             <a:t>myName</a:t>
           </a:r>
           <a:r>
-            <a:rPr lang="en-US" sz="2000" kern="1200" dirty="0" smtClean="0">
-              <a:latin typeface="Buxton Sketch" panose="03080500000500000004" pitchFamily="66" charset="0"/>
+            <a:rPr lang="en-US" sz="1800" kern="1200" dirty="0" smtClean="0">
+              <a:latin typeface="Cambria Math" panose="02040503050406030204" pitchFamily="18" charset="0"/>
+              <a:ea typeface="Cambria Math" panose="02040503050406030204" pitchFamily="18" charset="0"/>
             </a:rPr>
             <a:t> = </a:t>
           </a:r>
           <a:r>
-            <a:rPr lang="en-US" sz="2000" kern="1200" dirty="0" err="1" smtClean="0">
+            <a:rPr lang="en-US" sz="1800" kern="1200" dirty="0" err="1" smtClean="0">
               <a:solidFill>
                 <a:srgbClr val="00B050"/>
               </a:solidFill>
-              <a:latin typeface="Buxton Sketch" panose="03080500000500000004" pitchFamily="66" charset="0"/>
+              <a:latin typeface="Cambria Math" panose="02040503050406030204" pitchFamily="18" charset="0"/>
+              <a:ea typeface="Cambria Math" panose="02040503050406030204" pitchFamily="18" charset="0"/>
             </a:rPr>
             <a:t>Console</a:t>
           </a:r>
           <a:r>
-            <a:rPr lang="en-US" sz="2000" kern="1200" dirty="0" err="1" smtClean="0">
-              <a:latin typeface="Buxton Sketch" panose="03080500000500000004" pitchFamily="66" charset="0"/>
+            <a:rPr lang="en-US" sz="1800" kern="1200" dirty="0" err="1" smtClean="0">
+              <a:latin typeface="Cambria Math" panose="02040503050406030204" pitchFamily="18" charset="0"/>
+              <a:ea typeface="Cambria Math" panose="02040503050406030204" pitchFamily="18" charset="0"/>
             </a:rPr>
             <a:t>.ReadLIne</a:t>
           </a:r>
           <a:r>
-            <a:rPr lang="en-US" sz="2000" kern="1200" dirty="0" smtClean="0">
-              <a:latin typeface="Buxton Sketch" panose="03080500000500000004" pitchFamily="66" charset="0"/>
+            <a:rPr lang="en-US" sz="1800" kern="1200" dirty="0" smtClean="0">
+              <a:latin typeface="Cambria Math" panose="02040503050406030204" pitchFamily="18" charset="0"/>
+              <a:ea typeface="Cambria Math" panose="02040503050406030204" pitchFamily="18" charset="0"/>
             </a:rPr>
             <a:t>();	</a:t>
           </a:r>
         </a:p>
         <a:p>
-          <a:pPr lvl="0" algn="l" defTabSz="1244600">
+          <a:pPr lvl="0" algn="l" defTabSz="800100">
             <a:lnSpc>
               <a:spcPct val="90000"/>
             </a:lnSpc>
@@ -14473,14 +14551,15 @@
             </a:spcAft>
           </a:pPr>
           <a:r>
-            <a:rPr lang="en-US" sz="2000" kern="1200" dirty="0" smtClean="0">
-              <a:latin typeface="Buxton Sketch" panose="03080500000500000004" pitchFamily="66" charset="0"/>
+            <a:rPr lang="en-US" sz="1800" kern="1200" dirty="0" smtClean="0">
+              <a:latin typeface="Cambria Math" panose="02040503050406030204" pitchFamily="18" charset="0"/>
+              <a:ea typeface="Cambria Math" panose="02040503050406030204" pitchFamily="18" charset="0"/>
             </a:rPr>
             <a:t>}</a:t>
           </a:r>
         </a:p>
         <a:p>
-          <a:pPr lvl="0" algn="ctr" defTabSz="1244600">
+          <a:pPr lvl="0" algn="l" defTabSz="800100">
             <a:lnSpc>
               <a:spcPct val="90000"/>
             </a:lnSpc>
@@ -14491,14 +14570,15 @@
               <a:spcPct val="35000"/>
             </a:spcAft>
           </a:pPr>
-          <a:endParaRPr lang="en-US" sz="2800" kern="1200" dirty="0">
-            <a:latin typeface="Buxton Sketch" panose="03080500000500000004" pitchFamily="66" charset="0"/>
+          <a:endParaRPr lang="en-US" sz="1800" kern="1200" dirty="0">
+            <a:latin typeface="Cambria Math" panose="02040503050406030204" pitchFamily="18" charset="0"/>
+            <a:ea typeface="Cambria Math" panose="02040503050406030204" pitchFamily="18" charset="0"/>
           </a:endParaRPr>
         </a:p>
       </dsp:txBody>
       <dsp:txXfrm>
-        <a:off x="14151" y="2160047"/>
-        <a:ext cx="3935517" cy="3530401"/>
+        <a:off x="20305" y="1559553"/>
+        <a:ext cx="4148412" cy="3721381"/>
       </dsp:txXfrm>
     </dsp:sp>
     <dsp:sp modelId="{BC0C9976-79C2-4CCD-9FCC-AEDADFE68DB4}">
@@ -14508,8 +14588,8 @@
       </dsp:nvSpPr>
       <dsp:spPr>
         <a:xfrm>
-          <a:off x="4433118" y="2160047"/>
-          <a:ext cx="2363361" cy="3968817"/>
+          <a:off x="4678320" y="1559553"/>
+          <a:ext cx="2491209" cy="2338473"/>
         </a:xfrm>
         <a:prstGeom prst="rect">
           <a:avLst/>
@@ -14550,12 +14630,12 @@
         </a:fontRef>
       </dsp:style>
       <dsp:txBody>
-        <a:bodyPr spcFirstLastPara="0" vert="horz" wrap="square" lIns="20320" tIns="20320" rIns="20320" bIns="20320" numCol="1" spcCol="1270" anchor="ctr" anchorCtr="0">
+        <a:bodyPr spcFirstLastPara="0" vert="horz" wrap="square" lIns="11430" tIns="11430" rIns="11430" bIns="11430" numCol="1" spcCol="1270" anchor="ctr" anchorCtr="0">
           <a:noAutofit/>
         </a:bodyPr>
         <a:lstStyle/>
         <a:p>
-          <a:pPr lvl="0" algn="ctr" defTabSz="1422400">
+          <a:pPr lvl="0" algn="l" defTabSz="800100">
             <a:lnSpc>
               <a:spcPct val="90000"/>
             </a:lnSpc>
@@ -14566,15 +14646,16 @@
               <a:spcPct val="35000"/>
             </a:spcAft>
           </a:pPr>
-          <a:endParaRPr lang="en-US" sz="3200" kern="1200" dirty="0" smtClean="0">
+          <a:endParaRPr lang="en-US" sz="1800" kern="1200" dirty="0" smtClean="0">
             <a:solidFill>
               <a:srgbClr val="FFFF00"/>
             </a:solidFill>
-            <a:latin typeface="Buxton Sketch" panose="03080500000500000004" pitchFamily="66" charset="0"/>
+            <a:latin typeface="Cambria Math" panose="02040503050406030204" pitchFamily="18" charset="0"/>
+            <a:ea typeface="Cambria Math" panose="02040503050406030204" pitchFamily="18" charset="0"/>
           </a:endParaRPr>
         </a:p>
         <a:p>
-          <a:pPr lvl="0" algn="ctr" defTabSz="1422400">
+          <a:pPr lvl="0" algn="ctr" defTabSz="800100">
             <a:lnSpc>
               <a:spcPct val="90000"/>
             </a:lnSpc>
@@ -14586,17 +14667,18 @@
             </a:spcAft>
           </a:pPr>
           <a:r>
-            <a:rPr lang="en-US" sz="2800" kern="1200" dirty="0" smtClean="0">
+            <a:rPr lang="en-US" sz="1800" kern="1200" dirty="0" smtClean="0">
               <a:solidFill>
                 <a:srgbClr val="FFFF00"/>
               </a:solidFill>
-              <a:latin typeface="Buxton Sketch" panose="03080500000500000004" pitchFamily="66" charset="0"/>
+              <a:latin typeface="Cambria Math" panose="02040503050406030204" pitchFamily="18" charset="0"/>
+              <a:ea typeface="Cambria Math" panose="02040503050406030204" pitchFamily="18" charset="0"/>
             </a:rPr>
             <a:t>Do-While Loops</a:t>
           </a:r>
         </a:p>
         <a:p>
-          <a:pPr lvl="0" algn="ctr" defTabSz="1422400">
+          <a:pPr lvl="0" algn="ctr" defTabSz="800100">
             <a:lnSpc>
               <a:spcPct val="90000"/>
             </a:lnSpc>
@@ -14608,26 +14690,28 @@
             </a:spcAft>
           </a:pPr>
           <a:r>
-            <a:rPr lang="en-US" sz="2800" kern="1200" dirty="0" err="1" smtClean="0">
+            <a:rPr lang="en-US" sz="1800" kern="1200" dirty="0" err="1" smtClean="0">
               <a:solidFill>
                 <a:srgbClr val="FFFF00"/>
               </a:solidFill>
-              <a:latin typeface="Buxton Sketch" panose="03080500000500000004" pitchFamily="66" charset="0"/>
+              <a:latin typeface="Cambria Math" panose="02040503050406030204" pitchFamily="18" charset="0"/>
+              <a:ea typeface="Cambria Math" panose="02040503050406030204" pitchFamily="18" charset="0"/>
             </a:rPr>
             <a:t>Foreach</a:t>
           </a:r>
           <a:r>
-            <a:rPr lang="en-US" sz="2800" kern="1200" dirty="0" smtClean="0">
+            <a:rPr lang="en-US" sz="1800" kern="1200" dirty="0" smtClean="0">
               <a:solidFill>
                 <a:srgbClr val="FFFF00"/>
               </a:solidFill>
-              <a:latin typeface="Buxton Sketch" panose="03080500000500000004" pitchFamily="66" charset="0"/>
+              <a:latin typeface="Cambria Math" panose="02040503050406030204" pitchFamily="18" charset="0"/>
+              <a:ea typeface="Cambria Math" panose="02040503050406030204" pitchFamily="18" charset="0"/>
             </a:rPr>
             <a:t> Loop</a:t>
           </a:r>
         </a:p>
         <a:p>
-          <a:pPr lvl="0" algn="ctr" defTabSz="1422400">
+          <a:pPr lvl="0" algn="ctr" defTabSz="800100">
             <a:lnSpc>
               <a:spcPct val="90000"/>
             </a:lnSpc>
@@ -14639,26 +14723,25 @@
             </a:spcAft>
           </a:pPr>
           <a:r>
-            <a:rPr lang="en-US" sz="2800" kern="1200" dirty="0" smtClean="0">
+            <a:rPr lang="en-US" sz="1800" kern="1200" dirty="0" smtClean="0">
               <a:solidFill>
                 <a:srgbClr val="FFFF00"/>
               </a:solidFill>
-              <a:latin typeface="Buxton Sketch" panose="03080500000500000004" pitchFamily="66" charset="0"/>
+              <a:latin typeface="Cambria Math" panose="02040503050406030204" pitchFamily="18" charset="0"/>
+              <a:ea typeface="Cambria Math" panose="02040503050406030204" pitchFamily="18" charset="0"/>
             </a:rPr>
             <a:t>Nested Loops </a:t>
           </a:r>
-          <a:r>
-            <a:rPr lang="en-US" sz="2800" kern="1200" dirty="0" smtClean="0">
-              <a:solidFill>
-                <a:schemeClr val="tx1"/>
-              </a:solidFill>
-              <a:latin typeface="Buxton Sketch" panose="03080500000500000004" pitchFamily="66" charset="0"/>
-            </a:rPr>
-            <a:t>-&gt; programming construct consisting several loops located into each other.</a:t>
-          </a:r>
+          <a:endParaRPr lang="en-US" sz="1800" kern="1200" dirty="0" smtClean="0">
+            <a:solidFill>
+              <a:srgbClr val="FFFF00"/>
+            </a:solidFill>
+            <a:latin typeface="Cambria Math" panose="02040503050406030204" pitchFamily="18" charset="0"/>
+            <a:ea typeface="Cambria Math" panose="02040503050406030204" pitchFamily="18" charset="0"/>
+          </a:endParaRPr>
         </a:p>
         <a:p>
-          <a:pPr lvl="0" algn="ctr" defTabSz="1422400">
+          <a:pPr lvl="0" algn="ctr" defTabSz="800100">
             <a:lnSpc>
               <a:spcPct val="90000"/>
             </a:lnSpc>
@@ -14669,17 +14752,51 @@
               <a:spcPct val="35000"/>
             </a:spcAft>
           </a:pPr>
-          <a:endParaRPr lang="en-US" sz="3200" kern="1200" dirty="0">
+          <a:r>
+            <a:rPr lang="en-US" sz="1800" kern="1200" dirty="0" smtClean="0">
+              <a:solidFill>
+                <a:schemeClr val="tx1"/>
+              </a:solidFill>
+              <a:latin typeface="Cambria Math" panose="02040503050406030204" pitchFamily="18" charset="0"/>
+              <a:ea typeface="Cambria Math" panose="02040503050406030204" pitchFamily="18" charset="0"/>
+            </a:rPr>
+            <a:t>-&gt; </a:t>
+          </a:r>
+          <a:r>
+            <a:rPr lang="en-US" sz="1800" kern="1200" dirty="0" smtClean="0">
+              <a:solidFill>
+                <a:schemeClr val="tx1"/>
+              </a:solidFill>
+              <a:latin typeface="Cambria Math" panose="02040503050406030204" pitchFamily="18" charset="0"/>
+              <a:ea typeface="Cambria Math" panose="02040503050406030204" pitchFamily="18" charset="0"/>
+            </a:rPr>
+            <a:t>programming construct consisting several loops located into each other.</a:t>
+          </a:r>
+        </a:p>
+        <a:p>
+          <a:pPr lvl="0" algn="l" defTabSz="800100">
+            <a:lnSpc>
+              <a:spcPct val="90000"/>
+            </a:lnSpc>
+            <a:spcBef>
+              <a:spcPct val="0"/>
+            </a:spcBef>
+            <a:spcAft>
+              <a:spcPct val="35000"/>
+            </a:spcAft>
+          </a:pPr>
+          <a:endParaRPr lang="en-US" sz="1800" kern="1200" dirty="0">
             <a:solidFill>
               <a:srgbClr val="FFFF00"/>
             </a:solidFill>
-            <a:latin typeface="Buxton Sketch" panose="03080500000500000004" pitchFamily="66" charset="0"/>
+            <a:latin typeface="Cambria Math" panose="02040503050406030204" pitchFamily="18" charset="0"/>
+            <a:ea typeface="Cambria Math" panose="02040503050406030204" pitchFamily="18" charset="0"/>
           </a:endParaRPr>
         </a:p>
       </dsp:txBody>
       <dsp:txXfrm>
-        <a:off x="4433118" y="2160047"/>
-        <a:ext cx="2363361" cy="3968817"/>
+        <a:off x="4678320" y="1559553"/>
+        <a:ext cx="2491209" cy="2338473"/>
       </dsp:txXfrm>
     </dsp:sp>
     <dsp:sp modelId="{CECD2C1A-D1AF-4B3F-BCEC-0C6E19DFFA0D}">
@@ -14689,8 +14806,8 @@
       </dsp:nvSpPr>
       <dsp:spPr>
         <a:xfrm>
-          <a:off x="7200945" y="2199710"/>
-          <a:ext cx="4675414" cy="4402257"/>
+          <a:off x="7595875" y="1608929"/>
+          <a:ext cx="4270058" cy="4640401"/>
         </a:xfrm>
         <a:prstGeom prst="rect">
           <a:avLst/>
@@ -14731,12 +14848,12 @@
         </a:fontRef>
       </dsp:style>
       <dsp:txBody>
-        <a:bodyPr spcFirstLastPara="0" vert="horz" wrap="square" lIns="17780" tIns="17780" rIns="17780" bIns="17780" numCol="1" spcCol="1270" anchor="ctr" anchorCtr="0">
+        <a:bodyPr spcFirstLastPara="0" vert="horz" wrap="square" lIns="11430" tIns="11430" rIns="11430" bIns="11430" numCol="1" spcCol="1270" anchor="ctr" anchorCtr="0">
           <a:noAutofit/>
         </a:bodyPr>
         <a:lstStyle/>
         <a:p>
-          <a:pPr lvl="0" algn="ctr" defTabSz="1244600">
+          <a:pPr lvl="0" algn="l" defTabSz="800100">
             <a:lnSpc>
               <a:spcPct val="90000"/>
             </a:lnSpc>
@@ -14747,15 +14864,16 @@
               <a:spcPct val="35000"/>
             </a:spcAft>
           </a:pPr>
-          <a:endParaRPr lang="en-US" sz="2800" kern="1200" dirty="0" smtClean="0">
+          <a:endParaRPr lang="en-US" sz="1800" kern="1200" dirty="0" smtClean="0">
             <a:solidFill>
               <a:srgbClr val="FFFF00"/>
             </a:solidFill>
-            <a:latin typeface="Buxton Sketch" panose="03080500000500000004" pitchFamily="66" charset="0"/>
+            <a:latin typeface="Cambria Math" panose="02040503050406030204" pitchFamily="18" charset="0"/>
+            <a:ea typeface="Cambria Math" panose="02040503050406030204" pitchFamily="18" charset="0"/>
           </a:endParaRPr>
         </a:p>
         <a:p>
-          <a:pPr lvl="0" algn="ctr" defTabSz="1244600">
+          <a:pPr lvl="0" algn="l" defTabSz="800100">
             <a:lnSpc>
               <a:spcPct val="90000"/>
             </a:lnSpc>
@@ -14766,15 +14884,16 @@
               <a:spcPct val="35000"/>
             </a:spcAft>
           </a:pPr>
-          <a:endParaRPr lang="en-US" sz="2800" kern="1200" dirty="0" smtClean="0">
+          <a:endParaRPr lang="en-US" sz="1800" kern="1200" dirty="0" smtClean="0">
             <a:solidFill>
               <a:srgbClr val="FFFF00"/>
             </a:solidFill>
-            <a:latin typeface="Buxton Sketch" panose="03080500000500000004" pitchFamily="66" charset="0"/>
+            <a:latin typeface="Cambria Math" panose="02040503050406030204" pitchFamily="18" charset="0"/>
+            <a:ea typeface="Cambria Math" panose="02040503050406030204" pitchFamily="18" charset="0"/>
           </a:endParaRPr>
         </a:p>
         <a:p>
-          <a:pPr lvl="0" algn="ctr" defTabSz="1244600">
+          <a:pPr lvl="0" algn="l" defTabSz="800100">
             <a:lnSpc>
               <a:spcPct val="90000"/>
             </a:lnSpc>
@@ -14785,15 +14904,16 @@
               <a:spcPct val="35000"/>
             </a:spcAft>
           </a:pPr>
-          <a:endParaRPr lang="en-US" sz="2800" kern="1200" dirty="0" smtClean="0">
+          <a:endParaRPr lang="en-US" sz="1800" kern="1200" dirty="0" smtClean="0">
             <a:solidFill>
               <a:srgbClr val="FFFF00"/>
             </a:solidFill>
-            <a:latin typeface="Buxton Sketch" panose="03080500000500000004" pitchFamily="66" charset="0"/>
+            <a:latin typeface="Cambria Math" panose="02040503050406030204" pitchFamily="18" charset="0"/>
+            <a:ea typeface="Cambria Math" panose="02040503050406030204" pitchFamily="18" charset="0"/>
           </a:endParaRPr>
         </a:p>
         <a:p>
-          <a:pPr lvl="0" algn="ctr" defTabSz="1244600">
+          <a:pPr lvl="0" algn="l" defTabSz="800100">
             <a:lnSpc>
               <a:spcPct val="90000"/>
             </a:lnSpc>
@@ -14805,17 +14925,18 @@
             </a:spcAft>
           </a:pPr>
           <a:r>
-            <a:rPr lang="en-US" sz="2800" kern="1200" dirty="0" smtClean="0">
+            <a:rPr lang="en-US" sz="1800" kern="1200" dirty="0" smtClean="0">
               <a:solidFill>
                 <a:srgbClr val="FFFF00"/>
               </a:solidFill>
-              <a:latin typeface="Buxton Sketch" panose="03080500000500000004" pitchFamily="66" charset="0"/>
+              <a:latin typeface="Cambria Math" panose="02040503050406030204" pitchFamily="18" charset="0"/>
+              <a:ea typeface="Cambria Math" panose="02040503050406030204" pitchFamily="18" charset="0"/>
             </a:rPr>
             <a:t>For Loop</a:t>
           </a:r>
         </a:p>
         <a:p>
-          <a:pPr lvl="0" algn="just" defTabSz="1244600">
+          <a:pPr lvl="0" algn="l" defTabSz="800100">
             <a:lnSpc>
               <a:spcPct val="90000"/>
             </a:lnSpc>
@@ -14827,71 +14948,78 @@
             </a:spcAft>
           </a:pPr>
           <a:r>
-            <a:rPr lang="en-US" sz="2000" kern="1200" dirty="0" smtClean="0">
+            <a:rPr lang="en-US" sz="1800" kern="1200" dirty="0" smtClean="0">
               <a:solidFill>
                 <a:schemeClr val="tx1"/>
               </a:solidFill>
-              <a:latin typeface="Buxton Sketch" panose="03080500000500000004" pitchFamily="66" charset="0"/>
+              <a:latin typeface="Cambria Math" panose="02040503050406030204" pitchFamily="18" charset="0"/>
+              <a:ea typeface="Cambria Math" panose="02040503050406030204" pitchFamily="18" charset="0"/>
             </a:rPr>
             <a:t>for(</a:t>
           </a:r>
           <a:r>
-            <a:rPr lang="en-US" sz="2000" kern="1200" dirty="0" err="1" smtClean="0">
+            <a:rPr lang="en-US" sz="1800" kern="1200" dirty="0" err="1" smtClean="0">
               <a:solidFill>
                 <a:schemeClr val="tx1"/>
               </a:solidFill>
-              <a:latin typeface="Buxton Sketch" panose="03080500000500000004" pitchFamily="66" charset="0"/>
+              <a:latin typeface="Cambria Math" panose="02040503050406030204" pitchFamily="18" charset="0"/>
+              <a:ea typeface="Cambria Math" panose="02040503050406030204" pitchFamily="18" charset="0"/>
             </a:rPr>
             <a:t>i</a:t>
           </a:r>
           <a:r>
-            <a:rPr lang="en-US" sz="2000" kern="1200" dirty="0" smtClean="0">
+            <a:rPr lang="en-US" sz="1800" kern="1200" dirty="0" smtClean="0">
               <a:solidFill>
                 <a:schemeClr val="tx1"/>
               </a:solidFill>
-              <a:latin typeface="Buxton Sketch" panose="03080500000500000004" pitchFamily="66" charset="0"/>
+              <a:latin typeface="Cambria Math" panose="02040503050406030204" pitchFamily="18" charset="0"/>
+              <a:ea typeface="Cambria Math" panose="02040503050406030204" pitchFamily="18" charset="0"/>
             </a:rPr>
             <a:t> = 0; </a:t>
           </a:r>
           <a:r>
-            <a:rPr lang="en-US" sz="2000" kern="1200" dirty="0" err="1" smtClean="0">
+            <a:rPr lang="en-US" sz="1800" kern="1200" dirty="0" err="1" smtClean="0">
               <a:solidFill>
                 <a:schemeClr val="tx1"/>
               </a:solidFill>
-              <a:latin typeface="Buxton Sketch" panose="03080500000500000004" pitchFamily="66" charset="0"/>
+              <a:latin typeface="Cambria Math" panose="02040503050406030204" pitchFamily="18" charset="0"/>
+              <a:ea typeface="Cambria Math" panose="02040503050406030204" pitchFamily="18" charset="0"/>
             </a:rPr>
             <a:t>i</a:t>
           </a:r>
           <a:r>
-            <a:rPr lang="en-US" sz="2000" kern="1200" dirty="0" smtClean="0">
+            <a:rPr lang="en-US" sz="1800" kern="1200" dirty="0" smtClean="0">
               <a:solidFill>
                 <a:schemeClr val="tx1"/>
               </a:solidFill>
-              <a:latin typeface="Buxton Sketch" panose="03080500000500000004" pitchFamily="66" charset="0"/>
+              <a:latin typeface="Cambria Math" panose="02040503050406030204" pitchFamily="18" charset="0"/>
+              <a:ea typeface="Cambria Math" panose="02040503050406030204" pitchFamily="18" charset="0"/>
             </a:rPr>
             <a:t> &lt;= 10; </a:t>
           </a:r>
           <a:r>
-            <a:rPr lang="en-US" sz="2000" kern="1200" dirty="0" err="1" smtClean="0">
+            <a:rPr lang="en-US" sz="1800" kern="1200" dirty="0" err="1" smtClean="0">
               <a:solidFill>
                 <a:schemeClr val="tx1"/>
               </a:solidFill>
-              <a:latin typeface="Buxton Sketch" panose="03080500000500000004" pitchFamily="66" charset="0"/>
+              <a:latin typeface="Cambria Math" panose="02040503050406030204" pitchFamily="18" charset="0"/>
+              <a:ea typeface="Cambria Math" panose="02040503050406030204" pitchFamily="18" charset="0"/>
             </a:rPr>
             <a:t>i</a:t>
           </a:r>
           <a:r>
-            <a:rPr lang="en-US" sz="2000" kern="1200" dirty="0" smtClean="0">
+            <a:rPr lang="en-US" sz="1800" kern="1200" dirty="0" smtClean="0">
               <a:solidFill>
                 <a:schemeClr val="tx1"/>
               </a:solidFill>
-              <a:latin typeface="Buxton Sketch" panose="03080500000500000004" pitchFamily="66" charset="0"/>
+              <a:latin typeface="Cambria Math" panose="02040503050406030204" pitchFamily="18" charset="0"/>
+              <a:ea typeface="Cambria Math" panose="02040503050406030204" pitchFamily="18" charset="0"/>
             </a:rPr>
             <a:t>++)</a:t>
           </a:r>
         </a:p>
         <a:p>
-          <a:pPr lvl="0" algn="just" defTabSz="1244600">
+          <a:pPr lvl="0" algn="l" defTabSz="800100">
             <a:lnSpc>
               <a:spcPct val="90000"/>
             </a:lnSpc>
@@ -14903,17 +15031,18 @@
             </a:spcAft>
           </a:pPr>
           <a:r>
-            <a:rPr lang="en-US" sz="2000" kern="1200" dirty="0" smtClean="0">
+            <a:rPr lang="en-US" sz="1800" kern="1200" dirty="0" smtClean="0">
               <a:solidFill>
                 <a:schemeClr val="tx1"/>
               </a:solidFill>
-              <a:latin typeface="Buxton Sketch" panose="03080500000500000004" pitchFamily="66" charset="0"/>
+              <a:latin typeface="Cambria Math" panose="02040503050406030204" pitchFamily="18" charset="0"/>
+              <a:ea typeface="Cambria Math" panose="02040503050406030204" pitchFamily="18" charset="0"/>
             </a:rPr>
             <a:t>{</a:t>
           </a:r>
         </a:p>
         <a:p>
-          <a:pPr lvl="0" algn="just" defTabSz="1244600">
+          <a:pPr lvl="0" algn="l" defTabSz="800100">
             <a:lnSpc>
               <a:spcPct val="90000"/>
             </a:lnSpc>
@@ -14925,62 +15054,68 @@
             </a:spcAft>
           </a:pPr>
           <a:r>
-            <a:rPr lang="en-US" sz="2000" kern="1200" dirty="0" smtClean="0">
+            <a:rPr lang="en-US" sz="1800" kern="1200" dirty="0" smtClean="0">
               <a:solidFill>
                 <a:schemeClr val="tx1"/>
               </a:solidFill>
-              <a:latin typeface="Buxton Sketch" panose="03080500000500000004" pitchFamily="66" charset="0"/>
+              <a:latin typeface="Cambria Math" panose="02040503050406030204" pitchFamily="18" charset="0"/>
+              <a:ea typeface="Cambria Math" panose="02040503050406030204" pitchFamily="18" charset="0"/>
             </a:rPr>
             <a:t>    </a:t>
           </a:r>
           <a:r>
-            <a:rPr lang="en-US" sz="2000" kern="1200" dirty="0" err="1" smtClean="0">
+            <a:rPr lang="en-US" sz="1800" kern="1200" dirty="0" err="1" smtClean="0">
               <a:solidFill>
                 <a:srgbClr val="00B050"/>
               </a:solidFill>
-              <a:latin typeface="Buxton Sketch" panose="03080500000500000004" pitchFamily="66" charset="0"/>
+              <a:latin typeface="Cambria Math" panose="02040503050406030204" pitchFamily="18" charset="0"/>
+              <a:ea typeface="Cambria Math" panose="02040503050406030204" pitchFamily="18" charset="0"/>
             </a:rPr>
             <a:t>Console</a:t>
           </a:r>
           <a:r>
-            <a:rPr lang="en-US" sz="2000" kern="1200" dirty="0" err="1" smtClean="0">
+            <a:rPr lang="en-US" sz="1800" kern="1200" dirty="0" err="1" smtClean="0">
               <a:solidFill>
                 <a:schemeClr val="tx1"/>
               </a:solidFill>
-              <a:latin typeface="Buxton Sketch" panose="03080500000500000004" pitchFamily="66" charset="0"/>
+              <a:latin typeface="Cambria Math" panose="02040503050406030204" pitchFamily="18" charset="0"/>
+              <a:ea typeface="Cambria Math" panose="02040503050406030204" pitchFamily="18" charset="0"/>
             </a:rPr>
             <a:t>.WriteLine</a:t>
           </a:r>
           <a:r>
-            <a:rPr lang="en-US" sz="2000" kern="1200" dirty="0" smtClean="0">
+            <a:rPr lang="en-US" sz="1800" kern="1200" dirty="0" smtClean="0">
               <a:solidFill>
                 <a:schemeClr val="tx1"/>
               </a:solidFill>
-              <a:latin typeface="Buxton Sketch" panose="03080500000500000004" pitchFamily="66" charset="0"/>
+              <a:latin typeface="Cambria Math" panose="02040503050406030204" pitchFamily="18" charset="0"/>
+              <a:ea typeface="Cambria Math" panose="02040503050406030204" pitchFamily="18" charset="0"/>
             </a:rPr>
             <a:t>(“Your name is </a:t>
           </a:r>
           <a:r>
-            <a:rPr lang="en-US" sz="2000" kern="1200" dirty="0" smtClean="0">
+            <a:rPr lang="en-US" sz="1800" kern="1200" dirty="0" smtClean="0">
               <a:solidFill>
                 <a:srgbClr val="00B0F0"/>
               </a:solidFill>
-              <a:latin typeface="Buxton Sketch" panose="03080500000500000004" pitchFamily="66" charset="0"/>
+              <a:latin typeface="Cambria Math" panose="02040503050406030204" pitchFamily="18" charset="0"/>
+              <a:ea typeface="Cambria Math" panose="02040503050406030204" pitchFamily="18" charset="0"/>
             </a:rPr>
             <a:t>Daffy Duck</a:t>
           </a:r>
           <a:r>
-            <a:rPr lang="en-US" sz="2000" kern="1200" dirty="0" smtClean="0">
+            <a:rPr lang="en-US" sz="1800" kern="1200" dirty="0" smtClean="0">
               <a:solidFill>
                 <a:schemeClr val="tx1"/>
               </a:solidFill>
-              <a:latin typeface="Buxton Sketch" panose="03080500000500000004" pitchFamily="66" charset="0"/>
+              <a:latin typeface="Cambria Math" panose="02040503050406030204" pitchFamily="18" charset="0"/>
+              <a:ea typeface="Cambria Math" panose="02040503050406030204" pitchFamily="18" charset="0"/>
             </a:rPr>
             <a:t>”);</a:t>
           </a:r>
         </a:p>
         <a:p>
-          <a:pPr lvl="0" algn="just" defTabSz="1244600">
+          <a:pPr lvl="0" algn="l" defTabSz="800100">
             <a:lnSpc>
               <a:spcPct val="90000"/>
             </a:lnSpc>
@@ -14992,17 +15127,18 @@
             </a:spcAft>
           </a:pPr>
           <a:r>
-            <a:rPr lang="en-US" sz="2000" kern="1200" dirty="0" smtClean="0">
+            <a:rPr lang="en-US" sz="1800" kern="1200" dirty="0" smtClean="0">
               <a:solidFill>
                 <a:schemeClr val="tx1"/>
               </a:solidFill>
-              <a:latin typeface="Buxton Sketch" panose="03080500000500000004" pitchFamily="66" charset="0"/>
+              <a:latin typeface="Cambria Math" panose="02040503050406030204" pitchFamily="18" charset="0"/>
+              <a:ea typeface="Cambria Math" panose="02040503050406030204" pitchFamily="18" charset="0"/>
             </a:rPr>
             <a:t>}</a:t>
           </a:r>
         </a:p>
         <a:p>
-          <a:pPr lvl="0" algn="just" defTabSz="1244600">
+          <a:pPr lvl="0" algn="l" defTabSz="800100">
             <a:lnSpc>
               <a:spcPct val="90000"/>
             </a:lnSpc>
@@ -15013,15 +15149,16 @@
               <a:spcPct val="35000"/>
             </a:spcAft>
           </a:pPr>
-          <a:endParaRPr lang="en-US" sz="2000" kern="1200" dirty="0" smtClean="0">
+          <a:endParaRPr lang="en-US" sz="1800" kern="1200" dirty="0" smtClean="0">
             <a:solidFill>
               <a:schemeClr val="tx1"/>
             </a:solidFill>
-            <a:latin typeface="Buxton Sketch" panose="03080500000500000004" pitchFamily="66" charset="0"/>
+            <a:latin typeface="Cambria Math" panose="02040503050406030204" pitchFamily="18" charset="0"/>
+            <a:ea typeface="Cambria Math" panose="02040503050406030204" pitchFamily="18" charset="0"/>
           </a:endParaRPr>
         </a:p>
         <a:p>
-          <a:pPr lvl="0" algn="just" defTabSz="1244600">
+          <a:pPr lvl="0" algn="l" defTabSz="800100">
             <a:lnSpc>
               <a:spcPct val="90000"/>
             </a:lnSpc>
@@ -15033,26 +15170,28 @@
             </a:spcAft>
           </a:pPr>
           <a:r>
-            <a:rPr lang="en-US" sz="2000" kern="1200" dirty="0" smtClean="0">
+            <a:rPr lang="en-US" sz="1800" kern="1200" dirty="0" smtClean="0">
               <a:solidFill>
                 <a:schemeClr val="tx1"/>
               </a:solidFill>
-              <a:latin typeface="Buxton Sketch" panose="03080500000500000004" pitchFamily="66" charset="0"/>
+              <a:latin typeface="Cambria Math" panose="02040503050406030204" pitchFamily="18" charset="0"/>
+              <a:ea typeface="Cambria Math" panose="02040503050406030204" pitchFamily="18" charset="0"/>
             </a:rPr>
             <a:t>// Your name is </a:t>
           </a:r>
           <a:r>
-            <a:rPr lang="en-US" sz="2000" kern="1200" dirty="0" smtClean="0">
+            <a:rPr lang="en-US" sz="1800" kern="1200" dirty="0" smtClean="0">
               <a:solidFill>
                 <a:srgbClr val="00B0F0"/>
               </a:solidFill>
-              <a:latin typeface="Buxton Sketch" panose="03080500000500000004" pitchFamily="66" charset="0"/>
+              <a:latin typeface="Cambria Math" panose="02040503050406030204" pitchFamily="18" charset="0"/>
+              <a:ea typeface="Cambria Math" panose="02040503050406030204" pitchFamily="18" charset="0"/>
             </a:rPr>
             <a:t>Daffy Duck</a:t>
           </a:r>
         </a:p>
         <a:p>
-          <a:pPr lvl="0" algn="just" defTabSz="1244600">
+          <a:pPr lvl="0" algn="l" defTabSz="800100">
             <a:lnSpc>
               <a:spcPct val="90000"/>
             </a:lnSpc>
@@ -15064,26 +15203,28 @@
             </a:spcAft>
           </a:pPr>
           <a:r>
-            <a:rPr lang="en-US" sz="2000" kern="1200" dirty="0" smtClean="0">
+            <a:rPr lang="en-US" sz="1800" kern="1200" dirty="0" smtClean="0">
               <a:solidFill>
                 <a:schemeClr val="tx1"/>
               </a:solidFill>
-              <a:latin typeface="Buxton Sketch" panose="03080500000500000004" pitchFamily="66" charset="0"/>
+              <a:latin typeface="Cambria Math" panose="02040503050406030204" pitchFamily="18" charset="0"/>
+              <a:ea typeface="Cambria Math" panose="02040503050406030204" pitchFamily="18" charset="0"/>
             </a:rPr>
             <a:t>// Your name is </a:t>
           </a:r>
           <a:r>
-            <a:rPr lang="en-US" sz="2000" kern="1200" dirty="0" smtClean="0">
+            <a:rPr lang="en-US" sz="1800" kern="1200" dirty="0" smtClean="0">
               <a:solidFill>
                 <a:srgbClr val="00B0F0"/>
               </a:solidFill>
-              <a:latin typeface="Buxton Sketch" panose="03080500000500000004" pitchFamily="66" charset="0"/>
+              <a:latin typeface="Cambria Math" panose="02040503050406030204" pitchFamily="18" charset="0"/>
+              <a:ea typeface="Cambria Math" panose="02040503050406030204" pitchFamily="18" charset="0"/>
             </a:rPr>
             <a:t>Daffy Duck</a:t>
           </a:r>
         </a:p>
         <a:p>
-          <a:pPr lvl="0" algn="just" defTabSz="1244600">
+          <a:pPr lvl="0" algn="l" defTabSz="800100">
             <a:lnSpc>
               <a:spcPct val="90000"/>
             </a:lnSpc>
@@ -15095,26 +15236,28 @@
             </a:spcAft>
           </a:pPr>
           <a:r>
-            <a:rPr lang="en-US" sz="2000" kern="1200" dirty="0" smtClean="0">
+            <a:rPr lang="en-US" sz="1800" kern="1200" dirty="0" smtClean="0">
               <a:solidFill>
                 <a:schemeClr val="tx1"/>
               </a:solidFill>
-              <a:latin typeface="Buxton Sketch" panose="03080500000500000004" pitchFamily="66" charset="0"/>
+              <a:latin typeface="Cambria Math" panose="02040503050406030204" pitchFamily="18" charset="0"/>
+              <a:ea typeface="Cambria Math" panose="02040503050406030204" pitchFamily="18" charset="0"/>
             </a:rPr>
             <a:t>// Your name is </a:t>
           </a:r>
           <a:r>
-            <a:rPr lang="en-US" sz="2000" kern="1200" dirty="0" smtClean="0">
+            <a:rPr lang="en-US" sz="1800" kern="1200" dirty="0" smtClean="0">
               <a:solidFill>
                 <a:srgbClr val="00B0F0"/>
               </a:solidFill>
-              <a:latin typeface="Buxton Sketch" panose="03080500000500000004" pitchFamily="66" charset="0"/>
+              <a:latin typeface="Cambria Math" panose="02040503050406030204" pitchFamily="18" charset="0"/>
+              <a:ea typeface="Cambria Math" panose="02040503050406030204" pitchFamily="18" charset="0"/>
             </a:rPr>
             <a:t>Daffy Duck</a:t>
           </a:r>
         </a:p>
         <a:p>
-          <a:pPr lvl="0" algn="just" defTabSz="1244600">
+          <a:pPr lvl="0" algn="l" defTabSz="800100">
             <a:lnSpc>
               <a:spcPct val="90000"/>
             </a:lnSpc>
@@ -15126,23 +15269,18 @@
             </a:spcAft>
           </a:pPr>
           <a:r>
-            <a:rPr lang="en-US" sz="2000" kern="1200" dirty="0" smtClean="0">
+            <a:rPr lang="en-US" sz="1800" kern="1200" dirty="0" smtClean="0">
               <a:solidFill>
                 <a:schemeClr val="tx1"/>
               </a:solidFill>
-              <a:latin typeface="Buxton Sketch" panose="03080500000500000004" pitchFamily="66" charset="0"/>
+              <a:latin typeface="Cambria Math" panose="02040503050406030204" pitchFamily="18" charset="0"/>
+              <a:ea typeface="Cambria Math" panose="02040503050406030204" pitchFamily="18" charset="0"/>
             </a:rPr>
             <a:t>… 10 times will be looped</a:t>
           </a:r>
-          <a:endParaRPr lang="en-US" sz="2400" kern="1200" dirty="0" smtClean="0">
-            <a:solidFill>
-              <a:schemeClr val="tx1"/>
-            </a:solidFill>
-            <a:latin typeface="Buxton Sketch" panose="03080500000500000004" pitchFamily="66" charset="0"/>
-          </a:endParaRPr>
         </a:p>
         <a:p>
-          <a:pPr lvl="0" algn="ctr" defTabSz="1244600">
+          <a:pPr lvl="0" algn="l" defTabSz="800100">
             <a:lnSpc>
               <a:spcPct val="90000"/>
             </a:lnSpc>
@@ -15153,15 +15291,16 @@
               <a:spcPct val="35000"/>
             </a:spcAft>
           </a:pPr>
-          <a:endParaRPr lang="en-US" sz="2800" kern="1200" dirty="0" smtClean="0">
+          <a:endParaRPr lang="en-US" sz="1800" kern="1200" dirty="0" smtClean="0">
             <a:solidFill>
               <a:srgbClr val="FFFF00"/>
             </a:solidFill>
-            <a:latin typeface="Buxton Sketch" panose="03080500000500000004" pitchFamily="66" charset="0"/>
+            <a:latin typeface="Cambria Math" panose="02040503050406030204" pitchFamily="18" charset="0"/>
+            <a:ea typeface="Cambria Math" panose="02040503050406030204" pitchFamily="18" charset="0"/>
           </a:endParaRPr>
         </a:p>
         <a:p>
-          <a:pPr lvl="0" algn="ctr" defTabSz="1244600">
+          <a:pPr lvl="0" algn="l" defTabSz="800100">
             <a:lnSpc>
               <a:spcPct val="90000"/>
             </a:lnSpc>
@@ -15172,15 +15311,16 @@
               <a:spcPct val="35000"/>
             </a:spcAft>
           </a:pPr>
-          <a:endParaRPr lang="en-US" sz="2800" kern="1200" dirty="0" smtClean="0">
+          <a:endParaRPr lang="en-US" sz="1800" kern="1200" dirty="0" smtClean="0">
             <a:solidFill>
               <a:srgbClr val="FFFF00"/>
             </a:solidFill>
-            <a:latin typeface="Buxton Sketch" panose="03080500000500000004" pitchFamily="66" charset="0"/>
+            <a:latin typeface="Cambria Math" panose="02040503050406030204" pitchFamily="18" charset="0"/>
+            <a:ea typeface="Cambria Math" panose="02040503050406030204" pitchFamily="18" charset="0"/>
           </a:endParaRPr>
         </a:p>
         <a:p>
-          <a:pPr lvl="0" algn="ctr" defTabSz="1244600">
+          <a:pPr lvl="0" algn="l" defTabSz="800100">
             <a:lnSpc>
               <a:spcPct val="90000"/>
             </a:lnSpc>
@@ -15191,15 +15331,16 @@
               <a:spcPct val="35000"/>
             </a:spcAft>
           </a:pPr>
-          <a:endParaRPr lang="en-US" sz="2800" kern="1200" dirty="0" smtClean="0">
+          <a:endParaRPr lang="en-US" sz="1800" kern="1200" dirty="0" smtClean="0">
             <a:solidFill>
               <a:srgbClr val="FFFF00"/>
             </a:solidFill>
-            <a:latin typeface="Buxton Sketch" panose="03080500000500000004" pitchFamily="66" charset="0"/>
+            <a:latin typeface="Cambria Math" panose="02040503050406030204" pitchFamily="18" charset="0"/>
+            <a:ea typeface="Cambria Math" panose="02040503050406030204" pitchFamily="18" charset="0"/>
           </a:endParaRPr>
         </a:p>
         <a:p>
-          <a:pPr lvl="0" algn="ctr" defTabSz="1244600">
+          <a:pPr lvl="0" algn="l" defTabSz="800100">
             <a:lnSpc>
               <a:spcPct val="90000"/>
             </a:lnSpc>
@@ -15210,17 +15351,18 @@
               <a:spcPct val="35000"/>
             </a:spcAft>
           </a:pPr>
-          <a:endParaRPr lang="en-US" sz="2800" kern="1200" dirty="0">
+          <a:endParaRPr lang="en-US" sz="1800" kern="1200" dirty="0">
             <a:solidFill>
               <a:srgbClr val="FFFF00"/>
             </a:solidFill>
-            <a:latin typeface="Buxton Sketch" panose="03080500000500000004" pitchFamily="66" charset="0"/>
+            <a:latin typeface="Cambria Math" panose="02040503050406030204" pitchFamily="18" charset="0"/>
+            <a:ea typeface="Cambria Math" panose="02040503050406030204" pitchFamily="18" charset="0"/>
           </a:endParaRPr>
         </a:p>
       </dsp:txBody>
       <dsp:txXfrm>
-        <a:off x="7200945" y="2199710"/>
-        <a:ext cx="4675414" cy="4402257"/>
+        <a:off x="7595875" y="1608929"/>
+        <a:ext cx="4270058" cy="4640401"/>
       </dsp:txXfrm>
     </dsp:sp>
   </dsp:spTree>
@@ -15242,8 +15384,8 @@
       </dsp:nvSpPr>
       <dsp:spPr>
         <a:xfrm>
-          <a:off x="5417739" y="1087141"/>
-          <a:ext cx="2558008" cy="1308199"/>
+          <a:off x="5731041" y="983441"/>
+          <a:ext cx="2714967" cy="505410"/>
         </a:xfrm>
         <a:custGeom>
           <a:avLst/>
@@ -15257,13 +15399,13 @@
                 <a:pt x="0" y="0"/>
               </a:moveTo>
               <a:lnTo>
-                <a:pt x="0" y="841247"/>
+                <a:pt x="0" y="11455"/>
               </a:lnTo>
               <a:lnTo>
-                <a:pt x="2558008" y="841247"/>
+                <a:pt x="2714967" y="11455"/>
               </a:lnTo>
               <a:lnTo>
-                <a:pt x="2558008" y="1308199"/>
+                <a:pt x="2714967" y="505410"/>
               </a:lnTo>
             </a:path>
           </a:pathLst>
@@ -15303,8 +15445,8 @@
       </dsp:nvSpPr>
       <dsp:spPr>
         <a:xfrm>
-          <a:off x="2622119" y="1087141"/>
-          <a:ext cx="2795620" cy="1582522"/>
+          <a:off x="3000785" y="983441"/>
+          <a:ext cx="2730256" cy="558710"/>
         </a:xfrm>
         <a:custGeom>
           <a:avLst/>
@@ -15315,16 +15457,16 @@
           <a:pathLst>
             <a:path>
               <a:moveTo>
-                <a:pt x="2795620" y="0"/>
+                <a:pt x="2730256" y="0"/>
               </a:moveTo>
               <a:lnTo>
-                <a:pt x="2795620" y="1115570"/>
+                <a:pt x="2730256" y="64755"/>
               </a:lnTo>
               <a:lnTo>
-                <a:pt x="0" y="1115570"/>
+                <a:pt x="0" y="64755"/>
               </a:lnTo>
               <a:lnTo>
-                <a:pt x="0" y="1582522"/>
+                <a:pt x="0" y="558710"/>
               </a:lnTo>
             </a:path>
           </a:pathLst>
@@ -15364,8 +15506,8 @@
       </dsp:nvSpPr>
       <dsp:spPr>
         <a:xfrm>
-          <a:off x="8988" y="256633"/>
-          <a:ext cx="10817501" cy="830507"/>
+          <a:off x="9508" y="104906"/>
+          <a:ext cx="11443065" cy="878535"/>
         </a:xfrm>
         <a:prstGeom prst="rect">
           <a:avLst/>
@@ -15440,8 +15582,8 @@
         </a:p>
       </dsp:txBody>
       <dsp:txXfrm>
-        <a:off x="8988" y="256633"/>
-        <a:ext cx="10817501" cy="830507"/>
+        <a:off x="9508" y="104906"/>
+        <a:ext cx="11443065" cy="878535"/>
       </dsp:txXfrm>
     </dsp:sp>
     <dsp:sp modelId="{ACDE8485-05B1-406B-AD3C-368A19FF8F21}">
@@ -15451,8 +15593,8 @@
       </dsp:nvSpPr>
       <dsp:spPr>
         <a:xfrm>
-          <a:off x="398538" y="2669664"/>
-          <a:ext cx="4447162" cy="393573"/>
+          <a:off x="648616" y="1542152"/>
+          <a:ext cx="4704337" cy="416333"/>
         </a:xfrm>
         <a:prstGeom prst="rect">
           <a:avLst/>
@@ -15521,8 +15663,8 @@
         </a:p>
       </dsp:txBody>
       <dsp:txXfrm>
-        <a:off x="398538" y="2669664"/>
-        <a:ext cx="4447162" cy="393573"/>
+        <a:off x="648616" y="1542152"/>
+        <a:ext cx="4704337" cy="416333"/>
       </dsp:txXfrm>
     </dsp:sp>
     <dsp:sp modelId="{07BD9B31-3415-4AE7-BD62-D4E049D8396D}">
@@ -15532,8 +15674,8 @@
       </dsp:nvSpPr>
       <dsp:spPr>
         <a:xfrm>
-          <a:off x="5752166" y="2395341"/>
-          <a:ext cx="4447162" cy="503307"/>
+          <a:off x="6093839" y="1488852"/>
+          <a:ext cx="4704337" cy="532413"/>
         </a:xfrm>
         <a:prstGeom prst="rect">
           <a:avLst/>
@@ -15602,8 +15744,8 @@
         </a:p>
       </dsp:txBody>
       <dsp:txXfrm>
-        <a:off x="5752166" y="2395341"/>
-        <a:ext cx="4447162" cy="503307"/>
+        <a:off x="6093839" y="1488852"/>
+        <a:ext cx="4704337" cy="532413"/>
       </dsp:txXfrm>
     </dsp:sp>
   </dsp:spTree>
@@ -30284,7 +30426,7 @@
           <a:p>
             <a:fld id="{86BC5D83-A6BD-448A-8B7D-D487C0AC34D1}" type="datetimeFigureOut">
               <a:rPr lang="en-US" smtClean="0"/>
-              <a:t>17-Oct-17</a:t>
+              <a:t>28-Oct-17</a:t>
             </a:fld>
             <a:endParaRPr lang="en-US"/>
           </a:p>
@@ -32037,7 +32179,7 @@
             <a:fld id="{B61BEF0D-F0BB-DE4B-95CE-6DB70DBA9567}" type="datetimeFigureOut">
               <a:rPr lang="en-US" dirty="0"/>
               <a:pPr/>
-              <a:t>17-Oct-17</a:t>
+              <a:t>28-Oct-17</a:t>
             </a:fld>
             <a:endParaRPr lang="en-US" dirty="0"/>
           </a:p>
@@ -32368,7 +32510,7 @@
             <a:fld id="{B61BEF0D-F0BB-DE4B-95CE-6DB70DBA9567}" type="datetimeFigureOut">
               <a:rPr lang="en-US" dirty="0"/>
               <a:pPr/>
-              <a:t>17-Oct-17</a:t>
+              <a:t>28-Oct-17</a:t>
             </a:fld>
             <a:endParaRPr lang="en-US" dirty="0"/>
           </a:p>
@@ -32643,7 +32785,7 @@
             <a:fld id="{B61BEF0D-F0BB-DE4B-95CE-6DB70DBA9567}" type="datetimeFigureOut">
               <a:rPr lang="en-US" dirty="0"/>
               <a:pPr/>
-              <a:t>17-Oct-17</a:t>
+              <a:t>28-Oct-17</a:t>
             </a:fld>
             <a:endParaRPr lang="en-US" dirty="0"/>
           </a:p>
@@ -33208,7 +33350,7 @@
             <a:fld id="{B61BEF0D-F0BB-DE4B-95CE-6DB70DBA9567}" type="datetimeFigureOut">
               <a:rPr lang="en-US" dirty="0"/>
               <a:pPr/>
-              <a:t>17-Oct-17</a:t>
+              <a:t>28-Oct-17</a:t>
             </a:fld>
             <a:endParaRPr lang="en-US" dirty="0"/>
           </a:p>
@@ -33483,7 +33625,7 @@
             <a:fld id="{B61BEF0D-F0BB-DE4B-95CE-6DB70DBA9567}" type="datetimeFigureOut">
               <a:rPr lang="en-US" dirty="0"/>
               <a:pPr/>
-              <a:t>17-Oct-17</a:t>
+              <a:t>28-Oct-17</a:t>
             </a:fld>
             <a:endParaRPr lang="en-US" dirty="0"/>
           </a:p>
@@ -34042,7 +34184,7 @@
             <a:fld id="{B61BEF0D-F0BB-DE4B-95CE-6DB70DBA9567}" type="datetimeFigureOut">
               <a:rPr lang="en-US" dirty="0"/>
               <a:pPr/>
-              <a:t>17-Oct-17</a:t>
+              <a:t>28-Oct-17</a:t>
             </a:fld>
             <a:endParaRPr lang="en-US" dirty="0"/>
           </a:p>
@@ -34366,7 +34508,7 @@
             <a:fld id="{B61BEF0D-F0BB-DE4B-95CE-6DB70DBA9567}" type="datetimeFigureOut">
               <a:rPr lang="en-US" dirty="0"/>
               <a:pPr/>
-              <a:t>17-Oct-17</a:t>
+              <a:t>28-Oct-17</a:t>
             </a:fld>
             <a:endParaRPr lang="en-US" dirty="0"/>
           </a:p>
@@ -34540,7 +34682,7 @@
             <a:fld id="{B61BEF0D-F0BB-DE4B-95CE-6DB70DBA9567}" type="datetimeFigureOut">
               <a:rPr lang="en-US" dirty="0"/>
               <a:pPr/>
-              <a:t>17-Oct-17</a:t>
+              <a:t>28-Oct-17</a:t>
             </a:fld>
             <a:endParaRPr lang="en-US" dirty="0"/>
           </a:p>
@@ -34775,7 +34917,7 @@
             <a:fld id="{B61BEF0D-F0BB-DE4B-95CE-6DB70DBA9567}" type="datetimeFigureOut">
               <a:rPr lang="en-US" dirty="0"/>
               <a:pPr/>
-              <a:t>17-Oct-17</a:t>
+              <a:t>28-Oct-17</a:t>
             </a:fld>
             <a:endParaRPr lang="en-US" dirty="0"/>
           </a:p>
@@ -34972,7 +35114,7 @@
             <a:fld id="{B61BEF0D-F0BB-DE4B-95CE-6DB70DBA9567}" type="datetimeFigureOut">
               <a:rPr lang="en-US" dirty="0"/>
               <a:pPr/>
-              <a:t>17-Oct-17</a:t>
+              <a:t>28-Oct-17</a:t>
             </a:fld>
             <a:endParaRPr lang="en-US" dirty="0"/>
           </a:p>
@@ -35245,7 +35387,7 @@
             <a:fld id="{B61BEF0D-F0BB-DE4B-95CE-6DB70DBA9567}" type="datetimeFigureOut">
               <a:rPr lang="en-US" dirty="0"/>
               <a:pPr/>
-              <a:t>17-Oct-17</a:t>
+              <a:t>28-Oct-17</a:t>
             </a:fld>
             <a:endParaRPr lang="en-US" dirty="0"/>
           </a:p>
@@ -35508,7 +35650,7 @@
             <a:fld id="{B61BEF0D-F0BB-DE4B-95CE-6DB70DBA9567}" type="datetimeFigureOut">
               <a:rPr lang="en-US" dirty="0"/>
               <a:pPr/>
-              <a:t>17-Oct-17</a:t>
+              <a:t>28-Oct-17</a:t>
             </a:fld>
             <a:endParaRPr lang="en-US" dirty="0"/>
           </a:p>
@@ -35879,7 +36021,7 @@
             <a:fld id="{B61BEF0D-F0BB-DE4B-95CE-6DB70DBA9567}" type="datetimeFigureOut">
               <a:rPr lang="en-US" dirty="0"/>
               <a:pPr/>
-              <a:t>17-Oct-17</a:t>
+              <a:t>28-Oct-17</a:t>
             </a:fld>
             <a:endParaRPr lang="en-US" dirty="0"/>
           </a:p>
@@ -36024,7 +36166,7 @@
             <a:fld id="{B61BEF0D-F0BB-DE4B-95CE-6DB70DBA9567}" type="datetimeFigureOut">
               <a:rPr lang="en-US" dirty="0"/>
               <a:pPr/>
-              <a:t>17-Oct-17</a:t>
+              <a:t>28-Oct-17</a:t>
             </a:fld>
             <a:endParaRPr lang="en-US" dirty="0"/>
           </a:p>
@@ -36146,7 +36288,7 @@
             <a:fld id="{B61BEF0D-F0BB-DE4B-95CE-6DB70DBA9567}" type="datetimeFigureOut">
               <a:rPr lang="en-US" dirty="0"/>
               <a:pPr/>
-              <a:t>17-Oct-17</a:t>
+              <a:t>28-Oct-17</a:t>
             </a:fld>
             <a:endParaRPr lang="en-US" dirty="0"/>
           </a:p>
@@ -36428,7 +36570,7 @@
             <a:fld id="{B61BEF0D-F0BB-DE4B-95CE-6DB70DBA9567}" type="datetimeFigureOut">
               <a:rPr lang="en-US" dirty="0"/>
               <a:pPr/>
-              <a:t>17-Oct-17</a:t>
+              <a:t>28-Oct-17</a:t>
             </a:fld>
             <a:endParaRPr lang="en-US" dirty="0"/>
           </a:p>
@@ -36749,7 +36891,7 @@
             <a:fld id="{B61BEF0D-F0BB-DE4B-95CE-6DB70DBA9567}" type="datetimeFigureOut">
               <a:rPr lang="en-US" dirty="0"/>
               <a:pPr/>
-              <a:t>17-Oct-17</a:t>
+              <a:t>28-Oct-17</a:t>
             </a:fld>
             <a:endParaRPr lang="en-US" dirty="0"/>
           </a:p>
@@ -36960,7 +37102,7 @@
             <a:fld id="{B61BEF0D-F0BB-DE4B-95CE-6DB70DBA9567}" type="datetimeFigureOut">
               <a:rPr lang="en-US" dirty="0"/>
               <a:pPr/>
-              <a:t>17-Oct-17</a:t>
+              <a:t>28-Oct-17</a:t>
             </a:fld>
             <a:endParaRPr lang="en-US" dirty="0"/>
           </a:p>
@@ -37569,85 +37711,6 @@
 </p:sld>
 </file>
 
-<file path=ppt/slides/slide10.xml><?xml version="1.0" encoding="utf-8"?>
-<p:sld xmlns:a="http://schemas.openxmlformats.org/drawingml/2006/main" xmlns:r="http://schemas.openxmlformats.org/officeDocument/2006/relationships" xmlns:p="http://schemas.openxmlformats.org/presentationml/2006/main">
-  <p:cSld>
-    <p:spTree>
-      <p:nvGrpSpPr>
-        <p:cNvPr id="1" name=""/>
-        <p:cNvGrpSpPr/>
-        <p:nvPr/>
-      </p:nvGrpSpPr>
-      <p:grpSpPr>
-        <a:xfrm>
-          <a:off x="0" y="0"/>
-          <a:ext cx="0" cy="0"/>
-          <a:chOff x="0" y="0"/>
-          <a:chExt cx="0" cy="0"/>
-        </a:xfrm>
-      </p:grpSpPr>
-      <p:sp>
-        <p:nvSpPr>
-          <p:cNvPr id="2" name="Заглавие 1"/>
-          <p:cNvSpPr>
-            <a:spLocks noGrp="1"/>
-          </p:cNvSpPr>
-          <p:nvPr>
-            <p:ph type="title"/>
-          </p:nvPr>
-        </p:nvSpPr>
-        <p:spPr/>
-        <p:txBody>
-          <a:bodyPr/>
-          <a:lstStyle/>
-          <a:p>
-            <a:r>
-              <a:rPr lang="en-US" dirty="0" smtClean="0"/>
-              <a:t>To do</a:t>
-            </a:r>
-            <a:endParaRPr lang="bg-BG" dirty="0"/>
-          </a:p>
-        </p:txBody>
-      </p:sp>
-      <p:sp>
-        <p:nvSpPr>
-          <p:cNvPr id="3" name="Контейнер за съдържание 2"/>
-          <p:cNvSpPr>
-            <a:spLocks noGrp="1"/>
-          </p:cNvSpPr>
-          <p:nvPr>
-            <p:ph idx="1"/>
-          </p:nvPr>
-        </p:nvSpPr>
-        <p:spPr/>
-        <p:txBody>
-          <a:bodyPr/>
-          <a:lstStyle/>
-          <a:p>
-            <a:endParaRPr lang="bg-BG" dirty="0"/>
-          </a:p>
-        </p:txBody>
-      </p:sp>
-    </p:spTree>
-    <p:extLst>
-      <p:ext uri="{BB962C8B-B14F-4D97-AF65-F5344CB8AC3E}">
-        <p14:creationId xmlns:p14="http://schemas.microsoft.com/office/powerpoint/2010/main" val="2467945582"/>
-      </p:ext>
-    </p:extLst>
-  </p:cSld>
-  <p:clrMapOvr>
-    <a:masterClrMapping/>
-  </p:clrMapOvr>
-  <p:timing>
-    <p:tnLst>
-      <p:par>
-        <p:cTn id="1" dur="indefinite" restart="never" nodeType="tmRoot"/>
-      </p:par>
-    </p:tnLst>
-  </p:timing>
-</p:sld>
-</file>
-
 <file path=ppt/slides/slide2.xml><?xml version="1.0" encoding="utf-8"?>
 <p:sld xmlns:a="http://schemas.openxmlformats.org/drawingml/2006/main" xmlns:r="http://schemas.openxmlformats.org/officeDocument/2006/relationships" xmlns:p="http://schemas.openxmlformats.org/presentationml/2006/main" show="0">
   <p:cSld>
@@ -37700,11 +37763,11 @@
   <p:clrMapOvr>
     <a:masterClrMapping/>
   </p:clrMapOvr>
-  <mc:AlternateContent xmlns:mc="http://schemas.openxmlformats.org/markup-compatibility/2006">
-    <mc:Choice xmlns:p14="http://schemas.microsoft.com/office/powerpoint/2010/main" Requires="p14">
+  <mc:AlternateContent xmlns:mc="http://schemas.openxmlformats.org/markup-compatibility/2006" xmlns:p14="http://schemas.microsoft.com/office/powerpoint/2010/main">
+    <mc:Choice Requires="p14">
       <p:transition spd="slow" p14:dur="2000"/>
     </mc:Choice>
-    <mc:Fallback>
+    <mc:Fallback xmlns="">
       <p:transition spd="slow"/>
     </mc:Fallback>
   </mc:AlternateContent>
@@ -39014,7 +39077,7 @@
             <p:ph idx="1"/>
             <p:extLst>
               <p:ext uri="{D42A27DB-BD31-4B8C-83A1-F6EECF244321}">
-                <p14:modId xmlns:p14="http://schemas.microsoft.com/office/powerpoint/2010/main" val="1345158045"/>
+                <p14:modId xmlns:p14="http://schemas.microsoft.com/office/powerpoint/2010/main" val="3230948392"/>
               </p:ext>
             </p:extLst>
           </p:nvPr>
@@ -39076,14 +39139,14 @@
             <p:ph idx="1"/>
             <p:extLst>
               <p:ext uri="{D42A27DB-BD31-4B8C-83A1-F6EECF244321}">
-                <p14:modId xmlns:p14="http://schemas.microsoft.com/office/powerpoint/2010/main" val="1552164821"/>
+                <p14:modId xmlns:p14="http://schemas.microsoft.com/office/powerpoint/2010/main" val="1335487284"/>
               </p:ext>
             </p:extLst>
           </p:nvPr>
         </p:nvGraphicFramePr>
         <p:xfrm>
-          <a:off x="649224" y="429768"/>
-          <a:ext cx="10826496" cy="5760720"/>
+          <a:off x="229347" y="252486"/>
+          <a:ext cx="11452580" cy="5760720"/>
         </p:xfrm>
         <a:graphic>
           <a:graphicData uri="http://schemas.openxmlformats.org/drawingml/2006/diagram">
@@ -39099,7 +39162,7 @@
         </p:nvSpPr>
         <p:spPr>
           <a:xfrm>
-            <a:off x="1133856" y="4114800"/>
+            <a:off x="1199171" y="2911151"/>
             <a:ext cx="4480560" cy="2031325"/>
           </a:xfrm>
           <a:prstGeom prst="rect">
@@ -39118,7 +39181,8 @@
                 <a:solidFill>
                   <a:srgbClr val="00B0F0"/>
                 </a:solidFill>
-                <a:latin typeface="Buxton Sketch" panose="03080500000500000004" pitchFamily="66" charset="0"/>
+                <a:latin typeface="Cambria Math" panose="02040503050406030204" pitchFamily="18" charset="0"/>
+                <a:ea typeface="Cambria Math" panose="02040503050406030204" pitchFamily="18" charset="0"/>
               </a:rPr>
               <a:t> </a:t>
             </a:r>
@@ -39127,25 +39191,29 @@
                 <a:solidFill>
                   <a:srgbClr val="00B0F0"/>
                 </a:solidFill>
-                <a:latin typeface="Buxton Sketch" panose="03080500000500000004" pitchFamily="66" charset="0"/>
+                <a:latin typeface="Cambria Math" panose="02040503050406030204" pitchFamily="18" charset="0"/>
+                <a:ea typeface="Cambria Math" panose="02040503050406030204" pitchFamily="18" charset="0"/>
               </a:rPr>
               <a:t>int</a:t>
             </a:r>
             <a:r>
               <a:rPr lang="en-US" dirty="0">
-                <a:latin typeface="Buxton Sketch" panose="03080500000500000004" pitchFamily="66" charset="0"/>
+                <a:latin typeface="Cambria Math" panose="02040503050406030204" pitchFamily="18" charset="0"/>
+                <a:ea typeface="Cambria Math" panose="02040503050406030204" pitchFamily="18" charset="0"/>
               </a:rPr>
               <a:t>[] </a:t>
             </a:r>
             <a:r>
               <a:rPr lang="en-US" dirty="0" err="1">
-                <a:latin typeface="Buxton Sketch" panose="03080500000500000004" pitchFamily="66" charset="0"/>
+                <a:latin typeface="Cambria Math" panose="02040503050406030204" pitchFamily="18" charset="0"/>
+                <a:ea typeface="Cambria Math" panose="02040503050406030204" pitchFamily="18" charset="0"/>
               </a:rPr>
               <a:t>studentId</a:t>
             </a:r>
             <a:r>
               <a:rPr lang="en-US" dirty="0">
-                <a:latin typeface="Buxton Sketch" panose="03080500000500000004" pitchFamily="66" charset="0"/>
+                <a:latin typeface="Cambria Math" panose="02040503050406030204" pitchFamily="18" charset="0"/>
+                <a:ea typeface="Cambria Math" panose="02040503050406030204" pitchFamily="18" charset="0"/>
               </a:rPr>
               <a:t> = </a:t>
             </a:r>
@@ -39154,31 +39222,38 @@
                 <a:solidFill>
                   <a:srgbClr val="00B0F0"/>
                 </a:solidFill>
-                <a:latin typeface="Buxton Sketch" panose="03080500000500000004" pitchFamily="66" charset="0"/>
+                <a:latin typeface="Cambria Math" panose="02040503050406030204" pitchFamily="18" charset="0"/>
+                <a:ea typeface="Cambria Math" panose="02040503050406030204" pitchFamily="18" charset="0"/>
               </a:rPr>
               <a:t>new</a:t>
             </a:r>
             <a:r>
               <a:rPr lang="en-US" dirty="0">
-                <a:latin typeface="Buxton Sketch" panose="03080500000500000004" pitchFamily="66" charset="0"/>
+                <a:latin typeface="Cambria Math" panose="02040503050406030204" pitchFamily="18" charset="0"/>
+                <a:ea typeface="Cambria Math" panose="02040503050406030204" pitchFamily="18" charset="0"/>
               </a:rPr>
               <a:t>[] {12, 56, 77, 88</a:t>
             </a:r>
             <a:r>
               <a:rPr lang="en-US" dirty="0" smtClean="0">
-                <a:latin typeface="Buxton Sketch" panose="03080500000500000004" pitchFamily="66" charset="0"/>
+                <a:latin typeface="Cambria Math" panose="02040503050406030204" pitchFamily="18" charset="0"/>
+                <a:ea typeface="Cambria Math" panose="02040503050406030204" pitchFamily="18" charset="0"/>
               </a:rPr>
               <a:t>};</a:t>
             </a:r>
           </a:p>
           <a:p>
             <a:endParaRPr lang="en-US" dirty="0">
-              <a:latin typeface="Buxton Sketch" panose="03080500000500000004" pitchFamily="66" charset="0"/>
+              <a:latin typeface="Cambria Math" panose="02040503050406030204" pitchFamily="18" charset="0"/>
+              <a:ea typeface="Cambria Math" panose="02040503050406030204" pitchFamily="18" charset="0"/>
             </a:endParaRPr>
           </a:p>
           <a:p>
             <a:r>
-              <a:rPr lang="en-US" dirty="0"/>
+              <a:rPr lang="en-US" dirty="0">
+                <a:latin typeface="Cambria Math" panose="02040503050406030204" pitchFamily="18" charset="0"/>
+                <a:ea typeface="Cambria Math" panose="02040503050406030204" pitchFamily="18" charset="0"/>
+              </a:rPr>
               <a:t> </a:t>
             </a:r>
             <a:r>
@@ -39186,13 +39261,15 @@
                 <a:solidFill>
                   <a:srgbClr val="00B0F0"/>
                 </a:solidFill>
-                <a:latin typeface="Buxton Sketch" panose="03080500000500000004" pitchFamily="66" charset="0"/>
+                <a:latin typeface="Cambria Math" panose="02040503050406030204" pitchFamily="18" charset="0"/>
+                <a:ea typeface="Cambria Math" panose="02040503050406030204" pitchFamily="18" charset="0"/>
               </a:rPr>
               <a:t>string</a:t>
             </a:r>
             <a:r>
               <a:rPr lang="en-US" dirty="0">
-                <a:latin typeface="Buxton Sketch" panose="03080500000500000004" pitchFamily="66" charset="0"/>
+                <a:latin typeface="Cambria Math" panose="02040503050406030204" pitchFamily="18" charset="0"/>
+                <a:ea typeface="Cambria Math" panose="02040503050406030204" pitchFamily="18" charset="0"/>
               </a:rPr>
               <a:t>[] cars = </a:t>
             </a:r>
@@ -39201,7 +39278,8 @@
                 <a:solidFill>
                   <a:srgbClr val="00B0F0"/>
                 </a:solidFill>
-                <a:latin typeface="Buxton Sketch" panose="03080500000500000004" pitchFamily="66" charset="0"/>
+                <a:latin typeface="Cambria Math" panose="02040503050406030204" pitchFamily="18" charset="0"/>
+                <a:ea typeface="Cambria Math" panose="02040503050406030204" pitchFamily="18" charset="0"/>
               </a:rPr>
               <a:t>new </a:t>
             </a:r>
@@ -39210,30 +39288,35 @@
                 <a:solidFill>
                   <a:srgbClr val="00B0F0"/>
                 </a:solidFill>
-                <a:latin typeface="Buxton Sketch" panose="03080500000500000004" pitchFamily="66" charset="0"/>
+                <a:latin typeface="Cambria Math" panose="02040503050406030204" pitchFamily="18" charset="0"/>
+                <a:ea typeface="Cambria Math" panose="02040503050406030204" pitchFamily="18" charset="0"/>
               </a:rPr>
               <a:t>string</a:t>
             </a:r>
             <a:r>
               <a:rPr lang="en-US" dirty="0" smtClean="0">
-                <a:latin typeface="Buxton Sketch" panose="03080500000500000004" pitchFamily="66" charset="0"/>
+                <a:latin typeface="Cambria Math" panose="02040503050406030204" pitchFamily="18" charset="0"/>
+                <a:ea typeface="Cambria Math" panose="02040503050406030204" pitchFamily="18" charset="0"/>
               </a:rPr>
               <a:t>[4];</a:t>
             </a:r>
             <a:endParaRPr lang="en-US" dirty="0">
-              <a:latin typeface="Buxton Sketch" panose="03080500000500000004" pitchFamily="66" charset="0"/>
+              <a:latin typeface="Cambria Math" panose="02040503050406030204" pitchFamily="18" charset="0"/>
+              <a:ea typeface="Cambria Math" panose="02040503050406030204" pitchFamily="18" charset="0"/>
             </a:endParaRPr>
           </a:p>
           <a:p>
             <a:r>
               <a:rPr lang="en-US" dirty="0">
-                <a:latin typeface="Buxton Sketch" panose="03080500000500000004" pitchFamily="66" charset="0"/>
+                <a:latin typeface="Cambria Math" panose="02040503050406030204" pitchFamily="18" charset="0"/>
+                <a:ea typeface="Cambria Math" panose="02040503050406030204" pitchFamily="18" charset="0"/>
               </a:rPr>
               <a:t> </a:t>
             </a:r>
             <a:r>
               <a:rPr lang="en-US" dirty="0" smtClean="0">
-                <a:latin typeface="Buxton Sketch" panose="03080500000500000004" pitchFamily="66" charset="0"/>
+                <a:latin typeface="Cambria Math" panose="02040503050406030204" pitchFamily="18" charset="0"/>
+                <a:ea typeface="Cambria Math" panose="02040503050406030204" pitchFamily="18" charset="0"/>
               </a:rPr>
               <a:t>cars[</a:t>
             </a:r>
@@ -39242,30 +39325,35 @@
                 <a:solidFill>
                   <a:srgbClr val="FFFF00"/>
                 </a:solidFill>
-                <a:latin typeface="Buxton Sketch" panose="03080500000500000004" pitchFamily="66" charset="0"/>
+                <a:latin typeface="Cambria Math" panose="02040503050406030204" pitchFamily="18" charset="0"/>
+                <a:ea typeface="Cambria Math" panose="02040503050406030204" pitchFamily="18" charset="0"/>
               </a:rPr>
               <a:t>0</a:t>
             </a:r>
             <a:r>
               <a:rPr lang="en-US" dirty="0">
-                <a:latin typeface="Buxton Sketch" panose="03080500000500000004" pitchFamily="66" charset="0"/>
+                <a:latin typeface="Cambria Math" panose="02040503050406030204" pitchFamily="18" charset="0"/>
+                <a:ea typeface="Cambria Math" panose="02040503050406030204" pitchFamily="18" charset="0"/>
               </a:rPr>
               <a:t>] = "</a:t>
             </a:r>
             <a:r>
               <a:rPr lang="en-US" dirty="0" smtClean="0">
-                <a:latin typeface="Buxton Sketch" panose="03080500000500000004" pitchFamily="66" charset="0"/>
+                <a:latin typeface="Cambria Math" panose="02040503050406030204" pitchFamily="18" charset="0"/>
+                <a:ea typeface="Cambria Math" panose="02040503050406030204" pitchFamily="18" charset="0"/>
               </a:rPr>
               <a:t>Audi";</a:t>
             </a:r>
             <a:endParaRPr lang="en-US" dirty="0">
-              <a:latin typeface="Buxton Sketch" panose="03080500000500000004" pitchFamily="66" charset="0"/>
+              <a:latin typeface="Cambria Math" panose="02040503050406030204" pitchFamily="18" charset="0"/>
+              <a:ea typeface="Cambria Math" panose="02040503050406030204" pitchFamily="18" charset="0"/>
             </a:endParaRPr>
           </a:p>
           <a:p>
             <a:r>
               <a:rPr lang="en-US" dirty="0" smtClean="0">
-                <a:latin typeface="Buxton Sketch" panose="03080500000500000004" pitchFamily="66" charset="0"/>
+                <a:latin typeface="Cambria Math" panose="02040503050406030204" pitchFamily="18" charset="0"/>
+                <a:ea typeface="Cambria Math" panose="02040503050406030204" pitchFamily="18" charset="0"/>
               </a:rPr>
               <a:t> cars[</a:t>
             </a:r>
@@ -39274,13 +39362,15 @@
                 <a:solidFill>
                   <a:srgbClr val="FFFF00"/>
                 </a:solidFill>
-                <a:latin typeface="Buxton Sketch" panose="03080500000500000004" pitchFamily="66" charset="0"/>
+                <a:latin typeface="Cambria Math" panose="02040503050406030204" pitchFamily="18" charset="0"/>
+                <a:ea typeface="Cambria Math" panose="02040503050406030204" pitchFamily="18" charset="0"/>
               </a:rPr>
               <a:t>1</a:t>
             </a:r>
             <a:r>
               <a:rPr lang="en-US" dirty="0">
-                <a:latin typeface="Buxton Sketch" panose="03080500000500000004" pitchFamily="66" charset="0"/>
+                <a:latin typeface="Cambria Math" panose="02040503050406030204" pitchFamily="18" charset="0"/>
+                <a:ea typeface="Cambria Math" panose="02040503050406030204" pitchFamily="18" charset="0"/>
               </a:rPr>
               <a:t>] = "Mercedes";</a:t>
             </a:r>
@@ -39288,7 +39378,8 @@
           <a:p>
             <a:r>
               <a:rPr lang="en-US" dirty="0" smtClean="0">
-                <a:latin typeface="Buxton Sketch" panose="03080500000500000004" pitchFamily="66" charset="0"/>
+                <a:latin typeface="Cambria Math" panose="02040503050406030204" pitchFamily="18" charset="0"/>
+                <a:ea typeface="Cambria Math" panose="02040503050406030204" pitchFamily="18" charset="0"/>
               </a:rPr>
               <a:t> cars[</a:t>
             </a:r>
@@ -39297,19 +39388,22 @@
                 <a:solidFill>
                   <a:srgbClr val="FFFF00"/>
                 </a:solidFill>
-                <a:latin typeface="Buxton Sketch" panose="03080500000500000004" pitchFamily="66" charset="0"/>
+                <a:latin typeface="Cambria Math" panose="02040503050406030204" pitchFamily="18" charset="0"/>
+                <a:ea typeface="Cambria Math" panose="02040503050406030204" pitchFamily="18" charset="0"/>
               </a:rPr>
               <a:t>2</a:t>
             </a:r>
             <a:r>
               <a:rPr lang="en-US" dirty="0">
-                <a:latin typeface="Buxton Sketch" panose="03080500000500000004" pitchFamily="66" charset="0"/>
+                <a:latin typeface="Cambria Math" panose="02040503050406030204" pitchFamily="18" charset="0"/>
+                <a:ea typeface="Cambria Math" panose="02040503050406030204" pitchFamily="18" charset="0"/>
               </a:rPr>
               <a:t>] = "Jaguar</a:t>
             </a:r>
             <a:r>
               <a:rPr lang="en-US" dirty="0" smtClean="0">
-                <a:latin typeface="Buxton Sketch" panose="03080500000500000004" pitchFamily="66" charset="0"/>
+                <a:latin typeface="Cambria Math" panose="02040503050406030204" pitchFamily="18" charset="0"/>
+                <a:ea typeface="Cambria Math" panose="02040503050406030204" pitchFamily="18" charset="0"/>
               </a:rPr>
               <a:t>";</a:t>
             </a:r>
@@ -39317,7 +39411,8 @@
           <a:p>
             <a:r>
               <a:rPr lang="en-US" dirty="0" smtClean="0">
-                <a:latin typeface="Buxton Sketch" panose="03080500000500000004" pitchFamily="66" charset="0"/>
+                <a:latin typeface="Cambria Math" panose="02040503050406030204" pitchFamily="18" charset="0"/>
+                <a:ea typeface="Cambria Math" panose="02040503050406030204" pitchFamily="18" charset="0"/>
               </a:rPr>
               <a:t> cars[</a:t>
             </a:r>
@@ -39326,18 +39421,21 @@
                 <a:solidFill>
                   <a:srgbClr val="FFFF00"/>
                 </a:solidFill>
-                <a:latin typeface="Buxton Sketch" panose="03080500000500000004" pitchFamily="66" charset="0"/>
+                <a:latin typeface="Cambria Math" panose="02040503050406030204" pitchFamily="18" charset="0"/>
+                <a:ea typeface="Cambria Math" panose="02040503050406030204" pitchFamily="18" charset="0"/>
               </a:rPr>
               <a:t>3</a:t>
             </a:r>
             <a:r>
               <a:rPr lang="en-US" dirty="0" smtClean="0">
-                <a:latin typeface="Buxton Sketch" panose="03080500000500000004" pitchFamily="66" charset="0"/>
+                <a:latin typeface="Cambria Math" panose="02040503050406030204" pitchFamily="18" charset="0"/>
+                <a:ea typeface="Cambria Math" panose="02040503050406030204" pitchFamily="18" charset="0"/>
               </a:rPr>
               <a:t>] = “Lamborghini”;</a:t>
             </a:r>
             <a:endParaRPr lang="en-US" dirty="0">
-              <a:latin typeface="Buxton Sketch" panose="03080500000500000004" pitchFamily="66" charset="0"/>
+              <a:latin typeface="Cambria Math" panose="02040503050406030204" pitchFamily="18" charset="0"/>
+              <a:ea typeface="Cambria Math" panose="02040503050406030204" pitchFamily="18" charset="0"/>
             </a:endParaRPr>
           </a:p>
         </p:txBody>
@@ -39350,8 +39448,8 @@
         </p:nvSpPr>
         <p:spPr>
           <a:xfrm>
-            <a:off x="6409944" y="3647116"/>
-            <a:ext cx="4855464" cy="2862322"/>
+            <a:off x="6512580" y="2774168"/>
+            <a:ext cx="5514579" cy="3416320"/>
           </a:xfrm>
           <a:prstGeom prst="rect">
             <a:avLst/>
@@ -39366,7 +39464,8 @@
           <a:p>
             <a:r>
               <a:rPr lang="en-US" dirty="0">
-                <a:latin typeface="Buxton Sketch" panose="03080500000500000004" pitchFamily="66" charset="0"/>
+                <a:latin typeface="Cambria Math" panose="02040503050406030204" pitchFamily="18" charset="0"/>
+                <a:ea typeface="Cambria Math" panose="02040503050406030204" pitchFamily="18" charset="0"/>
               </a:rPr>
               <a:t> </a:t>
             </a:r>
@@ -39375,13 +39474,15 @@
                 <a:solidFill>
                   <a:srgbClr val="00B050"/>
                 </a:solidFill>
-                <a:latin typeface="Buxton Sketch" panose="03080500000500000004" pitchFamily="66" charset="0"/>
+                <a:latin typeface="Cambria Math" panose="02040503050406030204" pitchFamily="18" charset="0"/>
+                <a:ea typeface="Cambria Math" panose="02040503050406030204" pitchFamily="18" charset="0"/>
               </a:rPr>
               <a:t>List</a:t>
             </a:r>
             <a:r>
               <a:rPr lang="en-US" dirty="0">
-                <a:latin typeface="Buxton Sketch" panose="03080500000500000004" pitchFamily="66" charset="0"/>
+                <a:latin typeface="Cambria Math" panose="02040503050406030204" pitchFamily="18" charset="0"/>
+                <a:ea typeface="Cambria Math" panose="02040503050406030204" pitchFamily="18" charset="0"/>
               </a:rPr>
               <a:t>&lt;</a:t>
             </a:r>
@@ -39390,40 +39491,53 @@
                 <a:solidFill>
                   <a:srgbClr val="00B0F0"/>
                 </a:solidFill>
-                <a:latin typeface="Buxton Sketch" panose="03080500000500000004" pitchFamily="66" charset="0"/>
+                <a:latin typeface="Cambria Math" panose="02040503050406030204" pitchFamily="18" charset="0"/>
+                <a:ea typeface="Cambria Math" panose="02040503050406030204" pitchFamily="18" charset="0"/>
               </a:rPr>
               <a:t>string</a:t>
             </a:r>
             <a:r>
               <a:rPr lang="en-US" dirty="0">
-                <a:latin typeface="Buxton Sketch" panose="03080500000500000004" pitchFamily="66" charset="0"/>
+                <a:latin typeface="Cambria Math" panose="02040503050406030204" pitchFamily="18" charset="0"/>
+                <a:ea typeface="Cambria Math" panose="02040503050406030204" pitchFamily="18" charset="0"/>
               </a:rPr>
               <a:t>&gt;  </a:t>
             </a:r>
             <a:r>
               <a:rPr lang="en-US" dirty="0" err="1">
-                <a:latin typeface="Buxton Sketch" panose="03080500000500000004" pitchFamily="66" charset="0"/>
+                <a:latin typeface="Cambria Math" panose="02040503050406030204" pitchFamily="18" charset="0"/>
+                <a:ea typeface="Cambria Math" panose="02040503050406030204" pitchFamily="18" charset="0"/>
               </a:rPr>
               <a:t>studentNames</a:t>
             </a:r>
             <a:r>
               <a:rPr lang="en-US" dirty="0">
-                <a:latin typeface="Buxton Sketch" panose="03080500000500000004" pitchFamily="66" charset="0"/>
+                <a:latin typeface="Cambria Math" panose="02040503050406030204" pitchFamily="18" charset="0"/>
+                <a:ea typeface="Cambria Math" panose="02040503050406030204" pitchFamily="18" charset="0"/>
               </a:rPr>
               <a:t> = </a:t>
             </a:r>
+            <a:endParaRPr lang="en-US" dirty="0" smtClean="0">
+              <a:latin typeface="Cambria Math" panose="02040503050406030204" pitchFamily="18" charset="0"/>
+              <a:ea typeface="Cambria Math" panose="02040503050406030204" pitchFamily="18" charset="0"/>
+            </a:endParaRPr>
+          </a:p>
+          <a:p>
+            <a:pPr lvl="1"/>
             <a:r>
-              <a:rPr lang="en-US" dirty="0">
+              <a:rPr lang="en-US" dirty="0" smtClean="0">
                 <a:solidFill>
                   <a:srgbClr val="00B0F0"/>
                 </a:solidFill>
-                <a:latin typeface="Buxton Sketch" panose="03080500000500000004" pitchFamily="66" charset="0"/>
+                <a:latin typeface="Cambria Math" panose="02040503050406030204" pitchFamily="18" charset="0"/>
+                <a:ea typeface="Cambria Math" panose="02040503050406030204" pitchFamily="18" charset="0"/>
               </a:rPr>
               <a:t>new</a:t>
             </a:r>
             <a:r>
-              <a:rPr lang="en-US" dirty="0">
-                <a:latin typeface="Buxton Sketch" panose="03080500000500000004" pitchFamily="66" charset="0"/>
+              <a:rPr lang="en-US" dirty="0" smtClean="0">
+                <a:latin typeface="Cambria Math" panose="02040503050406030204" pitchFamily="18" charset="0"/>
+                <a:ea typeface="Cambria Math" panose="02040503050406030204" pitchFamily="18" charset="0"/>
               </a:rPr>
               <a:t> </a:t>
             </a:r>
@@ -39432,13 +39546,15 @@
                 <a:solidFill>
                   <a:srgbClr val="00B050"/>
                 </a:solidFill>
-                <a:latin typeface="Buxton Sketch" panose="03080500000500000004" pitchFamily="66" charset="0"/>
+                <a:latin typeface="Cambria Math" panose="02040503050406030204" pitchFamily="18" charset="0"/>
+                <a:ea typeface="Cambria Math" panose="02040503050406030204" pitchFamily="18" charset="0"/>
               </a:rPr>
               <a:t>List</a:t>
             </a:r>
             <a:r>
               <a:rPr lang="en-US" dirty="0">
-                <a:latin typeface="Buxton Sketch" panose="03080500000500000004" pitchFamily="66" charset="0"/>
+                <a:latin typeface="Cambria Math" panose="02040503050406030204" pitchFamily="18" charset="0"/>
+                <a:ea typeface="Cambria Math" panose="02040503050406030204" pitchFamily="18" charset="0"/>
               </a:rPr>
               <a:t>&lt;</a:t>
             </a:r>
@@ -39447,64 +39563,86 @@
                 <a:solidFill>
                   <a:srgbClr val="00B0F0"/>
                 </a:solidFill>
-                <a:latin typeface="Buxton Sketch" panose="03080500000500000004" pitchFamily="66" charset="0"/>
+                <a:latin typeface="Cambria Math" panose="02040503050406030204" pitchFamily="18" charset="0"/>
+                <a:ea typeface="Cambria Math" panose="02040503050406030204" pitchFamily="18" charset="0"/>
               </a:rPr>
               <a:t>string</a:t>
             </a:r>
             <a:r>
               <a:rPr lang="en-US" dirty="0">
-                <a:latin typeface="Buxton Sketch" panose="03080500000500000004" pitchFamily="66" charset="0"/>
+                <a:latin typeface="Cambria Math" panose="02040503050406030204" pitchFamily="18" charset="0"/>
+                <a:ea typeface="Cambria Math" panose="02040503050406030204" pitchFamily="18" charset="0"/>
               </a:rPr>
               <a:t>&gt;() </a:t>
             </a:r>
             <a:endParaRPr lang="en-US" dirty="0" smtClean="0">
-              <a:latin typeface="Buxton Sketch" panose="03080500000500000004" pitchFamily="66" charset="0"/>
+              <a:latin typeface="Cambria Math" panose="02040503050406030204" pitchFamily="18" charset="0"/>
+              <a:ea typeface="Cambria Math" panose="02040503050406030204" pitchFamily="18" charset="0"/>
             </a:endParaRPr>
           </a:p>
           <a:p>
+            <a:pPr lvl="1"/>
             <a:r>
               <a:rPr lang="en-US" dirty="0" smtClean="0">
-                <a:latin typeface="Buxton Sketch" panose="03080500000500000004" pitchFamily="66" charset="0"/>
+                <a:latin typeface="Cambria Math" panose="02040503050406030204" pitchFamily="18" charset="0"/>
+                <a:ea typeface="Cambria Math" panose="02040503050406030204" pitchFamily="18" charset="0"/>
               </a:rPr>
               <a:t>{</a:t>
+            </a:r>
+          </a:p>
+          <a:p>
+            <a:pPr lvl="2"/>
+            <a:r>
+              <a:rPr lang="en-US" dirty="0" smtClean="0">
+                <a:latin typeface="Cambria Math" panose="02040503050406030204" pitchFamily="18" charset="0"/>
+                <a:ea typeface="Cambria Math" panose="02040503050406030204" pitchFamily="18" charset="0"/>
+              </a:rPr>
+              <a:t>“Kermit“,</a:t>
+            </a:r>
+          </a:p>
+          <a:p>
+            <a:pPr lvl="2"/>
+            <a:r>
+              <a:rPr lang="en-US" dirty="0" smtClean="0">
+                <a:latin typeface="Cambria Math" panose="02040503050406030204" pitchFamily="18" charset="0"/>
+                <a:ea typeface="Cambria Math" panose="02040503050406030204" pitchFamily="18" charset="0"/>
+              </a:rPr>
+              <a:t>“Miss Piggy”</a:t>
             </a:r>
           </a:p>
           <a:p>
             <a:pPr lvl="1"/>
             <a:r>
               <a:rPr lang="en-US" dirty="0" smtClean="0">
-                <a:latin typeface="Buxton Sketch" panose="03080500000500000004" pitchFamily="66" charset="0"/>
+                <a:latin typeface="Cambria Math" panose="02040503050406030204" pitchFamily="18" charset="0"/>
+                <a:ea typeface="Cambria Math" panose="02040503050406030204" pitchFamily="18" charset="0"/>
               </a:rPr>
-              <a:t>“Kermit“,</a:t>
+              <a:t>}; </a:t>
             </a:r>
+            <a:endParaRPr lang="en-US" dirty="0" smtClean="0">
+              <a:latin typeface="Cambria Math" panose="02040503050406030204" pitchFamily="18" charset="0"/>
+              <a:ea typeface="Cambria Math" panose="02040503050406030204" pitchFamily="18" charset="0"/>
+            </a:endParaRPr>
           </a:p>
           <a:p>
             <a:pPr lvl="1"/>
-            <a:r>
-              <a:rPr lang="en-US" dirty="0" smtClean="0">
-                <a:latin typeface="Buxton Sketch" panose="03080500000500000004" pitchFamily="66" charset="0"/>
-              </a:rPr>
-              <a:t>“Miss Piggy”</a:t>
-            </a:r>
-          </a:p>
-          <a:p>
-            <a:r>
-              <a:rPr lang="en-US" dirty="0" smtClean="0">
-                <a:latin typeface="Buxton Sketch" panose="03080500000500000004" pitchFamily="66" charset="0"/>
-              </a:rPr>
-              <a:t>}; </a:t>
-            </a:r>
+            <a:endParaRPr lang="en-US" dirty="0" smtClean="0">
+              <a:latin typeface="Cambria Math" panose="02040503050406030204" pitchFamily="18" charset="0"/>
+              <a:ea typeface="Cambria Math" panose="02040503050406030204" pitchFamily="18" charset="0"/>
+            </a:endParaRPr>
           </a:p>
           <a:p>
             <a:r>
               <a:rPr lang="en-US" dirty="0" err="1" smtClean="0">
-                <a:latin typeface="Buxton Sketch" panose="03080500000500000004" pitchFamily="66" charset="0"/>
+                <a:latin typeface="Cambria Math" panose="02040503050406030204" pitchFamily="18" charset="0"/>
+                <a:ea typeface="Cambria Math" panose="02040503050406030204" pitchFamily="18" charset="0"/>
               </a:rPr>
               <a:t>studentNames.Add</a:t>
             </a:r>
             <a:r>
               <a:rPr lang="en-US" dirty="0" smtClean="0">
-                <a:latin typeface="Buxton Sketch" panose="03080500000500000004" pitchFamily="66" charset="0"/>
+                <a:latin typeface="Cambria Math" panose="02040503050406030204" pitchFamily="18" charset="0"/>
+                <a:ea typeface="Cambria Math" panose="02040503050406030204" pitchFamily="18" charset="0"/>
               </a:rPr>
               <a:t>(</a:t>
             </a:r>
@@ -39513,37 +39651,43 @@
                 <a:solidFill>
                   <a:srgbClr val="00B050"/>
                 </a:solidFill>
-                <a:latin typeface="Buxton Sketch" panose="03080500000500000004" pitchFamily="66" charset="0"/>
+                <a:latin typeface="Cambria Math" panose="02040503050406030204" pitchFamily="18" charset="0"/>
+                <a:ea typeface="Cambria Math" panose="02040503050406030204" pitchFamily="18" charset="0"/>
               </a:rPr>
               <a:t>Convert</a:t>
             </a:r>
             <a:r>
               <a:rPr lang="en-US" dirty="0" err="1" smtClean="0">
-                <a:latin typeface="Buxton Sketch" panose="03080500000500000004" pitchFamily="66" charset="0"/>
+                <a:latin typeface="Cambria Math" panose="02040503050406030204" pitchFamily="18" charset="0"/>
+                <a:ea typeface="Cambria Math" panose="02040503050406030204" pitchFamily="18" charset="0"/>
               </a:rPr>
               <a:t>.ToString</a:t>
             </a:r>
             <a:r>
               <a:rPr lang="en-US" dirty="0" smtClean="0">
-                <a:latin typeface="Buxton Sketch" panose="03080500000500000004" pitchFamily="66" charset="0"/>
+                <a:latin typeface="Cambria Math" panose="02040503050406030204" pitchFamily="18" charset="0"/>
+                <a:ea typeface="Cambria Math" panose="02040503050406030204" pitchFamily="18" charset="0"/>
               </a:rPr>
               <a:t>(</a:t>
             </a:r>
             <a:r>
               <a:rPr lang="en-US" dirty="0" err="1" smtClean="0">
-                <a:latin typeface="Buxton Sketch" panose="03080500000500000004" pitchFamily="66" charset="0"/>
+                <a:latin typeface="Cambria Math" panose="02040503050406030204" pitchFamily="18" charset="0"/>
+                <a:ea typeface="Cambria Math" panose="02040503050406030204" pitchFamily="18" charset="0"/>
               </a:rPr>
               <a:t>studentId</a:t>
             </a:r>
             <a:r>
               <a:rPr lang="en-US" dirty="0" smtClean="0">
-                <a:latin typeface="Buxton Sketch" panose="03080500000500000004" pitchFamily="66" charset="0"/>
+                <a:latin typeface="Cambria Math" panose="02040503050406030204" pitchFamily="18" charset="0"/>
+                <a:ea typeface="Cambria Math" panose="02040503050406030204" pitchFamily="18" charset="0"/>
               </a:rPr>
               <a:t>[2</a:t>
             </a:r>
             <a:r>
               <a:rPr lang="en-US" dirty="0">
-                <a:latin typeface="Buxton Sketch" panose="03080500000500000004" pitchFamily="66" charset="0"/>
+                <a:latin typeface="Cambria Math" panose="02040503050406030204" pitchFamily="18" charset="0"/>
+                <a:ea typeface="Cambria Math" panose="02040503050406030204" pitchFamily="18" charset="0"/>
               </a:rPr>
               <a:t>]));</a:t>
             </a:r>
@@ -39551,13 +39695,15 @@
           <a:p>
             <a:r>
               <a:rPr lang="en-US" dirty="0" err="1" smtClean="0">
-                <a:latin typeface="Buxton Sketch" panose="03080500000500000004" pitchFamily="66" charset="0"/>
+                <a:latin typeface="Cambria Math" panose="02040503050406030204" pitchFamily="18" charset="0"/>
+                <a:ea typeface="Cambria Math" panose="02040503050406030204" pitchFamily="18" charset="0"/>
               </a:rPr>
               <a:t>studentNames.Add</a:t>
             </a:r>
             <a:r>
               <a:rPr lang="en-US" dirty="0" smtClean="0">
-                <a:latin typeface="Buxton Sketch" panose="03080500000500000004" pitchFamily="66" charset="0"/>
+                <a:latin typeface="Cambria Math" panose="02040503050406030204" pitchFamily="18" charset="0"/>
+                <a:ea typeface="Cambria Math" panose="02040503050406030204" pitchFamily="18" charset="0"/>
               </a:rPr>
               <a:t>(cars[3]);</a:t>
             </a:r>
@@ -39565,13 +39711,15 @@
           <a:p>
             <a:r>
               <a:rPr lang="en-US" dirty="0" err="1" smtClean="0">
-                <a:latin typeface="Buxton Sketch" panose="03080500000500000004" pitchFamily="66" charset="0"/>
+                <a:latin typeface="Cambria Math" panose="02040503050406030204" pitchFamily="18" charset="0"/>
+                <a:ea typeface="Cambria Math" panose="02040503050406030204" pitchFamily="18" charset="0"/>
               </a:rPr>
               <a:t>studentNames.Add</a:t>
             </a:r>
             <a:r>
               <a:rPr lang="en-US" dirty="0" smtClean="0">
-                <a:latin typeface="Buxton Sketch" panose="03080500000500000004" pitchFamily="66" charset="0"/>
+                <a:latin typeface="Cambria Math" panose="02040503050406030204" pitchFamily="18" charset="0"/>
+                <a:ea typeface="Cambria Math" panose="02040503050406030204" pitchFamily="18" charset="0"/>
               </a:rPr>
               <a:t>(“Cheese”);</a:t>
             </a:r>
@@ -39579,23 +39727,27 @@
           <a:p>
             <a:r>
               <a:rPr lang="en-US" dirty="0" err="1">
-                <a:latin typeface="Buxton Sketch" panose="03080500000500000004" pitchFamily="66" charset="0"/>
+                <a:latin typeface="Cambria Math" panose="02040503050406030204" pitchFamily="18" charset="0"/>
+                <a:ea typeface="Cambria Math" panose="02040503050406030204" pitchFamily="18" charset="0"/>
               </a:rPr>
               <a:t>studentNames.Add</a:t>
             </a:r>
             <a:r>
               <a:rPr lang="en-US" dirty="0" smtClean="0">
-                <a:latin typeface="Buxton Sketch" panose="03080500000500000004" pitchFamily="66" charset="0"/>
+                <a:latin typeface="Cambria Math" panose="02040503050406030204" pitchFamily="18" charset="0"/>
+                <a:ea typeface="Cambria Math" panose="02040503050406030204" pitchFamily="18" charset="0"/>
               </a:rPr>
               <a:t>(“69”);</a:t>
             </a:r>
             <a:endParaRPr lang="en-US" dirty="0">
-              <a:latin typeface="Buxton Sketch" panose="03080500000500000004" pitchFamily="66" charset="0"/>
+              <a:latin typeface="Cambria Math" panose="02040503050406030204" pitchFamily="18" charset="0"/>
+              <a:ea typeface="Cambria Math" panose="02040503050406030204" pitchFamily="18" charset="0"/>
             </a:endParaRPr>
           </a:p>
           <a:p>
             <a:endParaRPr lang="en-US" dirty="0">
-              <a:latin typeface="Buxton Sketch" panose="03080500000500000004" pitchFamily="66" charset="0"/>
+              <a:latin typeface="Cambria Math" panose="02040503050406030204" pitchFamily="18" charset="0"/>
+              <a:ea typeface="Cambria Math" panose="02040503050406030204" pitchFamily="18" charset="0"/>
             </a:endParaRPr>
           </a:p>
         </p:txBody>

</xml_diff>